<commit_message>
Deploy website Wed Jul 24 04:20:56 PM PDT 2024
</commit_message>
<xml_diff>
--- a/assets/slides/su24/20-Trees.pptx
+++ b/assets/slides/su24/20-Trees.pptx
@@ -5,37 +5,36 @@
     <p:sldMasterId id="2147484057" r:id="rId1"/>
   </p:sldMasterIdLst>
   <p:notesMasterIdLst>
-    <p:notesMasterId r:id="rId27"/>
+    <p:notesMasterId r:id="rId26"/>
   </p:notesMasterIdLst>
   <p:handoutMasterIdLst>
-    <p:handoutMasterId r:id="rId28"/>
+    <p:handoutMasterId r:id="rId27"/>
   </p:handoutMasterIdLst>
   <p:sldIdLst>
     <p:sldId id="360" r:id="rId2"/>
     <p:sldId id="1090" r:id="rId3"/>
-    <p:sldId id="1089" r:id="rId4"/>
-    <p:sldId id="1074" r:id="rId5"/>
-    <p:sldId id="403" r:id="rId6"/>
-    <p:sldId id="390" r:id="rId7"/>
-    <p:sldId id="1066" r:id="rId8"/>
-    <p:sldId id="1073" r:id="rId9"/>
-    <p:sldId id="1091" r:id="rId10"/>
-    <p:sldId id="1092" r:id="rId11"/>
-    <p:sldId id="1093" r:id="rId12"/>
-    <p:sldId id="1094" r:id="rId13"/>
-    <p:sldId id="1072" r:id="rId14"/>
-    <p:sldId id="1077" r:id="rId15"/>
-    <p:sldId id="1087" r:id="rId16"/>
-    <p:sldId id="1081" r:id="rId17"/>
-    <p:sldId id="1084" r:id="rId18"/>
-    <p:sldId id="1078" r:id="rId19"/>
-    <p:sldId id="1082" r:id="rId20"/>
-    <p:sldId id="1083" r:id="rId21"/>
-    <p:sldId id="1085" r:id="rId22"/>
-    <p:sldId id="1076" r:id="rId23"/>
-    <p:sldId id="1068" r:id="rId24"/>
-    <p:sldId id="1069" r:id="rId25"/>
-    <p:sldId id="1070" r:id="rId26"/>
+    <p:sldId id="1074" r:id="rId4"/>
+    <p:sldId id="403" r:id="rId5"/>
+    <p:sldId id="390" r:id="rId6"/>
+    <p:sldId id="1066" r:id="rId7"/>
+    <p:sldId id="1073" r:id="rId8"/>
+    <p:sldId id="1091" r:id="rId9"/>
+    <p:sldId id="1092" r:id="rId10"/>
+    <p:sldId id="1093" r:id="rId11"/>
+    <p:sldId id="1094" r:id="rId12"/>
+    <p:sldId id="1072" r:id="rId13"/>
+    <p:sldId id="1077" r:id="rId14"/>
+    <p:sldId id="1087" r:id="rId15"/>
+    <p:sldId id="1081" r:id="rId16"/>
+    <p:sldId id="1084" r:id="rId17"/>
+    <p:sldId id="1078" r:id="rId18"/>
+    <p:sldId id="1082" r:id="rId19"/>
+    <p:sldId id="1083" r:id="rId20"/>
+    <p:sldId id="1085" r:id="rId21"/>
+    <p:sldId id="1076" r:id="rId22"/>
+    <p:sldId id="1068" r:id="rId23"/>
+    <p:sldId id="1069" r:id="rId24"/>
+    <p:sldId id="1070" r:id="rId25"/>
   </p:sldIdLst>
   <p:sldSz cx="12192000" cy="6858000"/>
   <p:notesSz cx="6997700" cy="9194800"/>
@@ -671,14 +670,14 @@
           </a:ln>
           <a:extLst>
             <a:ext uri="{909E8E84-426E-40dd-AFC4-6F175D3DCCD1}">
-              <a14:hiddenFill xmlns:a14="http://schemas.microsoft.com/office/drawing/2010/main" xmlns="">
+              <a14:hiddenFill xmlns="" xmlns:a14="http://schemas.microsoft.com/office/drawing/2010/main">
                 <a:solidFill>
                   <a:srgbClr val="FFFFFF"/>
                 </a:solidFill>
               </a14:hiddenFill>
             </a:ext>
             <a:ext uri="{91240B29-F687-4f45-9708-019B960494DF}">
-              <a14:hiddenLine xmlns:a14="http://schemas.microsoft.com/office/drawing/2010/main" xmlns="" w="9525">
+              <a14:hiddenLine xmlns="" xmlns:a14="http://schemas.microsoft.com/office/drawing/2010/main" w="9525">
                 <a:solidFill>
                   <a:srgbClr val="000000"/>
                 </a:solidFill>
@@ -746,14 +745,14 @@
           </a:ln>
           <a:extLst>
             <a:ext uri="{909E8E84-426E-40dd-AFC4-6F175D3DCCD1}">
-              <a14:hiddenFill xmlns:a14="http://schemas.microsoft.com/office/drawing/2010/main" xmlns="">
+              <a14:hiddenFill xmlns="" xmlns:a14="http://schemas.microsoft.com/office/drawing/2010/main">
                 <a:solidFill>
                   <a:srgbClr val="FFFFFF"/>
                 </a:solidFill>
               </a14:hiddenFill>
             </a:ext>
             <a:ext uri="{FAA26D3D-D897-4be2-8F04-BA451C77F1D7}">
-              <ma14:placeholderFlag xmlns:ma14="http://schemas.microsoft.com/office/mac/drawingml/2011/main" xmlns="" val="1"/>
+              <ma14:placeholderFlag xmlns="" xmlns:ma14="http://schemas.microsoft.com/office/mac/drawingml/2011/main" val="1"/>
             </a:ext>
           </a:extLst>
         </p:spPr>
@@ -1010,14 +1009,14 @@
           <a:ln/>
           <a:extLst>
             <a:ext uri="{909E8E84-426E-40dd-AFC4-6F175D3DCCD1}">
-              <a14:hiddenFill xmlns:a14="http://schemas.microsoft.com/office/drawing/2010/main" xmlns="">
+              <a14:hiddenFill xmlns="" xmlns:a14="http://schemas.microsoft.com/office/drawing/2010/main">
                 <a:solidFill>
                   <a:srgbClr val="FFFFFF"/>
                 </a:solidFill>
               </a14:hiddenFill>
             </a:ext>
             <a:ext uri="{91240B29-F687-4f45-9708-019B960494DF}">
-              <a14:hiddenLine xmlns:a14="http://schemas.microsoft.com/office/drawing/2010/main" xmlns="" w="9525">
+              <a14:hiddenLine xmlns="" xmlns:a14="http://schemas.microsoft.com/office/drawing/2010/main" w="9525">
                 <a:solidFill>
                   <a:srgbClr val="000000"/>
                 </a:solidFill>
@@ -1185,14 +1184,14 @@
           <a:ln/>
           <a:extLst>
             <a:ext uri="{909E8E84-426E-40dd-AFC4-6F175D3DCCD1}">
-              <a14:hiddenFill xmlns:a14="http://schemas.microsoft.com/office/drawing/2010/main" xmlns="">
+              <a14:hiddenFill xmlns="" xmlns:a14="http://schemas.microsoft.com/office/drawing/2010/main">
                 <a:solidFill>
                   <a:srgbClr val="FFFFFF"/>
                 </a:solidFill>
               </a14:hiddenFill>
             </a:ext>
             <a:ext uri="{91240B29-F687-4f45-9708-019B960494DF}">
-              <a14:hiddenLine xmlns:a14="http://schemas.microsoft.com/office/drawing/2010/main" xmlns="" w="9525">
+              <a14:hiddenLine xmlns="" xmlns:a14="http://schemas.microsoft.com/office/drawing/2010/main" w="9525">
                 <a:solidFill>
                   <a:srgbClr val="000000"/>
                 </a:solidFill>
@@ -1202,7 +1201,7 @@
               </a14:hiddenLine>
             </a:ext>
             <a:ext uri="{FAA26D3D-D897-4be2-8F04-BA451C77F1D7}">
-              <ma14:placeholderFlag xmlns:ma14="http://schemas.microsoft.com/office/mac/drawingml/2011/main" xmlns="" val="1"/>
+              <ma14:placeholderFlag xmlns="" xmlns:ma14="http://schemas.microsoft.com/office/mac/drawingml/2011/main" val="1"/>
             </a:ext>
           </a:extLst>
         </p:spPr>
@@ -1258,14 +1257,14 @@
           <a:ln/>
           <a:extLst>
             <a:ext uri="{909E8E84-426E-40dd-AFC4-6F175D3DCCD1}">
-              <a14:hiddenFill xmlns:a14="http://schemas.microsoft.com/office/drawing/2010/main" xmlns="">
+              <a14:hiddenFill xmlns="" xmlns:a14="http://schemas.microsoft.com/office/drawing/2010/main">
                 <a:solidFill>
                   <a:srgbClr val="FFFFFF"/>
                 </a:solidFill>
               </a14:hiddenFill>
             </a:ext>
             <a:ext uri="{91240B29-F687-4f45-9708-019B960494DF}">
-              <a14:hiddenLine xmlns:a14="http://schemas.microsoft.com/office/drawing/2010/main" xmlns="" w="9525">
+              <a14:hiddenLine xmlns="" xmlns:a14="http://schemas.microsoft.com/office/drawing/2010/main" w="9525">
                 <a:solidFill>
                   <a:srgbClr val="000000"/>
                 </a:solidFill>
@@ -1392,7 +1391,7 @@
                 <a:latin typeface="Times New Roman" charset="0"/>
               </a:rPr>
               <a:pPr/>
-              <a:t>14</a:t>
+              <a:t>13</a:t>
             </a:fld>
             <a:endParaRPr lang="en-US" sz="900">
               <a:latin typeface="Times New Roman" charset="0"/>
@@ -1433,14 +1432,14 @@
           <a:ln/>
           <a:extLst>
             <a:ext uri="{909E8E84-426E-40dd-AFC4-6F175D3DCCD1}">
-              <a14:hiddenFill xmlns:a14="http://schemas.microsoft.com/office/drawing/2010/main" xmlns="">
+              <a14:hiddenFill xmlns="" xmlns:a14="http://schemas.microsoft.com/office/drawing/2010/main">
                 <a:solidFill>
                   <a:srgbClr val="FFFFFF"/>
                 </a:solidFill>
               </a14:hiddenFill>
             </a:ext>
             <a:ext uri="{91240B29-F687-4f45-9708-019B960494DF}">
-              <a14:hiddenLine xmlns:a14="http://schemas.microsoft.com/office/drawing/2010/main" xmlns="" w="9525">
+              <a14:hiddenLine xmlns="" xmlns:a14="http://schemas.microsoft.com/office/drawing/2010/main" w="9525">
                 <a:solidFill>
                   <a:srgbClr val="000000"/>
                 </a:solidFill>
@@ -1450,7 +1449,7 @@
               </a14:hiddenLine>
             </a:ext>
             <a:ext uri="{FAA26D3D-D897-4be2-8F04-BA451C77F1D7}">
-              <ma14:placeholderFlag xmlns:ma14="http://schemas.microsoft.com/office/mac/drawingml/2011/main" xmlns="" val="1"/>
+              <ma14:placeholderFlag xmlns="" xmlns:ma14="http://schemas.microsoft.com/office/mac/drawingml/2011/main" val="1"/>
             </a:ext>
           </a:extLst>
         </p:spPr>
@@ -1511,14 +1510,14 @@
           <a:ln/>
           <a:extLst>
             <a:ext uri="{909E8E84-426E-40dd-AFC4-6F175D3DCCD1}">
-              <a14:hiddenFill xmlns:a14="http://schemas.microsoft.com/office/drawing/2010/main" xmlns="">
+              <a14:hiddenFill xmlns="" xmlns:a14="http://schemas.microsoft.com/office/drawing/2010/main">
                 <a:solidFill>
                   <a:srgbClr val="FFFFFF"/>
                 </a:solidFill>
               </a14:hiddenFill>
             </a:ext>
             <a:ext uri="{91240B29-F687-4f45-9708-019B960494DF}">
-              <a14:hiddenLine xmlns:a14="http://schemas.microsoft.com/office/drawing/2010/main" xmlns="" w="9525">
+              <a14:hiddenLine xmlns="" xmlns:a14="http://schemas.microsoft.com/office/drawing/2010/main" w="9525">
                 <a:solidFill>
                   <a:srgbClr val="000000"/>
                 </a:solidFill>
@@ -1645,7 +1644,7 @@
                 <a:latin typeface="Times New Roman" charset="0"/>
               </a:rPr>
               <a:pPr/>
-              <a:t>17</a:t>
+              <a:t>16</a:t>
             </a:fld>
             <a:endParaRPr lang="en-US" sz="900">
               <a:latin typeface="Times New Roman" charset="0"/>
@@ -1686,14 +1685,14 @@
           <a:ln/>
           <a:extLst>
             <a:ext uri="{909E8E84-426E-40dd-AFC4-6F175D3DCCD1}">
-              <a14:hiddenFill xmlns:a14="http://schemas.microsoft.com/office/drawing/2010/main" xmlns="">
+              <a14:hiddenFill xmlns="" xmlns:a14="http://schemas.microsoft.com/office/drawing/2010/main">
                 <a:solidFill>
                   <a:srgbClr val="FFFFFF"/>
                 </a:solidFill>
               </a14:hiddenFill>
             </a:ext>
             <a:ext uri="{91240B29-F687-4f45-9708-019B960494DF}">
-              <a14:hiddenLine xmlns:a14="http://schemas.microsoft.com/office/drawing/2010/main" xmlns="" w="9525">
+              <a14:hiddenLine xmlns="" xmlns:a14="http://schemas.microsoft.com/office/drawing/2010/main" w="9525">
                 <a:solidFill>
                   <a:srgbClr val="000000"/>
                 </a:solidFill>
@@ -1703,7 +1702,7 @@
               </a14:hiddenLine>
             </a:ext>
             <a:ext uri="{FAA26D3D-D897-4be2-8F04-BA451C77F1D7}">
-              <ma14:placeholderFlag xmlns:ma14="http://schemas.microsoft.com/office/mac/drawingml/2011/main" xmlns="" val="1"/>
+              <ma14:placeholderFlag xmlns="" xmlns:ma14="http://schemas.microsoft.com/office/mac/drawingml/2011/main" val="1"/>
             </a:ext>
           </a:extLst>
         </p:spPr>
@@ -1764,14 +1763,14 @@
           <a:ln/>
           <a:extLst>
             <a:ext uri="{909E8E84-426E-40dd-AFC4-6F175D3DCCD1}">
-              <a14:hiddenFill xmlns:a14="http://schemas.microsoft.com/office/drawing/2010/main" xmlns="">
+              <a14:hiddenFill xmlns="" xmlns:a14="http://schemas.microsoft.com/office/drawing/2010/main">
                 <a:solidFill>
                   <a:srgbClr val="FFFFFF"/>
                 </a:solidFill>
               </a14:hiddenFill>
             </a:ext>
             <a:ext uri="{91240B29-F687-4f45-9708-019B960494DF}">
-              <a14:hiddenLine xmlns:a14="http://schemas.microsoft.com/office/drawing/2010/main" xmlns="" w="9525">
+              <a14:hiddenLine xmlns="" xmlns:a14="http://schemas.microsoft.com/office/drawing/2010/main" w="9525">
                 <a:solidFill>
                   <a:srgbClr val="000000"/>
                 </a:solidFill>
@@ -1898,7 +1897,7 @@
                 <a:latin typeface="Times New Roman" charset="0"/>
               </a:rPr>
               <a:pPr/>
-              <a:t>18</a:t>
+              <a:t>17</a:t>
             </a:fld>
             <a:endParaRPr lang="en-US" sz="900">
               <a:latin typeface="Times New Roman" charset="0"/>
@@ -1939,14 +1938,14 @@
           <a:ln/>
           <a:extLst>
             <a:ext uri="{909E8E84-426E-40dd-AFC4-6F175D3DCCD1}">
-              <a14:hiddenFill xmlns:a14="http://schemas.microsoft.com/office/drawing/2010/main" xmlns="">
+              <a14:hiddenFill xmlns="" xmlns:a14="http://schemas.microsoft.com/office/drawing/2010/main">
                 <a:solidFill>
                   <a:srgbClr val="FFFFFF"/>
                 </a:solidFill>
               </a14:hiddenFill>
             </a:ext>
             <a:ext uri="{91240B29-F687-4f45-9708-019B960494DF}">
-              <a14:hiddenLine xmlns:a14="http://schemas.microsoft.com/office/drawing/2010/main" xmlns="" w="9525">
+              <a14:hiddenLine xmlns="" xmlns:a14="http://schemas.microsoft.com/office/drawing/2010/main" w="9525">
                 <a:solidFill>
                   <a:srgbClr val="000000"/>
                 </a:solidFill>
@@ -1956,7 +1955,7 @@
               </a14:hiddenLine>
             </a:ext>
             <a:ext uri="{FAA26D3D-D897-4be2-8F04-BA451C77F1D7}">
-              <ma14:placeholderFlag xmlns:ma14="http://schemas.microsoft.com/office/mac/drawingml/2011/main" xmlns="" val="1"/>
+              <ma14:placeholderFlag xmlns="" xmlns:ma14="http://schemas.microsoft.com/office/mac/drawingml/2011/main" val="1"/>
             </a:ext>
           </a:extLst>
         </p:spPr>
@@ -2017,14 +2016,14 @@
           <a:ln/>
           <a:extLst>
             <a:ext uri="{909E8E84-426E-40dd-AFC4-6F175D3DCCD1}">
-              <a14:hiddenFill xmlns:a14="http://schemas.microsoft.com/office/drawing/2010/main" xmlns="">
+              <a14:hiddenFill xmlns="" xmlns:a14="http://schemas.microsoft.com/office/drawing/2010/main">
                 <a:solidFill>
                   <a:srgbClr val="FFFFFF"/>
                 </a:solidFill>
               </a14:hiddenFill>
             </a:ext>
             <a:ext uri="{91240B29-F687-4f45-9708-019B960494DF}">
-              <a14:hiddenLine xmlns:a14="http://schemas.microsoft.com/office/drawing/2010/main" xmlns="" w="9525">
+              <a14:hiddenLine xmlns="" xmlns:a14="http://schemas.microsoft.com/office/drawing/2010/main" w="9525">
                 <a:solidFill>
                   <a:srgbClr val="000000"/>
                 </a:solidFill>
@@ -2151,7 +2150,7 @@
                 <a:latin typeface="Times New Roman" charset="0"/>
               </a:rPr>
               <a:pPr/>
-              <a:t>21</a:t>
+              <a:t>20</a:t>
             </a:fld>
             <a:endParaRPr lang="en-US" sz="900">
               <a:latin typeface="Times New Roman" charset="0"/>
@@ -2192,14 +2191,14 @@
           <a:ln/>
           <a:extLst>
             <a:ext uri="{909E8E84-426E-40dd-AFC4-6F175D3DCCD1}">
-              <a14:hiddenFill xmlns:a14="http://schemas.microsoft.com/office/drawing/2010/main" xmlns="">
+              <a14:hiddenFill xmlns="" xmlns:a14="http://schemas.microsoft.com/office/drawing/2010/main">
                 <a:solidFill>
                   <a:srgbClr val="FFFFFF"/>
                 </a:solidFill>
               </a14:hiddenFill>
             </a:ext>
             <a:ext uri="{91240B29-F687-4f45-9708-019B960494DF}">
-              <a14:hiddenLine xmlns:a14="http://schemas.microsoft.com/office/drawing/2010/main" xmlns="" w="9525">
+              <a14:hiddenLine xmlns="" xmlns:a14="http://schemas.microsoft.com/office/drawing/2010/main" w="9525">
                 <a:solidFill>
                   <a:srgbClr val="000000"/>
                 </a:solidFill>
@@ -2209,7 +2208,7 @@
               </a14:hiddenLine>
             </a:ext>
             <a:ext uri="{FAA26D3D-D897-4be2-8F04-BA451C77F1D7}">
-              <ma14:placeholderFlag xmlns:ma14="http://schemas.microsoft.com/office/mac/drawingml/2011/main" xmlns="" val="1"/>
+              <ma14:placeholderFlag xmlns="" xmlns:ma14="http://schemas.microsoft.com/office/mac/drawingml/2011/main" val="1"/>
             </a:ext>
           </a:extLst>
         </p:spPr>
@@ -2270,14 +2269,14 @@
           <a:ln/>
           <a:extLst>
             <a:ext uri="{909E8E84-426E-40dd-AFC4-6F175D3DCCD1}">
-              <a14:hiddenFill xmlns:a14="http://schemas.microsoft.com/office/drawing/2010/main" xmlns="">
+              <a14:hiddenFill xmlns="" xmlns:a14="http://schemas.microsoft.com/office/drawing/2010/main">
                 <a:solidFill>
                   <a:srgbClr val="FFFFFF"/>
                 </a:solidFill>
               </a14:hiddenFill>
             </a:ext>
             <a:ext uri="{91240B29-F687-4f45-9708-019B960494DF}">
-              <a14:hiddenLine xmlns:a14="http://schemas.microsoft.com/office/drawing/2010/main" xmlns="" w="9525">
+              <a14:hiddenLine xmlns="" xmlns:a14="http://schemas.microsoft.com/office/drawing/2010/main" w="9525">
                 <a:solidFill>
                   <a:srgbClr val="000000"/>
                 </a:solidFill>
@@ -2404,7 +2403,7 @@
                 <a:latin typeface="Times New Roman" charset="0"/>
               </a:rPr>
               <a:pPr/>
-              <a:t>22</a:t>
+              <a:t>21</a:t>
             </a:fld>
             <a:endParaRPr lang="en-US" sz="900">
               <a:latin typeface="Times New Roman" charset="0"/>
@@ -2445,14 +2444,14 @@
           <a:ln/>
           <a:extLst>
             <a:ext uri="{909E8E84-426E-40dd-AFC4-6F175D3DCCD1}">
-              <a14:hiddenFill xmlns:a14="http://schemas.microsoft.com/office/drawing/2010/main" xmlns="">
+              <a14:hiddenFill xmlns="" xmlns:a14="http://schemas.microsoft.com/office/drawing/2010/main">
                 <a:solidFill>
                   <a:srgbClr val="FFFFFF"/>
                 </a:solidFill>
               </a14:hiddenFill>
             </a:ext>
             <a:ext uri="{91240B29-F687-4f45-9708-019B960494DF}">
-              <a14:hiddenLine xmlns:a14="http://schemas.microsoft.com/office/drawing/2010/main" xmlns="" w="9525">
+              <a14:hiddenLine xmlns="" xmlns:a14="http://schemas.microsoft.com/office/drawing/2010/main" w="9525">
                 <a:solidFill>
                   <a:srgbClr val="000000"/>
                 </a:solidFill>
@@ -2462,7 +2461,7 @@
               </a14:hiddenLine>
             </a:ext>
             <a:ext uri="{FAA26D3D-D897-4be2-8F04-BA451C77F1D7}">
-              <ma14:placeholderFlag xmlns:ma14="http://schemas.microsoft.com/office/mac/drawingml/2011/main" xmlns="" val="1"/>
+              <ma14:placeholderFlag xmlns="" xmlns:ma14="http://schemas.microsoft.com/office/mac/drawingml/2011/main" val="1"/>
             </a:ext>
           </a:extLst>
         </p:spPr>
@@ -2662,7 +2661,7 @@
           <a:p>
             <a:r>
               <a:rPr lang="en-US" dirty="0"/>
-              <a:t>Michael Ball | UC Berkeley | https://c88c.org | © CC BY-NC-SA</a:t>
+              <a:t>Eric Kim | UC Berkeley | https://c88c.org | © CC BY-NC-SA</a:t>
             </a:r>
           </a:p>
         </p:txBody>
@@ -2758,7 +2757,7 @@
           <a:p>
             <a:r>
               <a:rPr lang="en-US" dirty="0"/>
-              <a:t>Michael Ball | UC Berkeley | https://c88c.org | © CC BY-NC-SA</a:t>
+              <a:t>Eric Kim | UC Berkeley | https://c88c.org | © CC BY-NC-SA</a:t>
             </a:r>
           </a:p>
         </p:txBody>
@@ -2826,8 +2825,8 @@
           </a:lstStyle>
           <a:p>
             <a:r>
-              <a:rPr lang="en-US"/>
-              <a:t>Michael Ball | UC Berkeley | https://c88c.org | © CC BY-NC-SA</a:t>
+              <a:rPr lang="en-US" dirty="0"/>
+              <a:t>Eric Kim | UC Berkeley | https://c88c.org | © CC BY-NC-SA</a:t>
             </a:r>
           </a:p>
         </p:txBody>
@@ -3125,8 +3124,8 @@
           </a:lstStyle>
           <a:p>
             <a:r>
-              <a:rPr lang="en-US"/>
-              <a:t>Michael Ball | UC Berkeley | https://c88c.org | © CC BY-NC-SA</a:t>
+              <a:rPr lang="en-US" dirty="0"/>
+              <a:t>Eric Kim | UC Berkeley | https://c88c.org | © CC BY-NC-SA</a:t>
             </a:r>
           </a:p>
         </p:txBody>
@@ -3350,8 +3349,8 @@
           </a:lstStyle>
           <a:p>
             <a:r>
-              <a:rPr lang="en-US"/>
-              <a:t>Michael Ball | UC Berkeley | https://c88c.org | © CC BY-NC-SA</a:t>
+              <a:rPr lang="en-US" dirty="0"/>
+              <a:t>Eric Kim | UC Berkeley | https://c88c.org | © CC BY-NC-SA</a:t>
             </a:r>
           </a:p>
         </p:txBody>
@@ -3752,8 +3751,8 @@
           </a:lstStyle>
           <a:p>
             <a:r>
-              <a:rPr lang="en-US"/>
-              <a:t>Michael Ball | UC Berkeley | https://c88c.org | © CC BY-NC-SA</a:t>
+              <a:rPr lang="en-US" dirty="0"/>
+              <a:t>Eric Kim | UC Berkeley | https://c88c.org | © CC BY-NC-SA</a:t>
             </a:r>
           </a:p>
         </p:txBody>
@@ -3909,8 +3908,8 @@
           </a:lstStyle>
           <a:p>
             <a:r>
-              <a:rPr lang="en-US"/>
-              <a:t>Michael Ball | UC Berkeley | https://c88c.org | © CC BY-NC-SA</a:t>
+              <a:rPr lang="en-US" dirty="0"/>
+              <a:t>Eric Kim | UC Berkeley | https://c88c.org | © CC BY-NC-SA</a:t>
             </a:r>
           </a:p>
         </p:txBody>
@@ -4099,7 +4098,7 @@
           <a:p>
             <a:r>
               <a:rPr lang="en-US" dirty="0"/>
-              <a:t>Michael Ball | UC Berkeley | https://c88c.org | © CC BY-NC-SA</a:t>
+              <a:t>Eric Kim | UC Berkeley | https://c88c.org | © CC BY-NC-SA</a:t>
             </a:r>
           </a:p>
         </p:txBody>
@@ -4366,7 +4365,7 @@
           <a:p>
             <a:r>
               <a:rPr lang="en-US" dirty="0"/>
-              <a:t>Michael Ball | UC Berkeley | https://c88c.org | © CC BY-NC-SA</a:t>
+              <a:t>Eric Kim | UC Berkeley | https://c88c.org | © CC BY-NC-SA</a:t>
             </a:r>
           </a:p>
         </p:txBody>
@@ -4768,7 +4767,7 @@
           <a:p>
             <a:r>
               <a:rPr lang="en-US" dirty="0"/>
-              <a:t>Michael Ball | UC Berkeley | https://c88c.org | © CC BY-NC-SA</a:t>
+              <a:t>Eric Kim | UC Berkeley | https://c88c.org | © CC BY-NC-SA</a:t>
             </a:r>
           </a:p>
         </p:txBody>
@@ -5170,7 +5169,7 @@
           <a:p>
             <a:r>
               <a:rPr lang="en-US" dirty="0"/>
-              <a:t>Michael Ball | UC Berkeley | https://c88c.org | © CC BY-NC-SA</a:t>
+              <a:t>Eric Kim | UC Berkeley | https://c88c.org | © CC BY-NC-SA</a:t>
             </a:r>
           </a:p>
         </p:txBody>
@@ -5240,7 +5239,7 @@
           </a:ln>
           <a:extLst>
             <a:ext uri="{909E8E84-426E-40dd-AFC4-6F175D3DCCD1}">
-              <a14:hiddenFill xmlns="" xmlns:a14="http://schemas.microsoft.com/office/drawing/2010/main">
+              <a14:hiddenFill xmlns:a14="http://schemas.microsoft.com/office/drawing/2010/main" xmlns="">
                 <a:noFill/>
               </a14:hiddenFill>
             </a:ext>
@@ -5362,14 +5361,14 @@
           </a:ln>
           <a:extLst>
             <a:ext uri="{909E8E84-426E-40dd-AFC4-6F175D3DCCD1}">
-              <a14:hiddenFill xmlns="" xmlns:a14="http://schemas.microsoft.com/office/drawing/2010/main">
+              <a14:hiddenFill xmlns:a14="http://schemas.microsoft.com/office/drawing/2010/main" xmlns="">
                 <a:solidFill>
                   <a:srgbClr val="FFFFFF"/>
                 </a:solidFill>
               </a14:hiddenFill>
             </a:ext>
             <a:ext uri="{91240B29-F687-4f45-9708-019B960494DF}">
-              <a14:hiddenLine xmlns="" xmlns:a14="http://schemas.microsoft.com/office/drawing/2010/main" w="9525">
+              <a14:hiddenLine xmlns:a14="http://schemas.microsoft.com/office/drawing/2010/main" xmlns="" w="9525">
                 <a:solidFill>
                   <a:srgbClr val="000000"/>
                 </a:solidFill>
@@ -5379,7 +5378,7 @@
               </a14:hiddenLine>
             </a:ext>
             <a:ext uri="{FAA26D3D-D897-4be2-8F04-BA451C77F1D7}">
-              <ma14:placeholderFlag xmlns="" xmlns:ma14="http://schemas.microsoft.com/office/mac/drawingml/2011/main" val="1"/>
+              <ma14:placeholderFlag xmlns:ma14="http://schemas.microsoft.com/office/mac/drawingml/2011/main" xmlns="" val="1"/>
             </a:ext>
           </a:extLst>
         </p:spPr>
@@ -5875,7 +5874,7 @@
           <a:p>
             <a:r>
               <a:rPr lang="en-US" dirty="0"/>
-              <a:t>Michael Ball | UC Berkeley | https://c88c.org | © CC BY-NC-SA</a:t>
+              <a:t>Eric Kim | UC Berkeley | https://c88c.org | © CC BY-NC-SA</a:t>
             </a:r>
           </a:p>
         </p:txBody>
@@ -5937,7 +5936,7 @@
           </a:ln>
           <a:extLst>
             <a:ext uri="{909E8E84-426E-40dd-AFC4-6F175D3DCCD1}">
-              <a14:hiddenFill xmlns="" xmlns:a14="http://schemas.microsoft.com/office/drawing/2010/main">
+              <a14:hiddenFill xmlns:a14="http://schemas.microsoft.com/office/drawing/2010/main" xmlns="">
                 <a:noFill/>
               </a14:hiddenFill>
             </a:ext>
@@ -5982,14 +5981,14 @@
           </a:ln>
           <a:extLst>
             <a:ext uri="{909E8E84-426E-40dd-AFC4-6F175D3DCCD1}">
-              <a14:hiddenFill xmlns="" xmlns:a14="http://schemas.microsoft.com/office/drawing/2010/main">
+              <a14:hiddenFill xmlns:a14="http://schemas.microsoft.com/office/drawing/2010/main" xmlns="">
                 <a:solidFill>
                   <a:srgbClr val="FFFFFF"/>
                 </a:solidFill>
               </a14:hiddenFill>
             </a:ext>
             <a:ext uri="{91240B29-F687-4f45-9708-019B960494DF}">
-              <a14:hiddenLine xmlns="" xmlns:a14="http://schemas.microsoft.com/office/drawing/2010/main" w="9525">
+              <a14:hiddenLine xmlns:a14="http://schemas.microsoft.com/office/drawing/2010/main" xmlns="" w="9525">
                 <a:solidFill>
                   <a:srgbClr val="000000"/>
                 </a:solidFill>
@@ -6097,14 +6096,14 @@
           </a:ln>
           <a:extLst>
             <a:ext uri="{909E8E84-426E-40dd-AFC4-6F175D3DCCD1}">
-              <a14:hiddenFill xmlns="" xmlns:a14="http://schemas.microsoft.com/office/drawing/2010/main">
+              <a14:hiddenFill xmlns:a14="http://schemas.microsoft.com/office/drawing/2010/main" xmlns="">
                 <a:solidFill>
                   <a:srgbClr val="FFFFFF"/>
                 </a:solidFill>
               </a14:hiddenFill>
             </a:ext>
             <a:ext uri="{91240B29-F687-4f45-9708-019B960494DF}">
-              <a14:hiddenLine xmlns="" xmlns:a14="http://schemas.microsoft.com/office/drawing/2010/main" w="9525">
+              <a14:hiddenLine xmlns:a14="http://schemas.microsoft.com/office/drawing/2010/main" xmlns="" w="9525">
                 <a:solidFill>
                   <a:srgbClr val="000000"/>
                 </a:solidFill>
@@ -6114,7 +6113,7 @@
               </a14:hiddenLine>
             </a:ext>
             <a:ext uri="{FAA26D3D-D897-4be2-8F04-BA451C77F1D7}">
-              <ma14:placeholderFlag xmlns="" xmlns:ma14="http://schemas.microsoft.com/office/mac/drawingml/2011/main" val="1"/>
+              <ma14:placeholderFlag xmlns:ma14="http://schemas.microsoft.com/office/mac/drawingml/2011/main" xmlns="" val="1"/>
             </a:ext>
           </a:extLst>
         </p:spPr>
@@ -6376,7 +6375,7 @@
                 <a:ea typeface="Open Sans Light" panose="020B0606030504020204" pitchFamily="34" charset="0"/>
                 <a:cs typeface="Open Sans Light" panose="020B0606030504020204" pitchFamily="34" charset="0"/>
               </a:rPr>
-              <a:t>Michael Ball</a:t>
+              <a:t>Eric Kim</a:t>
             </a:r>
           </a:p>
         </p:txBody>
@@ -6462,14 +6461,14 @@
           </a:ln>
           <a:extLst>
             <a:ext uri="{909E8E84-426E-40dd-AFC4-6F175D3DCCD1}">
-              <a14:hiddenFill xmlns="" xmlns:a14="http://schemas.microsoft.com/office/drawing/2010/main">
+              <a14:hiddenFill xmlns:a14="http://schemas.microsoft.com/office/drawing/2010/main" xmlns="">
                 <a:solidFill>
                   <a:srgbClr val="FFFFFF"/>
                 </a:solidFill>
               </a14:hiddenFill>
             </a:ext>
             <a:ext uri="{91240B29-F687-4f45-9708-019B960494DF}">
-              <a14:hiddenLine xmlns="" xmlns:a14="http://schemas.microsoft.com/office/drawing/2010/main" w="9525">
+              <a14:hiddenLine xmlns:a14="http://schemas.microsoft.com/office/drawing/2010/main" xmlns="" w="9525">
                 <a:solidFill>
                   <a:srgbClr val="000000"/>
                 </a:solidFill>
@@ -6479,7 +6478,7 @@
               </a14:hiddenLine>
             </a:ext>
             <a:ext uri="{FAA26D3D-D897-4be2-8F04-BA451C77F1D7}">
-              <ma14:placeholderFlag xmlns="" xmlns:ma14="http://schemas.microsoft.com/office/mac/drawingml/2011/main" val="1"/>
+              <ma14:placeholderFlag xmlns:ma14="http://schemas.microsoft.com/office/mac/drawingml/2011/main" xmlns="" val="1"/>
             </a:ext>
           </a:extLst>
         </p:spPr>
@@ -6662,7 +6661,7 @@
               <a:rPr lang="en-US" sz="1200" b="0" i="0" baseline="0" dirty="0">
                 <a:latin typeface="FreightMicro Pro Book"/>
               </a:rPr>
-              <a:t>UC Berkeley | Computer Science 88 | Michael Ball | http://cs88.org</a:t>
+              <a:t>UC Berkeley | Computer Science 88 | Eric Kim | http://cs88.org</a:t>
             </a:r>
           </a:p>
         </p:txBody>
@@ -7540,7 +7539,7 @@
           </a:ln>
           <a:extLst>
             <a:ext uri="{909E8E84-426E-40dd-AFC4-6F175D3DCCD1}">
-              <a14:hiddenFill xmlns:a14="http://schemas.microsoft.com/office/drawing/2010/main" xmlns="">
+              <a14:hiddenFill xmlns="" xmlns:a14="http://schemas.microsoft.com/office/drawing/2010/main">
                 <a:noFill/>
               </a14:hiddenFill>
             </a:ext>
@@ -7665,14 +7664,14 @@
           </a:ln>
           <a:extLst>
             <a:ext uri="{909E8E84-426E-40dd-AFC4-6F175D3DCCD1}">
-              <a14:hiddenFill xmlns:a14="http://schemas.microsoft.com/office/drawing/2010/main" xmlns="">
+              <a14:hiddenFill xmlns="" xmlns:a14="http://schemas.microsoft.com/office/drawing/2010/main">
                 <a:solidFill>
                   <a:srgbClr val="FFFFFF"/>
                 </a:solidFill>
               </a14:hiddenFill>
             </a:ext>
             <a:ext uri="{91240B29-F687-4f45-9708-019B960494DF}">
-              <a14:hiddenLine xmlns:a14="http://schemas.microsoft.com/office/drawing/2010/main" xmlns="" w="9525">
+              <a14:hiddenLine xmlns="" xmlns:a14="http://schemas.microsoft.com/office/drawing/2010/main" w="9525">
                 <a:solidFill>
                   <a:srgbClr val="000000"/>
                 </a:solidFill>
@@ -7682,7 +7681,7 @@
               </a14:hiddenLine>
             </a:ext>
             <a:ext uri="{FAA26D3D-D897-4be2-8F04-BA451C77F1D7}">
-              <ma14:placeholderFlag xmlns:ma14="http://schemas.microsoft.com/office/mac/drawingml/2011/main" xmlns="" val="1"/>
+              <ma14:placeholderFlag xmlns="" xmlns:ma14="http://schemas.microsoft.com/office/mac/drawingml/2011/main" val="1"/>
             </a:ext>
           </a:extLst>
         </p:spPr>
@@ -8193,7 +8192,7 @@
           <a:p>
             <a:r>
               <a:rPr lang="en-US" dirty="0"/>
-              <a:t>Michael Ball | UC Berkeley | https://c88c.org | © CC BY-NC-SA</a:t>
+              <a:t>Eric Kim | UC Berkeley | https://c88c.org | © CC BY-NC-SA</a:t>
             </a:r>
           </a:p>
         </p:txBody>
@@ -8381,8 +8380,8 @@
           </a:lstStyle>
           <a:p>
             <a:r>
-              <a:rPr lang="en-US"/>
-              <a:t>Michael Ball | UC Berkeley | https://c88c.org | © CC BY-NC-SA</a:t>
+              <a:rPr lang="en-US" dirty="0"/>
+              <a:t>Eric Kim | UC Berkeley | https://c88c.org | © CC BY-NC-SA</a:t>
             </a:r>
           </a:p>
         </p:txBody>
@@ -8552,8 +8551,8 @@
           </a:lstStyle>
           <a:p>
             <a:r>
-              <a:rPr lang="en-US"/>
-              <a:t>Michael Ball | UC Berkeley | https://c88c.org | © CC BY-NC-SA</a:t>
+              <a:rPr lang="en-US" dirty="0"/>
+              <a:t>Eric Kim | UC Berkeley | https://c88c.org | © CC BY-NC-SA</a:t>
             </a:r>
           </a:p>
         </p:txBody>
@@ -8822,8 +8821,8 @@
           </a:lstStyle>
           <a:p>
             <a:r>
-              <a:rPr lang="en-US"/>
-              <a:t>Michael Ball | UC Berkeley | https://c88c.org | © CC BY-NC-SA</a:t>
+              <a:rPr lang="en-US" dirty="0"/>
+              <a:t>Eric Kim | UC Berkeley | https://c88c.org | © CC BY-NC-SA</a:t>
             </a:r>
           </a:p>
         </p:txBody>
@@ -9092,8 +9091,8 @@
           </a:lstStyle>
           <a:p>
             <a:r>
-              <a:rPr lang="en-US"/>
-              <a:t>Michael Ball | UC Berkeley | https://c88c.org | © CC BY-NC-SA</a:t>
+              <a:rPr lang="en-US" dirty="0"/>
+              <a:t>Eric Kim | UC Berkeley | https://c88c.org | © CC BY-NC-SA</a:t>
             </a:r>
           </a:p>
         </p:txBody>
@@ -9354,7 +9353,7 @@
           <a:p>
             <a:r>
               <a:rPr lang="en-US" dirty="0"/>
-              <a:t>Michael Ball | UC Berkeley | https://c88c.org | © CC BY-NC-SA</a:t>
+              <a:t>Eric Kim | UC Berkeley | https://c88c.org | © CC BY-NC-SA</a:t>
             </a:r>
           </a:p>
         </p:txBody>
@@ -9755,8 +9754,8 @@
           </a:lstStyle>
           <a:p>
             <a:r>
-              <a:rPr lang="en-US"/>
-              <a:t>Michael Ball | UC Berkeley | https://c88c.org | © CC BY-NC-SA</a:t>
+              <a:rPr lang="en-US" dirty="0"/>
+              <a:t>Eric Kim | UC Berkeley | https://c88c.org | © CC BY-NC-SA</a:t>
             </a:r>
           </a:p>
         </p:txBody>
@@ -9825,14 +9824,14 @@
           </a:ln>
           <a:extLst>
             <a:ext uri="{909E8E84-426E-40dd-AFC4-6F175D3DCCD1}">
-              <a14:hiddenFill xmlns:a14="http://schemas.microsoft.com/office/drawing/2010/main" xmlns="">
+              <a14:hiddenFill xmlns="" xmlns:a14="http://schemas.microsoft.com/office/drawing/2010/main">
                 <a:solidFill>
                   <a:srgbClr val="FFFFFF"/>
                 </a:solidFill>
               </a14:hiddenFill>
             </a:ext>
             <a:ext uri="{91240B29-F687-4f45-9708-019B960494DF}">
-              <a14:hiddenLine xmlns:a14="http://schemas.microsoft.com/office/drawing/2010/main" xmlns="" w="9525">
+              <a14:hiddenLine xmlns="" xmlns:a14="http://schemas.microsoft.com/office/drawing/2010/main" w="9525">
                 <a:solidFill>
                   <a:srgbClr val="000000"/>
                 </a:solidFill>
@@ -9842,7 +9841,7 @@
               </a14:hiddenLine>
             </a:ext>
             <a:ext uri="{FAA26D3D-D897-4be2-8F04-BA451C77F1D7}">
-              <ma14:placeholderFlag xmlns:ma14="http://schemas.microsoft.com/office/mac/drawingml/2011/main" xmlns="" val="1"/>
+              <ma14:placeholderFlag xmlns="" xmlns:ma14="http://schemas.microsoft.com/office/mac/drawingml/2011/main" val="1"/>
             </a:ext>
           </a:extLst>
         </p:spPr>
@@ -9887,14 +9886,14 @@
           </a:ln>
           <a:extLst>
             <a:ext uri="{909E8E84-426E-40dd-AFC4-6F175D3DCCD1}">
-              <a14:hiddenFill xmlns:a14="http://schemas.microsoft.com/office/drawing/2010/main" xmlns="">
+              <a14:hiddenFill xmlns="" xmlns:a14="http://schemas.microsoft.com/office/drawing/2010/main">
                 <a:solidFill>
                   <a:srgbClr val="FFFFFF"/>
                 </a:solidFill>
               </a14:hiddenFill>
             </a:ext>
             <a:ext uri="{91240B29-F687-4f45-9708-019B960494DF}">
-              <a14:hiddenLine xmlns:a14="http://schemas.microsoft.com/office/drawing/2010/main" xmlns="" w="9525">
+              <a14:hiddenLine xmlns="" xmlns:a14="http://schemas.microsoft.com/office/drawing/2010/main" w="9525">
                 <a:solidFill>
                   <a:srgbClr val="000000"/>
                 </a:solidFill>
@@ -9904,7 +9903,7 @@
               </a14:hiddenLine>
             </a:ext>
             <a:ext uri="{FAA26D3D-D897-4be2-8F04-BA451C77F1D7}">
-              <ma14:placeholderFlag xmlns:ma14="http://schemas.microsoft.com/office/mac/drawingml/2011/main" xmlns="" val="1"/>
+              <ma14:placeholderFlag xmlns="" xmlns:ma14="http://schemas.microsoft.com/office/mac/drawingml/2011/main" val="1"/>
             </a:ext>
           </a:extLst>
         </p:spPr>
@@ -9994,7 +9993,7 @@
           <a:p>
             <a:r>
               <a:rPr lang="en-US" dirty="0"/>
-              <a:t>Michael Ball | UC Berkeley | https://c88c.org | © CC BY-NC-SA</a:t>
+              <a:t>Eric Kim | UC Berkeley | https://c88c.org | © CC BY-NC-SA</a:t>
             </a:r>
           </a:p>
         </p:txBody>
@@ -10550,6 +10549,45 @@
           </a:p>
         </p:txBody>
       </p:sp>
+      <p:sp>
+        <p:nvSpPr>
+          <p:cNvPr id="4" name="Subtitle 2">
+            <a:extLst>
+              <a:ext uri="{FF2B5EF4-FFF2-40B4-BE49-F238E27FC236}">
+                <a16:creationId xmlns:a16="http://schemas.microsoft.com/office/drawing/2014/main" id="{25EE25EA-25C1-B07F-4129-0396889A9890}"/>
+              </a:ext>
+            </a:extLst>
+          </p:cNvPr>
+          <p:cNvSpPr>
+            <a:spLocks noGrp="1"/>
+          </p:cNvSpPr>
+          <p:nvPr>
+            <p:ph type="subTitle" idx="1"/>
+          </p:nvPr>
+        </p:nvSpPr>
+        <p:spPr>
+          <a:xfrm>
+            <a:off x="2324100" y="3886200"/>
+            <a:ext cx="7543800" cy="990600"/>
+          </a:xfrm>
+        </p:spPr>
+        <p:txBody>
+          <a:bodyPr/>
+          <a:lstStyle/>
+          <a:p>
+            <a:r>
+              <a:rPr lang="en-US" sz="2000" dirty="0"/>
+              <a:t>Week 6, Summer 2024. 7/24 (Wed)</a:t>
+            </a:r>
+          </a:p>
+          <a:p>
+            <a:r>
+              <a:rPr lang="en-US" sz="2000" dirty="0"/>
+              <a:t>Lecture 20</a:t>
+            </a:r>
+          </a:p>
+        </p:txBody>
+      </p:sp>
     </p:spTree>
     <p:extLst>
       <p:ext uri="{BB962C8B-B14F-4D97-AF65-F5344CB8AC3E}">
@@ -10666,10 +10704,9 @@
           <a:lstStyle/>
           <a:p>
             <a:r>
-              <a:rPr lang="en-US"/>
-              <a:t>Michael Ball | UC Berkeley | https://c88c.org | © CC BY-NC-SA</a:t>
-            </a:r>
-            <a:endParaRPr lang="en-US" dirty="0"/>
+              <a:rPr lang="en-US" dirty="0"/>
+              <a:t>Eric Kim | UC Berkeley | https://c88c.org | © CC BY-NC-SA</a:t>
+            </a:r>
           </a:p>
         </p:txBody>
       </p:sp>
@@ -10910,10 +10947,148 @@
           </a:p>
         </p:txBody>
       </p:sp>
+      <p:sp>
+        <p:nvSpPr>
+          <p:cNvPr id="2" name="Rectangle 1">
+            <a:extLst>
+              <a:ext uri="{FF2B5EF4-FFF2-40B4-BE49-F238E27FC236}">
+                <a16:creationId xmlns:a16="http://schemas.microsoft.com/office/drawing/2014/main" id="{240D028A-9571-5406-6097-D7D854805353}"/>
+              </a:ext>
+            </a:extLst>
+          </p:cNvPr>
+          <p:cNvSpPr/>
+          <p:nvPr/>
+        </p:nvSpPr>
+        <p:spPr bwMode="auto">
+          <a:xfrm>
+            <a:off x="6576832" y="3657600"/>
+            <a:ext cx="949142" cy="1911927"/>
+          </a:xfrm>
+          <a:prstGeom prst="rect">
+            <a:avLst/>
+          </a:prstGeom>
+          <a:noFill/>
+          <a:ln w="31750" cap="flat" cmpd="sng" algn="ctr">
+            <a:solidFill>
+              <a:schemeClr val="accent2"/>
+            </a:solidFill>
+            <a:prstDash val="solid"/>
+            <a:round/>
+            <a:headEnd type="none" w="sm" len="sm"/>
+            <a:tailEnd type="none" w="sm" len="sm"/>
+          </a:ln>
+          <a:effectLst/>
+        </p:spPr>
+        <p:txBody>
+          <a:bodyPr vert="horz" wrap="square" lIns="91440" tIns="45720" rIns="91440" bIns="45720" numCol="1" rtlCol="0" anchor="t" anchorCtr="0" compatLnSpc="1">
+            <a:prstTxWarp prst="textNoShape">
+              <a:avLst/>
+            </a:prstTxWarp>
+          </a:bodyPr>
+          <a:lstStyle/>
+          <a:p>
+            <a:pPr marL="0" marR="0" indent="0" algn="l" defTabSz="914400" rtl="0" eaLnBrk="0" fontAlgn="base" latinLnBrk="0" hangingPunct="0">
+              <a:lnSpc>
+                <a:spcPct val="100000"/>
+              </a:lnSpc>
+              <a:spcBef>
+                <a:spcPct val="0"/>
+              </a:spcBef>
+              <a:spcAft>
+                <a:spcPct val="0"/>
+              </a:spcAft>
+              <a:buClrTx/>
+              <a:buSzTx/>
+              <a:buFontTx/>
+              <a:buNone/>
+              <a:tabLst/>
+            </a:pPr>
+            <a:endParaRPr kumimoji="0" lang="en-US" sz="1800" b="0" i="0" u="none" strike="noStrike" cap="none" normalizeH="0" baseline="0">
+              <a:ln>
+                <a:noFill/>
+              </a:ln>
+              <a:solidFill>
+                <a:schemeClr val="tx1"/>
+              </a:solidFill>
+              <a:effectLst/>
+              <a:latin typeface="Arial" charset="0"/>
+            </a:endParaRPr>
+          </a:p>
+        </p:txBody>
+      </p:sp>
+      <p:sp>
+        <p:nvSpPr>
+          <p:cNvPr id="3" name="Rectangle 2">
+            <a:extLst>
+              <a:ext uri="{FF2B5EF4-FFF2-40B4-BE49-F238E27FC236}">
+                <a16:creationId xmlns:a16="http://schemas.microsoft.com/office/drawing/2014/main" id="{5726A146-CF79-C8BD-F5F4-6C170A99F793}"/>
+              </a:ext>
+            </a:extLst>
+          </p:cNvPr>
+          <p:cNvSpPr/>
+          <p:nvPr/>
+        </p:nvSpPr>
+        <p:spPr bwMode="auto">
+          <a:xfrm>
+            <a:off x="5257800" y="3810000"/>
+            <a:ext cx="1228673" cy="1759527"/>
+          </a:xfrm>
+          <a:prstGeom prst="rect">
+            <a:avLst/>
+          </a:prstGeom>
+          <a:noFill/>
+          <a:ln w="31750" cap="flat" cmpd="sng" algn="ctr">
+            <a:solidFill>
+              <a:schemeClr val="accent2"/>
+            </a:solidFill>
+            <a:prstDash val="solid"/>
+            <a:round/>
+            <a:headEnd type="none" w="sm" len="sm"/>
+            <a:tailEnd type="none" w="sm" len="sm"/>
+          </a:ln>
+          <a:effectLst/>
+        </p:spPr>
+        <p:txBody>
+          <a:bodyPr vert="horz" wrap="square" lIns="91440" tIns="45720" rIns="91440" bIns="45720" numCol="1" rtlCol="0" anchor="t" anchorCtr="0" compatLnSpc="1">
+            <a:prstTxWarp prst="textNoShape">
+              <a:avLst/>
+            </a:prstTxWarp>
+          </a:bodyPr>
+          <a:lstStyle/>
+          <a:p>
+            <a:pPr marL="0" marR="0" indent="0" algn="l" defTabSz="914400" rtl="0" eaLnBrk="0" fontAlgn="base" latinLnBrk="0" hangingPunct="0">
+              <a:lnSpc>
+                <a:spcPct val="100000"/>
+              </a:lnSpc>
+              <a:spcBef>
+                <a:spcPct val="0"/>
+              </a:spcBef>
+              <a:spcAft>
+                <a:spcPct val="0"/>
+              </a:spcAft>
+              <a:buClrTx/>
+              <a:buSzTx/>
+              <a:buFontTx/>
+              <a:buNone/>
+              <a:tabLst/>
+            </a:pPr>
+            <a:endParaRPr kumimoji="0" lang="en-US" sz="1800" b="0" i="0" u="none" strike="noStrike" cap="none" normalizeH="0" baseline="0">
+              <a:ln>
+                <a:noFill/>
+              </a:ln>
+              <a:solidFill>
+                <a:schemeClr val="tx1"/>
+              </a:solidFill>
+              <a:effectLst/>
+              <a:latin typeface="Arial" charset="0"/>
+            </a:endParaRPr>
+          </a:p>
+        </p:txBody>
+      </p:sp>
     </p:spTree>
     <p:extLst>
       <p:ext uri="{BB962C8B-B14F-4D97-AF65-F5344CB8AC3E}">
-        <p14:creationId xmlns:p14="http://schemas.microsoft.com/office/powerpoint/2010/main" val="239031561"/>
+        <p14:creationId xmlns:p14="http://schemas.microsoft.com/office/powerpoint/2010/main" val="2090606784"/>
       </p:ext>
     </p:extLst>
   </p:cSld>
@@ -10991,8 +11166,29 @@
           <a:p>
             <a:r>
               <a:rPr lang="en-US" dirty="0"/>
-              <a:t>Mostly a rhetorical question…</a:t>
-            </a:r>
+              <a:t>Leaf notes are the elements with no branches</a:t>
+            </a:r>
+          </a:p>
+          <a:p>
+            <a:r>
+              <a:rPr lang="en-US" dirty="0"/>
+              <a:t>They are </a:t>
+            </a:r>
+            <a:r>
+              <a:rPr lang="en-US" i="1" dirty="0"/>
+              <a:t>also </a:t>
+            </a:r>
+            <a:r>
+              <a:rPr lang="en-US" dirty="0"/>
+              <a:t>a Tree – this will make our recursive code simpler. </a:t>
+            </a:r>
+            <a:r>
+              <a:rPr lang="en-US" dirty="0">
+                <a:sym typeface="Wingdings" pitchFamily="2" charset="2"/>
+              </a:rPr>
+              <a:t> </a:t>
+            </a:r>
+            <a:endParaRPr lang="en-US" dirty="0"/>
           </a:p>
         </p:txBody>
       </p:sp>
@@ -11018,521 +11214,9 @@
           <a:lstStyle/>
           <a:p>
             <a:r>
-              <a:rPr lang="en-US"/>
-              <a:t>Michael Ball | UC Berkeley | https://c88c.org | © CC BY-NC-SA</a:t>
-            </a:r>
-            <a:endParaRPr lang="en-US" dirty="0"/>
-          </a:p>
-        </p:txBody>
-      </p:sp>
-      <p:pic>
-        <p:nvPicPr>
-          <p:cNvPr id="7" name="Picture 6">
-            <a:extLst>
-              <a:ext uri="{FF2B5EF4-FFF2-40B4-BE49-F238E27FC236}">
-                <a16:creationId xmlns:a16="http://schemas.microsoft.com/office/drawing/2014/main" id="{C59FE77F-C00B-79CC-08BC-C6A376995801}"/>
-              </a:ext>
-            </a:extLst>
-          </p:cNvPr>
-          <p:cNvPicPr>
-            <a:picLocks noChangeAspect="1"/>
-          </p:cNvPicPr>
-          <p:nvPr/>
-        </p:nvPicPr>
-        <p:blipFill>
-          <a:blip r:embed="rId2"/>
-          <a:stretch>
-            <a:fillRect/>
-          </a:stretch>
-        </p:blipFill>
-        <p:spPr>
-          <a:xfrm>
-            <a:off x="4009663" y="1676400"/>
-            <a:ext cx="3425952" cy="3893127"/>
-          </a:xfrm>
-          <a:prstGeom prst="rect">
-            <a:avLst/>
-          </a:prstGeom>
-        </p:spPr>
-      </p:pic>
-      <p:sp>
-        <p:nvSpPr>
-          <p:cNvPr id="9" name="Rectangle 8">
-            <a:extLst>
-              <a:ext uri="{FF2B5EF4-FFF2-40B4-BE49-F238E27FC236}">
-                <a16:creationId xmlns:a16="http://schemas.microsoft.com/office/drawing/2014/main" id="{A3D525F9-5CC2-641D-EBE8-C91B0CCEE21E}"/>
-              </a:ext>
-            </a:extLst>
-          </p:cNvPr>
-          <p:cNvSpPr/>
-          <p:nvPr/>
-        </p:nvSpPr>
-        <p:spPr bwMode="auto">
-          <a:xfrm>
-            <a:off x="3810000" y="1589482"/>
-            <a:ext cx="3962400" cy="4201717"/>
-          </a:xfrm>
-          <a:prstGeom prst="rect">
-            <a:avLst/>
-          </a:prstGeom>
-          <a:noFill/>
-          <a:ln w="31750" cap="flat" cmpd="sng" algn="ctr">
-            <a:solidFill>
-              <a:schemeClr val="tx1"/>
-            </a:solidFill>
-            <a:prstDash val="solid"/>
-            <a:round/>
-            <a:headEnd type="none" w="sm" len="sm"/>
-            <a:tailEnd type="none" w="sm" len="sm"/>
-          </a:ln>
-          <a:effectLst/>
-        </p:spPr>
-        <p:txBody>
-          <a:bodyPr vert="horz" wrap="square" lIns="91440" tIns="45720" rIns="91440" bIns="45720" numCol="1" rtlCol="0" anchor="t" anchorCtr="0" compatLnSpc="1">
-            <a:prstTxWarp prst="textNoShape">
-              <a:avLst/>
-            </a:prstTxWarp>
-          </a:bodyPr>
-          <a:lstStyle/>
-          <a:p>
-            <a:pPr marL="0" marR="0" indent="0" algn="l" defTabSz="914400" rtl="0" eaLnBrk="0" fontAlgn="base" latinLnBrk="0" hangingPunct="0">
-              <a:lnSpc>
-                <a:spcPct val="100000"/>
-              </a:lnSpc>
-              <a:spcBef>
-                <a:spcPct val="0"/>
-              </a:spcBef>
-              <a:spcAft>
-                <a:spcPct val="0"/>
-              </a:spcAft>
-              <a:buClrTx/>
-              <a:buSzTx/>
-              <a:buFontTx/>
-              <a:buNone/>
-              <a:tabLst/>
-            </a:pPr>
-            <a:endParaRPr kumimoji="0" lang="en-US" sz="1800" b="0" i="0" u="none" strike="noStrike" cap="none" normalizeH="0" baseline="0">
-              <a:ln>
-                <a:noFill/>
-              </a:ln>
-              <a:solidFill>
-                <a:schemeClr val="tx1"/>
-              </a:solidFill>
-              <a:effectLst/>
-              <a:latin typeface="Arial" charset="0"/>
-            </a:endParaRPr>
-          </a:p>
-        </p:txBody>
-      </p:sp>
-      <p:sp>
-        <p:nvSpPr>
-          <p:cNvPr id="13" name="Rectangle 12">
-            <a:extLst>
-              <a:ext uri="{FF2B5EF4-FFF2-40B4-BE49-F238E27FC236}">
-                <a16:creationId xmlns:a16="http://schemas.microsoft.com/office/drawing/2014/main" id="{9EBCD664-411C-9633-A27B-0CED5F61A463}"/>
-              </a:ext>
-            </a:extLst>
-          </p:cNvPr>
-          <p:cNvSpPr/>
-          <p:nvPr/>
-        </p:nvSpPr>
-        <p:spPr bwMode="auto">
-          <a:xfrm>
-            <a:off x="3919305" y="2774045"/>
-            <a:ext cx="2633895" cy="2906318"/>
-          </a:xfrm>
-          <a:prstGeom prst="rect">
-            <a:avLst/>
-          </a:prstGeom>
-          <a:noFill/>
-          <a:ln w="31750" cap="flat" cmpd="sng" algn="ctr">
-            <a:solidFill>
-              <a:schemeClr val="accent1"/>
-            </a:solidFill>
-            <a:prstDash val="solid"/>
-            <a:round/>
-            <a:headEnd type="none" w="sm" len="sm"/>
-            <a:tailEnd type="none" w="sm" len="sm"/>
-          </a:ln>
-          <a:effectLst/>
-        </p:spPr>
-        <p:txBody>
-          <a:bodyPr vert="horz" wrap="square" lIns="91440" tIns="45720" rIns="91440" bIns="45720" numCol="1" rtlCol="0" anchor="t" anchorCtr="0" compatLnSpc="1">
-            <a:prstTxWarp prst="textNoShape">
-              <a:avLst/>
-            </a:prstTxWarp>
-          </a:bodyPr>
-          <a:lstStyle/>
-          <a:p>
-            <a:pPr marL="0" marR="0" indent="0" algn="l" defTabSz="914400" rtl="0" eaLnBrk="0" fontAlgn="base" latinLnBrk="0" hangingPunct="0">
-              <a:lnSpc>
-                <a:spcPct val="100000"/>
-              </a:lnSpc>
-              <a:spcBef>
-                <a:spcPct val="0"/>
-              </a:spcBef>
-              <a:spcAft>
-                <a:spcPct val="0"/>
-              </a:spcAft>
-              <a:buClrTx/>
-              <a:buSzTx/>
-              <a:buFontTx/>
-              <a:buNone/>
-              <a:tabLst/>
-            </a:pPr>
-            <a:endParaRPr kumimoji="0" lang="en-US" sz="1800" b="0" i="0" u="none" strike="noStrike" cap="none" normalizeH="0" baseline="0">
-              <a:ln>
-                <a:noFill/>
-              </a:ln>
-              <a:solidFill>
-                <a:schemeClr val="tx1"/>
-              </a:solidFill>
-              <a:effectLst/>
-              <a:latin typeface="Arial" charset="0"/>
-            </a:endParaRPr>
-          </a:p>
-        </p:txBody>
-      </p:sp>
-      <p:sp>
-        <p:nvSpPr>
-          <p:cNvPr id="14" name="Rectangle 13">
-            <a:extLst>
-              <a:ext uri="{FF2B5EF4-FFF2-40B4-BE49-F238E27FC236}">
-                <a16:creationId xmlns:a16="http://schemas.microsoft.com/office/drawing/2014/main" id="{8AF67A5E-524E-3607-7687-45F083C256B2}"/>
-              </a:ext>
-            </a:extLst>
-          </p:cNvPr>
-          <p:cNvSpPr/>
-          <p:nvPr/>
-        </p:nvSpPr>
-        <p:spPr bwMode="auto">
-          <a:xfrm>
-            <a:off x="6576832" y="2774045"/>
-            <a:ext cx="949142" cy="2906318"/>
-          </a:xfrm>
-          <a:prstGeom prst="rect">
-            <a:avLst/>
-          </a:prstGeom>
-          <a:noFill/>
-          <a:ln w="31750" cap="flat" cmpd="sng" algn="ctr">
-            <a:solidFill>
-              <a:schemeClr val="accent1"/>
-            </a:solidFill>
-            <a:prstDash val="solid"/>
-            <a:round/>
-            <a:headEnd type="none" w="sm" len="sm"/>
-            <a:tailEnd type="none" w="sm" len="sm"/>
-          </a:ln>
-          <a:effectLst/>
-        </p:spPr>
-        <p:txBody>
-          <a:bodyPr vert="horz" wrap="square" lIns="91440" tIns="45720" rIns="91440" bIns="45720" numCol="1" rtlCol="0" anchor="t" anchorCtr="0" compatLnSpc="1">
-            <a:prstTxWarp prst="textNoShape">
-              <a:avLst/>
-            </a:prstTxWarp>
-          </a:bodyPr>
-          <a:lstStyle/>
-          <a:p>
-            <a:pPr marL="0" marR="0" indent="0" algn="l" defTabSz="914400" rtl="0" eaLnBrk="0" fontAlgn="base" latinLnBrk="0" hangingPunct="0">
-              <a:lnSpc>
-                <a:spcPct val="100000"/>
-              </a:lnSpc>
-              <a:spcBef>
-                <a:spcPct val="0"/>
-              </a:spcBef>
-              <a:spcAft>
-                <a:spcPct val="0"/>
-              </a:spcAft>
-              <a:buClrTx/>
-              <a:buSzTx/>
-              <a:buFontTx/>
-              <a:buNone/>
-              <a:tabLst/>
-            </a:pPr>
-            <a:endParaRPr kumimoji="0" lang="en-US" sz="1800" b="0" i="0" u="none" strike="noStrike" cap="none" normalizeH="0" baseline="0">
-              <a:ln>
-                <a:noFill/>
-              </a:ln>
-              <a:solidFill>
-                <a:schemeClr val="tx1"/>
-              </a:solidFill>
-              <a:effectLst/>
-              <a:latin typeface="Arial" charset="0"/>
-            </a:endParaRPr>
-          </a:p>
-        </p:txBody>
-      </p:sp>
-      <p:sp>
-        <p:nvSpPr>
-          <p:cNvPr id="2" name="Rectangle 1">
-            <a:extLst>
-              <a:ext uri="{FF2B5EF4-FFF2-40B4-BE49-F238E27FC236}">
-                <a16:creationId xmlns:a16="http://schemas.microsoft.com/office/drawing/2014/main" id="{240D028A-9571-5406-6097-D7D854805353}"/>
-              </a:ext>
-            </a:extLst>
-          </p:cNvPr>
-          <p:cNvSpPr/>
-          <p:nvPr/>
-        </p:nvSpPr>
-        <p:spPr bwMode="auto">
-          <a:xfrm>
-            <a:off x="6576832" y="3657600"/>
-            <a:ext cx="949142" cy="1911927"/>
-          </a:xfrm>
-          <a:prstGeom prst="rect">
-            <a:avLst/>
-          </a:prstGeom>
-          <a:noFill/>
-          <a:ln w="31750" cap="flat" cmpd="sng" algn="ctr">
-            <a:solidFill>
-              <a:schemeClr val="accent2"/>
-            </a:solidFill>
-            <a:prstDash val="solid"/>
-            <a:round/>
-            <a:headEnd type="none" w="sm" len="sm"/>
-            <a:tailEnd type="none" w="sm" len="sm"/>
-          </a:ln>
-          <a:effectLst/>
-        </p:spPr>
-        <p:txBody>
-          <a:bodyPr vert="horz" wrap="square" lIns="91440" tIns="45720" rIns="91440" bIns="45720" numCol="1" rtlCol="0" anchor="t" anchorCtr="0" compatLnSpc="1">
-            <a:prstTxWarp prst="textNoShape">
-              <a:avLst/>
-            </a:prstTxWarp>
-          </a:bodyPr>
-          <a:lstStyle/>
-          <a:p>
-            <a:pPr marL="0" marR="0" indent="0" algn="l" defTabSz="914400" rtl="0" eaLnBrk="0" fontAlgn="base" latinLnBrk="0" hangingPunct="0">
-              <a:lnSpc>
-                <a:spcPct val="100000"/>
-              </a:lnSpc>
-              <a:spcBef>
-                <a:spcPct val="0"/>
-              </a:spcBef>
-              <a:spcAft>
-                <a:spcPct val="0"/>
-              </a:spcAft>
-              <a:buClrTx/>
-              <a:buSzTx/>
-              <a:buFontTx/>
-              <a:buNone/>
-              <a:tabLst/>
-            </a:pPr>
-            <a:endParaRPr kumimoji="0" lang="en-US" sz="1800" b="0" i="0" u="none" strike="noStrike" cap="none" normalizeH="0" baseline="0">
-              <a:ln>
-                <a:noFill/>
-              </a:ln>
-              <a:solidFill>
-                <a:schemeClr val="tx1"/>
-              </a:solidFill>
-              <a:effectLst/>
-              <a:latin typeface="Arial" charset="0"/>
-            </a:endParaRPr>
-          </a:p>
-        </p:txBody>
-      </p:sp>
-      <p:sp>
-        <p:nvSpPr>
-          <p:cNvPr id="3" name="Rectangle 2">
-            <a:extLst>
-              <a:ext uri="{FF2B5EF4-FFF2-40B4-BE49-F238E27FC236}">
-                <a16:creationId xmlns:a16="http://schemas.microsoft.com/office/drawing/2014/main" id="{5726A146-CF79-C8BD-F5F4-6C170A99F793}"/>
-              </a:ext>
-            </a:extLst>
-          </p:cNvPr>
-          <p:cNvSpPr/>
-          <p:nvPr/>
-        </p:nvSpPr>
-        <p:spPr bwMode="auto">
-          <a:xfrm>
-            <a:off x="5257800" y="3810000"/>
-            <a:ext cx="1228673" cy="1759527"/>
-          </a:xfrm>
-          <a:prstGeom prst="rect">
-            <a:avLst/>
-          </a:prstGeom>
-          <a:noFill/>
-          <a:ln w="31750" cap="flat" cmpd="sng" algn="ctr">
-            <a:solidFill>
-              <a:schemeClr val="accent2"/>
-            </a:solidFill>
-            <a:prstDash val="solid"/>
-            <a:round/>
-            <a:headEnd type="none" w="sm" len="sm"/>
-            <a:tailEnd type="none" w="sm" len="sm"/>
-          </a:ln>
-          <a:effectLst/>
-        </p:spPr>
-        <p:txBody>
-          <a:bodyPr vert="horz" wrap="square" lIns="91440" tIns="45720" rIns="91440" bIns="45720" numCol="1" rtlCol="0" anchor="t" anchorCtr="0" compatLnSpc="1">
-            <a:prstTxWarp prst="textNoShape">
-              <a:avLst/>
-            </a:prstTxWarp>
-          </a:bodyPr>
-          <a:lstStyle/>
-          <a:p>
-            <a:pPr marL="0" marR="0" indent="0" algn="l" defTabSz="914400" rtl="0" eaLnBrk="0" fontAlgn="base" latinLnBrk="0" hangingPunct="0">
-              <a:lnSpc>
-                <a:spcPct val="100000"/>
-              </a:lnSpc>
-              <a:spcBef>
-                <a:spcPct val="0"/>
-              </a:spcBef>
-              <a:spcAft>
-                <a:spcPct val="0"/>
-              </a:spcAft>
-              <a:buClrTx/>
-              <a:buSzTx/>
-              <a:buFontTx/>
-              <a:buNone/>
-              <a:tabLst/>
-            </a:pPr>
-            <a:endParaRPr kumimoji="0" lang="en-US" sz="1800" b="0" i="0" u="none" strike="noStrike" cap="none" normalizeH="0" baseline="0">
-              <a:ln>
-                <a:noFill/>
-              </a:ln>
-              <a:solidFill>
-                <a:schemeClr val="tx1"/>
-              </a:solidFill>
-              <a:effectLst/>
-              <a:latin typeface="Arial" charset="0"/>
-            </a:endParaRPr>
-          </a:p>
-        </p:txBody>
-      </p:sp>
-    </p:spTree>
-    <p:extLst>
-      <p:ext uri="{BB962C8B-B14F-4D97-AF65-F5344CB8AC3E}">
-        <p14:creationId xmlns:p14="http://schemas.microsoft.com/office/powerpoint/2010/main" val="2090606784"/>
-      </p:ext>
-    </p:extLst>
-  </p:cSld>
-  <p:clrMapOvr>
-    <a:masterClrMapping/>
-  </p:clrMapOvr>
-</p:sld>
-</file>
-
-<file path=ppt/slides/slide12.xml><?xml version="1.0" encoding="utf-8"?>
-<p:sld xmlns:a="http://schemas.openxmlformats.org/drawingml/2006/main" xmlns:r="http://schemas.openxmlformats.org/officeDocument/2006/relationships" xmlns:p="http://schemas.openxmlformats.org/presentationml/2006/main">
-  <p:cSld>
-    <p:spTree>
-      <p:nvGrpSpPr>
-        <p:cNvPr id="1" name=""/>
-        <p:cNvGrpSpPr/>
-        <p:nvPr/>
-      </p:nvGrpSpPr>
-      <p:grpSpPr>
-        <a:xfrm>
-          <a:off x="0" y="0"/>
-          <a:ext cx="0" cy="0"/>
-          <a:chOff x="0" y="0"/>
-          <a:chExt cx="0" cy="0"/>
-        </a:xfrm>
-      </p:grpSpPr>
-      <p:sp>
-        <p:nvSpPr>
-          <p:cNvPr id="5" name="Title 4">
-            <a:extLst>
-              <a:ext uri="{FF2B5EF4-FFF2-40B4-BE49-F238E27FC236}">
-                <a16:creationId xmlns:a16="http://schemas.microsoft.com/office/drawing/2014/main" id="{E064E65E-4C29-1ACC-5113-D781B0FE152F}"/>
-              </a:ext>
-            </a:extLst>
-          </p:cNvPr>
-          <p:cNvSpPr>
-            <a:spLocks noGrp="1"/>
-          </p:cNvSpPr>
-          <p:nvPr>
-            <p:ph type="title"/>
-          </p:nvPr>
-        </p:nvSpPr>
-        <p:spPr/>
-        <p:txBody>
-          <a:bodyPr/>
-          <a:lstStyle/>
-          <a:p>
-            <a:r>
               <a:rPr lang="en-US" dirty="0"/>
-              <a:t>How many trees are there?</a:t>
-            </a:r>
-          </a:p>
-        </p:txBody>
-      </p:sp>
-      <p:sp>
-        <p:nvSpPr>
-          <p:cNvPr id="15" name="Content Placeholder 14">
-            <a:extLst>
-              <a:ext uri="{FF2B5EF4-FFF2-40B4-BE49-F238E27FC236}">
-                <a16:creationId xmlns:a16="http://schemas.microsoft.com/office/drawing/2014/main" id="{5C0F4F77-EFCA-C5F9-C13E-1E6B2CBAD4A9}"/>
-              </a:ext>
-            </a:extLst>
-          </p:cNvPr>
-          <p:cNvSpPr>
-            <a:spLocks noGrp="1"/>
-          </p:cNvSpPr>
-          <p:nvPr>
-            <p:ph idx="1"/>
-          </p:nvPr>
-        </p:nvSpPr>
-        <p:spPr/>
-        <p:txBody>
-          <a:bodyPr/>
-          <a:lstStyle/>
-          <a:p>
-            <a:r>
-              <a:rPr lang="en-US" dirty="0"/>
-              <a:t>Leaf notes are the elements with no branches</a:t>
-            </a:r>
-          </a:p>
-          <a:p>
-            <a:r>
-              <a:rPr lang="en-US" dirty="0"/>
-              <a:t>They are </a:t>
-            </a:r>
-            <a:r>
-              <a:rPr lang="en-US" i="1" dirty="0"/>
-              <a:t>also </a:t>
-            </a:r>
-            <a:r>
-              <a:rPr lang="en-US" dirty="0"/>
-              <a:t>a Tree – this will make our recursive code simpler. </a:t>
-            </a:r>
-            <a:r>
-              <a:rPr lang="en-US" dirty="0">
-                <a:sym typeface="Wingdings" pitchFamily="2" charset="2"/>
-              </a:rPr>
-              <a:t> </a:t>
-            </a:r>
-            <a:endParaRPr lang="en-US" dirty="0"/>
-          </a:p>
-        </p:txBody>
-      </p:sp>
-      <p:sp>
-        <p:nvSpPr>
-          <p:cNvPr id="4" name="Footer Placeholder 3">
-            <a:extLst>
-              <a:ext uri="{FF2B5EF4-FFF2-40B4-BE49-F238E27FC236}">
-                <a16:creationId xmlns:a16="http://schemas.microsoft.com/office/drawing/2014/main" id="{7100BF68-E640-C884-0D5C-181EE7DF2B93}"/>
-              </a:ext>
-            </a:extLst>
-          </p:cNvPr>
-          <p:cNvSpPr>
-            <a:spLocks noGrp="1"/>
-          </p:cNvSpPr>
-          <p:nvPr>
-            <p:ph type="ftr" sz="quarter" idx="10"/>
-          </p:nvPr>
-        </p:nvSpPr>
-        <p:spPr/>
-        <p:txBody>
-          <a:bodyPr/>
-          <a:lstStyle/>
-          <a:p>
-            <a:r>
-              <a:rPr lang="en-US"/>
-              <a:t>Michael Ball | UC Berkeley | https://c88c.org | © CC BY-NC-SA</a:t>
-            </a:r>
-            <a:endParaRPr lang="en-US" dirty="0"/>
+              <a:t>Eric Kim | UC Berkeley | https://c88c.org | © CC BY-NC-SA</a:t>
+            </a:r>
           </a:p>
         </p:txBody>
       </p:sp>
@@ -11924,7 +11608,7 @@
 </p:sld>
 </file>
 
-<file path=ppt/slides/slide13.xml><?xml version="1.0" encoding="utf-8"?>
+<file path=ppt/slides/slide12.xml><?xml version="1.0" encoding="utf-8"?>
 <p:sld xmlns:a="http://schemas.openxmlformats.org/drawingml/2006/main" xmlns:r="http://schemas.openxmlformats.org/officeDocument/2006/relationships" xmlns:p="http://schemas.openxmlformats.org/presentationml/2006/main">
   <p:cSld>
     <p:spTree>
@@ -12236,8 +11920,8 @@
           </a:lstStyle>
           <a:p>
             <a:r>
-              <a:rPr lang="en-US"/>
-              <a:t>Michael Ball | UC Berkeley | https://c88c.org | © CC BY-NC-SA</a:t>
+              <a:rPr lang="en-US" dirty="0"/>
+              <a:t>Eric Kim | UC Berkeley | https://c88c.org | © CC BY-NC-SA</a:t>
             </a:r>
           </a:p>
         </p:txBody>
@@ -12255,7 +11939,7 @@
 </p:sld>
 </file>
 
-<file path=ppt/slides/slide14.xml><?xml version="1.0" encoding="utf-8"?>
+<file path=ppt/slides/slide13.xml><?xml version="1.0" encoding="utf-8"?>
 <p:sld xmlns:a="http://schemas.openxmlformats.org/drawingml/2006/main" xmlns:r="http://schemas.openxmlformats.org/officeDocument/2006/relationships" xmlns:p="http://schemas.openxmlformats.org/presentationml/2006/main">
   <p:cSld>
     <p:spTree>
@@ -12357,6 +12041,117 @@
 </p:sld>
 </file>
 
+<file path=ppt/slides/slide14.xml><?xml version="1.0" encoding="utf-8"?>
+<p:sld xmlns:a="http://schemas.openxmlformats.org/drawingml/2006/main" xmlns:r="http://schemas.openxmlformats.org/officeDocument/2006/relationships" xmlns:p="http://schemas.openxmlformats.org/presentationml/2006/main">
+  <p:cSld>
+    <p:spTree>
+      <p:nvGrpSpPr>
+        <p:cNvPr id="1" name=""/>
+        <p:cNvGrpSpPr/>
+        <p:nvPr/>
+      </p:nvGrpSpPr>
+      <p:grpSpPr>
+        <a:xfrm>
+          <a:off x="0" y="0"/>
+          <a:ext cx="0" cy="0"/>
+          <a:chOff x="0" y="0"/>
+          <a:chExt cx="0" cy="0"/>
+        </a:xfrm>
+      </p:grpSpPr>
+      <p:sp>
+        <p:nvSpPr>
+          <p:cNvPr id="2" name="Title 1">
+            <a:extLst>
+              <a:ext uri="{FF2B5EF4-FFF2-40B4-BE49-F238E27FC236}">
+                <a16:creationId xmlns:a16="http://schemas.microsoft.com/office/drawing/2014/main" id="{36DD03F1-4F26-868A-EE1B-49F7E976D5BE}"/>
+              </a:ext>
+            </a:extLst>
+          </p:cNvPr>
+          <p:cNvSpPr>
+            <a:spLocks noGrp="1"/>
+          </p:cNvSpPr>
+          <p:nvPr>
+            <p:ph type="title"/>
+          </p:nvPr>
+        </p:nvSpPr>
+        <p:spPr/>
+        <p:txBody>
+          <a:bodyPr/>
+          <a:lstStyle/>
+          <a:p>
+            <a:r>
+              <a:rPr lang="en-US" dirty="0"/>
+              <a:t>What’s a tree? (C88C-style)</a:t>
+            </a:r>
+          </a:p>
+        </p:txBody>
+      </p:sp>
+      <p:sp>
+        <p:nvSpPr>
+          <p:cNvPr id="3" name="Content Placeholder 2">
+            <a:extLst>
+              <a:ext uri="{FF2B5EF4-FFF2-40B4-BE49-F238E27FC236}">
+                <a16:creationId xmlns:a16="http://schemas.microsoft.com/office/drawing/2014/main" id="{FEF5C3B6-E169-82EE-9C93-B8DA22AD025D}"/>
+              </a:ext>
+            </a:extLst>
+          </p:cNvPr>
+          <p:cNvSpPr>
+            <a:spLocks noGrp="1"/>
+          </p:cNvSpPr>
+          <p:nvPr>
+            <p:ph idx="1"/>
+          </p:nvPr>
+        </p:nvSpPr>
+        <p:spPr/>
+        <p:txBody>
+          <a:bodyPr/>
+          <a:lstStyle/>
+          <a:p>
+            <a:r>
+              <a:rPr lang="en-US" dirty="0"/>
+              <a:t> A tree is a list of trees!</a:t>
+            </a:r>
+          </a:p>
+          <a:p>
+            <a:r>
+              <a:rPr lang="en-US" dirty="0"/>
+              <a:t> Each tree has a node, with a value.</a:t>
+            </a:r>
+          </a:p>
+          <a:p>
+            <a:r>
+              <a:rPr lang="en-US" dirty="0"/>
+              <a:t> Each node has `branches` which are itself, trees.</a:t>
+            </a:r>
+          </a:p>
+          <a:p>
+            <a:pPr lvl="1"/>
+            <a:r>
+              <a:rPr lang="en-US" dirty="0"/>
+              <a:t> There can be zero or many branches</a:t>
+            </a:r>
+          </a:p>
+          <a:p>
+            <a:r>
+              <a:rPr lang="en-US" dirty="0"/>
+              <a:t> There is always 1 ”root” node</a:t>
+            </a:r>
+          </a:p>
+        </p:txBody>
+      </p:sp>
+    </p:spTree>
+    <p:extLst>
+      <p:ext uri="{BB962C8B-B14F-4D97-AF65-F5344CB8AC3E}">
+        <p14:creationId xmlns:p14="http://schemas.microsoft.com/office/powerpoint/2010/main" val="2322269061"/>
+      </p:ext>
+    </p:extLst>
+  </p:cSld>
+  <p:clrMapOvr>
+    <a:masterClrMapping/>
+  </p:clrMapOvr>
+</p:sld>
+</file>
+
 <file path=ppt/slides/slide15.xml><?xml version="1.0" encoding="utf-8"?>
 <p:sld xmlns:a="http://schemas.openxmlformats.org/drawingml/2006/main" xmlns:r="http://schemas.openxmlformats.org/officeDocument/2006/relationships" xmlns:p="http://schemas.openxmlformats.org/presentationml/2006/main">
   <p:cSld>
@@ -12379,7 +12174,7 @@
           <p:cNvPr id="2" name="Title 1">
             <a:extLst>
               <a:ext uri="{FF2B5EF4-FFF2-40B4-BE49-F238E27FC236}">
-                <a16:creationId xmlns:a16="http://schemas.microsoft.com/office/drawing/2014/main" id="{36DD03F1-4F26-868A-EE1B-49F7E976D5BE}"/>
+                <a16:creationId xmlns:a16="http://schemas.microsoft.com/office/drawing/2014/main" id="{D3FA3A18-19A8-1E3C-4D28-FFA5DC36B37B}"/>
               </a:ext>
             </a:extLst>
           </p:cNvPr>
@@ -12397,7 +12192,7 @@
           <a:p>
             <a:r>
               <a:rPr lang="en-US" dirty="0"/>
-              <a:t>What’s a tree? (C88C-style)</a:t>
+              <a:t>Our Simple Tree Class: A couple new methods!</a:t>
             </a:r>
           </a:p>
         </p:txBody>
@@ -12407,7 +12202,7 @@
           <p:cNvPr id="3" name="Content Placeholder 2">
             <a:extLst>
               <a:ext uri="{FF2B5EF4-FFF2-40B4-BE49-F238E27FC236}">
-                <a16:creationId xmlns:a16="http://schemas.microsoft.com/office/drawing/2014/main" id="{FEF5C3B6-E169-82EE-9C93-B8DA22AD025D}"/>
+                <a16:creationId xmlns:a16="http://schemas.microsoft.com/office/drawing/2014/main" id="{43F80B3C-10C8-0090-49D6-E50350492E1D}"/>
               </a:ext>
             </a:extLst>
           </p:cNvPr>
@@ -12418,47 +12213,429 @@
             <p:ph idx="1"/>
           </p:nvPr>
         </p:nvSpPr>
-        <p:spPr/>
+        <p:spPr>
+          <a:xfrm>
+            <a:off x="533400" y="1066800"/>
+            <a:ext cx="11430000" cy="5257800"/>
+          </a:xfrm>
+        </p:spPr>
         <p:txBody>
           <a:bodyPr/>
           <a:lstStyle/>
           <a:p>
-            <a:r>
-              <a:rPr lang="en-US" dirty="0"/>
-              <a:t> A tree is a list of trees!</a:t>
-            </a:r>
-          </a:p>
-          <a:p>
-            <a:r>
-              <a:rPr lang="en-US" dirty="0"/>
-              <a:t> Each tree has a node, with a value.</a:t>
-            </a:r>
-          </a:p>
-          <a:p>
-            <a:r>
-              <a:rPr lang="en-US" dirty="0"/>
-              <a:t> Each node has `branches` which are itself, trees.</a:t>
-            </a:r>
-          </a:p>
-          <a:p>
-            <a:pPr lvl="1"/>
-            <a:r>
-              <a:rPr lang="en-US" dirty="0"/>
-              <a:t> There can be zero or many branches</a:t>
-            </a:r>
-          </a:p>
-          <a:p>
-            <a:r>
-              <a:rPr lang="en-US" dirty="0"/>
-              <a:t> There is always 1 ”root” node</a:t>
-            </a:r>
+            <a:pPr marL="0" indent="0">
+              <a:buNone/>
+            </a:pPr>
+            <a:r>
+              <a:rPr lang="en-US" sz="1600" dirty="0">
+                <a:latin typeface="Source Code Pro" panose="020B0509030403020204" pitchFamily="49" charset="77"/>
+              </a:rPr>
+              <a:t>class Tree:</a:t>
+            </a:r>
+          </a:p>
+          <a:p>
+            <a:pPr marL="0" indent="0">
+              <a:buNone/>
+            </a:pPr>
+            <a:r>
+              <a:rPr lang="en-US" sz="1600" dirty="0">
+                <a:latin typeface="Source Code Pro" panose="020B0509030403020204" pitchFamily="49" charset="77"/>
+              </a:rPr>
+              <a:t>    def __</a:t>
+            </a:r>
+            <a:r>
+              <a:rPr lang="en-US" sz="1600" dirty="0" err="1">
+                <a:latin typeface="Source Code Pro" panose="020B0509030403020204" pitchFamily="49" charset="77"/>
+              </a:rPr>
+              <a:t>init</a:t>
+            </a:r>
+            <a:r>
+              <a:rPr lang="en-US" sz="1600" dirty="0">
+                <a:latin typeface="Source Code Pro" panose="020B0509030403020204" pitchFamily="49" charset="77"/>
+              </a:rPr>
+              <a:t>__(self, value, branches=()):</a:t>
+            </a:r>
+          </a:p>
+          <a:p>
+            <a:pPr marL="0" indent="0">
+              <a:buNone/>
+            </a:pPr>
+            <a:r>
+              <a:rPr lang="en-US" sz="1600" dirty="0">
+                <a:latin typeface="Source Code Pro" panose="020B0509030403020204" pitchFamily="49" charset="77"/>
+              </a:rPr>
+              <a:t>        </a:t>
+            </a:r>
+            <a:r>
+              <a:rPr lang="en-US" sz="1600" dirty="0" err="1">
+                <a:latin typeface="Source Code Pro" panose="020B0509030403020204" pitchFamily="49" charset="77"/>
+              </a:rPr>
+              <a:t>self.value</a:t>
+            </a:r>
+            <a:r>
+              <a:rPr lang="en-US" sz="1600" dirty="0">
+                <a:latin typeface="Source Code Pro" panose="020B0509030403020204" pitchFamily="49" charset="77"/>
+              </a:rPr>
+              <a:t> = value</a:t>
+            </a:r>
+          </a:p>
+          <a:p>
+            <a:pPr marL="0" indent="0">
+              <a:buNone/>
+            </a:pPr>
+            <a:r>
+              <a:rPr lang="en-US" sz="1600" dirty="0">
+                <a:latin typeface="Source Code Pro" panose="020B0509030403020204" pitchFamily="49" charset="77"/>
+              </a:rPr>
+              <a:t>        for branch in branches:</a:t>
+            </a:r>
+          </a:p>
+          <a:p>
+            <a:pPr marL="0" indent="0">
+              <a:buNone/>
+            </a:pPr>
+            <a:r>
+              <a:rPr lang="en-US" sz="1600" dirty="0">
+                <a:latin typeface="Source Code Pro" panose="020B0509030403020204" pitchFamily="49" charset="77"/>
+              </a:rPr>
+              <a:t>            assert </a:t>
+            </a:r>
+            <a:r>
+              <a:rPr lang="en-US" sz="1600" dirty="0" err="1">
+                <a:latin typeface="Source Code Pro" panose="020B0509030403020204" pitchFamily="49" charset="77"/>
+              </a:rPr>
+              <a:t>isinstance</a:t>
+            </a:r>
+            <a:r>
+              <a:rPr lang="en-US" sz="1600" dirty="0">
+                <a:latin typeface="Source Code Pro" panose="020B0509030403020204" pitchFamily="49" charset="77"/>
+              </a:rPr>
+              <a:t>(branch, Tree)</a:t>
+            </a:r>
+          </a:p>
+          <a:p>
+            <a:pPr marL="0" indent="0">
+              <a:buNone/>
+            </a:pPr>
+            <a:r>
+              <a:rPr lang="en-US" sz="1600" dirty="0">
+                <a:latin typeface="Source Code Pro" panose="020B0509030403020204" pitchFamily="49" charset="77"/>
+              </a:rPr>
+              <a:t>        </a:t>
+            </a:r>
+            <a:r>
+              <a:rPr lang="en-US" sz="1600" dirty="0" err="1">
+                <a:latin typeface="Source Code Pro" panose="020B0509030403020204" pitchFamily="49" charset="77"/>
+              </a:rPr>
+              <a:t>self.branches</a:t>
+            </a:r>
+            <a:r>
+              <a:rPr lang="en-US" sz="1600" dirty="0">
+                <a:latin typeface="Source Code Pro" panose="020B0509030403020204" pitchFamily="49" charset="77"/>
+              </a:rPr>
+              <a:t> = list(branches)</a:t>
+            </a:r>
+          </a:p>
+          <a:p>
+            <a:pPr marL="0" indent="0">
+              <a:buNone/>
+            </a:pPr>
+            <a:r>
+              <a:rPr lang="en-US" sz="1600" dirty="0">
+                <a:latin typeface="Source Code Pro" panose="020B0509030403020204" pitchFamily="49" charset="77"/>
+              </a:rPr>
+              <a:t>    def __</a:t>
+            </a:r>
+            <a:r>
+              <a:rPr lang="en-US" sz="1600" dirty="0" err="1">
+                <a:latin typeface="Source Code Pro" panose="020B0509030403020204" pitchFamily="49" charset="77"/>
+              </a:rPr>
+              <a:t>repr</a:t>
+            </a:r>
+            <a:r>
+              <a:rPr lang="en-US" sz="1600" dirty="0">
+                <a:latin typeface="Source Code Pro" panose="020B0509030403020204" pitchFamily="49" charset="77"/>
+              </a:rPr>
+              <a:t>__(self):</a:t>
+            </a:r>
+          </a:p>
+          <a:p>
+            <a:pPr marL="0" indent="0">
+              <a:buNone/>
+            </a:pPr>
+            <a:r>
+              <a:rPr lang="en-US" sz="1600" dirty="0">
+                <a:latin typeface="Source Code Pro" panose="020B0509030403020204" pitchFamily="49" charset="77"/>
+              </a:rPr>
+              <a:t>	</a:t>
+            </a:r>
+            <a:r>
+              <a:rPr lang="en-US" sz="1600" dirty="0" err="1">
+                <a:latin typeface="Source Code Pro" panose="020B0509030403020204" pitchFamily="49" charset="77"/>
+              </a:rPr>
+              <a:t>branches_str</a:t>
+            </a:r>
+            <a:r>
+              <a:rPr lang="en-US" sz="1600" dirty="0">
+                <a:latin typeface="Source Code Pro" panose="020B0509030403020204" pitchFamily="49" charset="77"/>
+              </a:rPr>
+              <a:t> = ''</a:t>
+            </a:r>
+          </a:p>
+          <a:p>
+            <a:pPr marL="0" indent="0">
+              <a:buNone/>
+            </a:pPr>
+            <a:r>
+              <a:rPr lang="en-US" sz="1600" dirty="0">
+                <a:latin typeface="Source Code Pro" panose="020B0509030403020204" pitchFamily="49" charset="77"/>
+              </a:rPr>
+              <a:t>        if </a:t>
+            </a:r>
+            <a:r>
+              <a:rPr lang="en-US" sz="1600" dirty="0" err="1">
+                <a:latin typeface="Source Code Pro" panose="020B0509030403020204" pitchFamily="49" charset="77"/>
+              </a:rPr>
+              <a:t>self.branches</a:t>
+            </a:r>
+            <a:r>
+              <a:rPr lang="en-US" sz="1600" dirty="0">
+                <a:latin typeface="Source Code Pro" panose="020B0509030403020204" pitchFamily="49" charset="77"/>
+              </a:rPr>
+              <a:t>:</a:t>
+            </a:r>
+          </a:p>
+          <a:p>
+            <a:pPr marL="0" indent="0">
+              <a:buNone/>
+            </a:pPr>
+            <a:r>
+              <a:rPr lang="en-US" sz="1600" dirty="0">
+                <a:latin typeface="Source Code Pro" panose="020B0509030403020204" pitchFamily="49" charset="77"/>
+              </a:rPr>
+              <a:t>            </a:t>
+            </a:r>
+            <a:r>
+              <a:rPr lang="en-US" sz="1600" dirty="0" err="1">
+                <a:latin typeface="Source Code Pro" panose="020B0509030403020204" pitchFamily="49" charset="77"/>
+              </a:rPr>
+              <a:t>branches_str</a:t>
+            </a:r>
+            <a:r>
+              <a:rPr lang="en-US" sz="1600" dirty="0">
+                <a:latin typeface="Source Code Pro" panose="020B0509030403020204" pitchFamily="49" charset="77"/>
+              </a:rPr>
+              <a:t> = ', ' + </a:t>
+            </a:r>
+            <a:r>
+              <a:rPr lang="en-US" sz="1600" dirty="0" err="1">
+                <a:latin typeface="Source Code Pro" panose="020B0509030403020204" pitchFamily="49" charset="77"/>
+              </a:rPr>
+              <a:t>repr</a:t>
+            </a:r>
+            <a:r>
+              <a:rPr lang="en-US" sz="1600" dirty="0">
+                <a:latin typeface="Source Code Pro" panose="020B0509030403020204" pitchFamily="49" charset="77"/>
+              </a:rPr>
+              <a:t>(</a:t>
+            </a:r>
+            <a:r>
+              <a:rPr lang="en-US" sz="1600" dirty="0" err="1">
+                <a:latin typeface="Source Code Pro" panose="020B0509030403020204" pitchFamily="49" charset="77"/>
+              </a:rPr>
+              <a:t>self.branches</a:t>
+            </a:r>
+            <a:r>
+              <a:rPr lang="en-US" sz="1600" dirty="0">
+                <a:latin typeface="Source Code Pro" panose="020B0509030403020204" pitchFamily="49" charset="77"/>
+              </a:rPr>
+              <a:t>)</a:t>
+            </a:r>
+          </a:p>
+          <a:p>
+            <a:pPr marL="0" indent="0">
+              <a:buNone/>
+            </a:pPr>
+            <a:r>
+              <a:rPr lang="en-US" sz="1600" dirty="0">
+                <a:latin typeface="Source Code Pro" panose="020B0509030403020204" pitchFamily="49" charset="77"/>
+              </a:rPr>
+              <a:t>        return </a:t>
+            </a:r>
+            <a:r>
+              <a:rPr lang="en-US" sz="1600" dirty="0" err="1">
+                <a:latin typeface="Source Code Pro" panose="020B0509030403020204" pitchFamily="49" charset="77"/>
+              </a:rPr>
+              <a:t>f'Tree</a:t>
+            </a:r>
+            <a:r>
+              <a:rPr lang="en-US" sz="1600" dirty="0">
+                <a:latin typeface="Source Code Pro" panose="020B0509030403020204" pitchFamily="49" charset="77"/>
+              </a:rPr>
+              <a:t>({</a:t>
+            </a:r>
+            <a:r>
+              <a:rPr lang="en-US" sz="1600" dirty="0" err="1">
+                <a:latin typeface="Source Code Pro" panose="020B0509030403020204" pitchFamily="49" charset="77"/>
+              </a:rPr>
+              <a:t>self.value</a:t>
+            </a:r>
+            <a:r>
+              <a:rPr lang="en-US" sz="1600" dirty="0">
+                <a:latin typeface="Source Code Pro" panose="020B0509030403020204" pitchFamily="49" charset="77"/>
+              </a:rPr>
+              <a:t>}{</a:t>
+            </a:r>
+            <a:r>
+              <a:rPr lang="en-US" sz="1600" dirty="0" err="1">
+                <a:latin typeface="Source Code Pro" panose="020B0509030403020204" pitchFamily="49" charset="77"/>
+              </a:rPr>
+              <a:t>braches_str</a:t>
+            </a:r>
+            <a:r>
+              <a:rPr lang="en-US" sz="1600" dirty="0">
+                <a:latin typeface="Source Code Pro" panose="020B0509030403020204" pitchFamily="49" charset="77"/>
+              </a:rPr>
+              <a:t>})'</a:t>
+            </a:r>
+          </a:p>
+          <a:p>
+            <a:pPr marL="0" indent="0">
+              <a:buNone/>
+            </a:pPr>
+            <a:r>
+              <a:rPr lang="en-US" sz="1600" dirty="0">
+                <a:latin typeface="Source Code Pro" panose="020B0509030403020204" pitchFamily="49" charset="77"/>
+              </a:rPr>
+              <a:t>    def </a:t>
+            </a:r>
+            <a:r>
+              <a:rPr lang="en-US" sz="1600" b="1" dirty="0" err="1">
+                <a:latin typeface="Source Code Pro" panose="020B0509030403020204" pitchFamily="49" charset="77"/>
+              </a:rPr>
+              <a:t>is_leaf</a:t>
+            </a:r>
+            <a:r>
+              <a:rPr lang="en-US" sz="1600" dirty="0">
+                <a:latin typeface="Source Code Pro" panose="020B0509030403020204" pitchFamily="49" charset="77"/>
+              </a:rPr>
+              <a:t>(self):</a:t>
+            </a:r>
+          </a:p>
+          <a:p>
+            <a:pPr marL="0" indent="0">
+              <a:buNone/>
+            </a:pPr>
+            <a:r>
+              <a:rPr lang="en-US" sz="1600" dirty="0">
+                <a:latin typeface="Source Code Pro" panose="020B0509030403020204" pitchFamily="49" charset="77"/>
+              </a:rPr>
+              <a:t>        return not </a:t>
+            </a:r>
+            <a:r>
+              <a:rPr lang="en-US" sz="1600" dirty="0" err="1">
+                <a:latin typeface="Source Code Pro" panose="020B0509030403020204" pitchFamily="49" charset="77"/>
+              </a:rPr>
+              <a:t>self.branches</a:t>
+            </a:r>
+            <a:r>
+              <a:rPr lang="en-US" sz="1600" dirty="0">
+                <a:latin typeface="Source Code Pro" panose="020B0509030403020204" pitchFamily="49" charset="77"/>
+              </a:rPr>
+              <a:t> </a:t>
+            </a:r>
+          </a:p>
+          <a:p>
+            <a:pPr marL="0" indent="0">
+              <a:buNone/>
+            </a:pPr>
+            <a:r>
+              <a:rPr lang="en-US" sz="1600" dirty="0">
+                <a:latin typeface="Source Code Pro" panose="020B0509030403020204" pitchFamily="49" charset="77"/>
+              </a:rPr>
+              <a:t>    def </a:t>
+            </a:r>
+            <a:r>
+              <a:rPr lang="en-US" sz="1600" b="1" dirty="0" err="1">
+                <a:latin typeface="Source Code Pro" panose="020B0509030403020204" pitchFamily="49" charset="77"/>
+              </a:rPr>
+              <a:t>add_branch</a:t>
+            </a:r>
+            <a:r>
+              <a:rPr lang="en-US" sz="1600" dirty="0">
+                <a:latin typeface="Source Code Pro" panose="020B0509030403020204" pitchFamily="49" charset="77"/>
+              </a:rPr>
+              <a:t>(self, tree):</a:t>
+            </a:r>
+          </a:p>
+          <a:p>
+            <a:pPr marL="0" indent="0">
+              <a:buNone/>
+            </a:pPr>
+            <a:r>
+              <a:rPr lang="en-US" sz="1600" dirty="0">
+                <a:latin typeface="Source Code Pro" panose="020B0509030403020204" pitchFamily="49" charset="77"/>
+              </a:rPr>
+              <a:t>        assert </a:t>
+            </a:r>
+            <a:r>
+              <a:rPr lang="en-US" sz="1600" dirty="0" err="1">
+                <a:latin typeface="Source Code Pro" panose="020B0509030403020204" pitchFamily="49" charset="77"/>
+              </a:rPr>
+              <a:t>isinstance</a:t>
+            </a:r>
+            <a:r>
+              <a:rPr lang="en-US" sz="1600" dirty="0">
+                <a:latin typeface="Source Code Pro" panose="020B0509030403020204" pitchFamily="49" charset="77"/>
+              </a:rPr>
+              <a:t>(tree, Tree), "Each branch of a Tree must be an instance of a Tree"</a:t>
+            </a:r>
+          </a:p>
+          <a:p>
+            <a:pPr marL="0" indent="0">
+              <a:buNone/>
+            </a:pPr>
+            <a:r>
+              <a:rPr lang="en-US" sz="1600" dirty="0">
+                <a:latin typeface="Source Code Pro" panose="020B0509030403020204" pitchFamily="49" charset="77"/>
+              </a:rPr>
+              <a:t>        </a:t>
+            </a:r>
+            <a:r>
+              <a:rPr lang="en-US" sz="1600" dirty="0" err="1">
+                <a:latin typeface="Source Code Pro" panose="020B0509030403020204" pitchFamily="49" charset="77"/>
+              </a:rPr>
+              <a:t>self.branches.append</a:t>
+            </a:r>
+            <a:r>
+              <a:rPr lang="en-US" sz="1600" dirty="0">
+                <a:latin typeface="Source Code Pro" panose="020B0509030403020204" pitchFamily="49" charset="77"/>
+              </a:rPr>
+              <a:t>(tree)</a:t>
+            </a:r>
+          </a:p>
+          <a:p>
+            <a:pPr marL="0" indent="0">
+              <a:buNone/>
+            </a:pPr>
+            <a:endParaRPr lang="en-US" sz="1600" dirty="0">
+              <a:latin typeface="Source Code Pro" panose="020B0509030403020204" pitchFamily="49" charset="77"/>
+            </a:endParaRPr>
+          </a:p>
+          <a:p>
+            <a:pPr marL="0" indent="0">
+              <a:buNone/>
+            </a:pPr>
+            <a:endParaRPr lang="en-US" sz="1600" dirty="0">
+              <a:latin typeface="Source Code Pro" panose="020B0509030403020204" pitchFamily="49" charset="77"/>
+            </a:endParaRPr>
           </a:p>
         </p:txBody>
       </p:sp>
     </p:spTree>
     <p:extLst>
       <p:ext uri="{BB962C8B-B14F-4D97-AF65-F5344CB8AC3E}">
-        <p14:creationId xmlns:p14="http://schemas.microsoft.com/office/powerpoint/2010/main" val="2322269061"/>
+        <p14:creationId xmlns:p14="http://schemas.microsoft.com/office/powerpoint/2010/main" val="2036101137"/>
       </p:ext>
     </p:extLst>
   </p:cSld>
@@ -12487,10 +12664,10 @@
       </p:grpSpPr>
       <p:sp>
         <p:nvSpPr>
-          <p:cNvPr id="2" name="Title 1">
+          <p:cNvPr id="6" name="Title 5">
             <a:extLst>
               <a:ext uri="{FF2B5EF4-FFF2-40B4-BE49-F238E27FC236}">
-                <a16:creationId xmlns:a16="http://schemas.microsoft.com/office/drawing/2014/main" id="{D3FA3A18-19A8-1E3C-4D28-FFA5DC36B37B}"/>
+                <a16:creationId xmlns:a16="http://schemas.microsoft.com/office/drawing/2014/main" id="{56F24FD8-3D36-BB4A-9C3D-3F83D8137025}"/>
               </a:ext>
             </a:extLst>
           </p:cNvPr>
@@ -12498,451 +12675,42 @@
             <a:spLocks noGrp="1"/>
           </p:cNvSpPr>
           <p:nvPr>
-            <p:ph type="title"/>
-          </p:nvPr>
-        </p:nvSpPr>
-        <p:spPr/>
-        <p:txBody>
-          <a:bodyPr/>
-          <a:lstStyle/>
-          <a:p>
-            <a:r>
-              <a:rPr lang="en-US" dirty="0"/>
-              <a:t>Our Simple Tree Class: A couple new methods!</a:t>
-            </a:r>
-          </a:p>
-        </p:txBody>
-      </p:sp>
-      <p:sp>
-        <p:nvSpPr>
-          <p:cNvPr id="3" name="Content Placeholder 2">
-            <a:extLst>
-              <a:ext uri="{FF2B5EF4-FFF2-40B4-BE49-F238E27FC236}">
-                <a16:creationId xmlns:a16="http://schemas.microsoft.com/office/drawing/2014/main" id="{43F80B3C-10C8-0090-49D6-E50350492E1D}"/>
-              </a:ext>
-            </a:extLst>
-          </p:cNvPr>
-          <p:cNvSpPr>
-            <a:spLocks noGrp="1"/>
-          </p:cNvSpPr>
-          <p:nvPr>
-            <p:ph idx="1"/>
+            <p:ph type="ctrTitle"/>
           </p:nvPr>
         </p:nvSpPr>
         <p:spPr>
           <a:xfrm>
-            <a:off x="533400" y="1066800"/>
-            <a:ext cx="11430000" cy="5257800"/>
+            <a:off x="2514600" y="2693987"/>
+            <a:ext cx="8458200" cy="1470025"/>
           </a:xfrm>
         </p:spPr>
         <p:txBody>
-          <a:bodyPr/>
+          <a:bodyPr>
+            <a:normAutofit fontScale="90000"/>
+          </a:bodyPr>
           <a:lstStyle/>
           <a:p>
-            <a:pPr marL="0" indent="0">
-              <a:buNone/>
-            </a:pPr>
-            <a:r>
-              <a:rPr lang="en-US" sz="1600" dirty="0">
+            <a:r>
+              <a:rPr lang="en-US" dirty="0"/>
+              <a:t>Trees:</a:t>
+            </a:r>
+            <a:br>
+              <a:rPr lang="en-US" dirty="0"/>
+            </a:br>
+            <a:r>
+              <a:rPr lang="en-US" dirty="0"/>
+              <a:t>Practice With Recursion:</a:t>
+            </a:r>
+            <a:br>
+              <a:rPr lang="en-US" dirty="0"/>
+            </a:br>
+            <a:r>
+              <a:rPr lang="en-US" dirty="0" err="1">
                 <a:latin typeface="Source Code Pro" panose="020B0509030403020204" pitchFamily="49" charset="77"/>
               </a:rPr>
-              <a:t>class Tree:</a:t>
-            </a:r>
-          </a:p>
-          <a:p>
-            <a:pPr marL="0" indent="0">
-              <a:buNone/>
-            </a:pPr>
-            <a:r>
-              <a:rPr lang="en-US" sz="1600" dirty="0">
-                <a:latin typeface="Source Code Pro" panose="020B0509030403020204" pitchFamily="49" charset="77"/>
-              </a:rPr>
-              <a:t>    def __</a:t>
-            </a:r>
-            <a:r>
-              <a:rPr lang="en-US" sz="1600" dirty="0" err="1">
-                <a:latin typeface="Source Code Pro" panose="020B0509030403020204" pitchFamily="49" charset="77"/>
-              </a:rPr>
-              <a:t>init</a:t>
-            </a:r>
-            <a:r>
-              <a:rPr lang="en-US" sz="1600" dirty="0">
-                <a:latin typeface="Source Code Pro" panose="020B0509030403020204" pitchFamily="49" charset="77"/>
-              </a:rPr>
-              <a:t>__(self, value, branches=()):</a:t>
-            </a:r>
-          </a:p>
-          <a:p>
-            <a:pPr marL="0" indent="0">
-              <a:buNone/>
-            </a:pPr>
-            <a:r>
-              <a:rPr lang="en-US" sz="1600" dirty="0">
-                <a:latin typeface="Source Code Pro" panose="020B0509030403020204" pitchFamily="49" charset="77"/>
-              </a:rPr>
-              <a:t>        </a:t>
-            </a:r>
-            <a:r>
-              <a:rPr lang="en-US" sz="1600" dirty="0" err="1">
-                <a:latin typeface="Source Code Pro" panose="020B0509030403020204" pitchFamily="49" charset="77"/>
-              </a:rPr>
-              <a:t>self.value</a:t>
-            </a:r>
-            <a:r>
-              <a:rPr lang="en-US" sz="1600" dirty="0">
-                <a:latin typeface="Source Code Pro" panose="020B0509030403020204" pitchFamily="49" charset="77"/>
-              </a:rPr>
-              <a:t> = value</a:t>
-            </a:r>
-          </a:p>
-          <a:p>
-            <a:pPr marL="0" indent="0">
-              <a:buNone/>
-            </a:pPr>
-            <a:r>
-              <a:rPr lang="en-US" sz="1600" dirty="0">
-                <a:latin typeface="Source Code Pro" panose="020B0509030403020204" pitchFamily="49" charset="77"/>
-              </a:rPr>
-              <a:t>        for branch in branches:</a:t>
-            </a:r>
-          </a:p>
-          <a:p>
-            <a:pPr marL="0" indent="0">
-              <a:buNone/>
-            </a:pPr>
-            <a:r>
-              <a:rPr lang="en-US" sz="1600" dirty="0">
-                <a:latin typeface="Source Code Pro" panose="020B0509030403020204" pitchFamily="49" charset="77"/>
-              </a:rPr>
-              <a:t>            assert </a:t>
-            </a:r>
-            <a:r>
-              <a:rPr lang="en-US" sz="1600" dirty="0" err="1">
-                <a:latin typeface="Source Code Pro" panose="020B0509030403020204" pitchFamily="49" charset="77"/>
-              </a:rPr>
-              <a:t>isinstance</a:t>
-            </a:r>
-            <a:r>
-              <a:rPr lang="en-US" sz="1600" dirty="0">
-                <a:latin typeface="Source Code Pro" panose="020B0509030403020204" pitchFamily="49" charset="77"/>
-              </a:rPr>
-              <a:t>(branch, Tree)</a:t>
-            </a:r>
-          </a:p>
-          <a:p>
-            <a:pPr marL="0" indent="0">
-              <a:buNone/>
-            </a:pPr>
-            <a:r>
-              <a:rPr lang="en-US" sz="1600" dirty="0">
-                <a:latin typeface="Source Code Pro" panose="020B0509030403020204" pitchFamily="49" charset="77"/>
-              </a:rPr>
-              <a:t>        </a:t>
-            </a:r>
-            <a:r>
-              <a:rPr lang="en-US" sz="1600" dirty="0" err="1">
-                <a:latin typeface="Source Code Pro" panose="020B0509030403020204" pitchFamily="49" charset="77"/>
-              </a:rPr>
-              <a:t>self.branches</a:t>
-            </a:r>
-            <a:r>
-              <a:rPr lang="en-US" sz="1600" dirty="0">
-                <a:latin typeface="Source Code Pro" panose="020B0509030403020204" pitchFamily="49" charset="77"/>
-              </a:rPr>
-              <a:t> = list(branches)</a:t>
-            </a:r>
-          </a:p>
-          <a:p>
-            <a:pPr marL="0" indent="0">
-              <a:buNone/>
-            </a:pPr>
-            <a:r>
-              <a:rPr lang="en-US" sz="1600" dirty="0">
-                <a:latin typeface="Source Code Pro" panose="020B0509030403020204" pitchFamily="49" charset="77"/>
-              </a:rPr>
-              <a:t>    def __</a:t>
-            </a:r>
-            <a:r>
-              <a:rPr lang="en-US" sz="1600" dirty="0" err="1">
-                <a:latin typeface="Source Code Pro" panose="020B0509030403020204" pitchFamily="49" charset="77"/>
-              </a:rPr>
-              <a:t>repr</a:t>
-            </a:r>
-            <a:r>
-              <a:rPr lang="en-US" sz="1600" dirty="0">
-                <a:latin typeface="Source Code Pro" panose="020B0509030403020204" pitchFamily="49" charset="77"/>
-              </a:rPr>
-              <a:t>__(self):</a:t>
-            </a:r>
-          </a:p>
-          <a:p>
-            <a:pPr marL="0" indent="0">
-              <a:buNone/>
-            </a:pPr>
-            <a:r>
-              <a:rPr lang="en-US" sz="1600" dirty="0">
-                <a:latin typeface="Source Code Pro" panose="020B0509030403020204" pitchFamily="49" charset="77"/>
-              </a:rPr>
-              <a:t>	</a:t>
-            </a:r>
-            <a:r>
-              <a:rPr lang="en-US" sz="1600" dirty="0" err="1">
-                <a:latin typeface="Source Code Pro" panose="020B0509030403020204" pitchFamily="49" charset="77"/>
-              </a:rPr>
-              <a:t>branches_str</a:t>
-            </a:r>
-            <a:r>
-              <a:rPr lang="en-US" sz="1600" dirty="0">
-                <a:latin typeface="Source Code Pro" panose="020B0509030403020204" pitchFamily="49" charset="77"/>
-              </a:rPr>
-              <a:t> = ''</a:t>
-            </a:r>
-          </a:p>
-          <a:p>
-            <a:pPr marL="0" indent="0">
-              <a:buNone/>
-            </a:pPr>
-            <a:r>
-              <a:rPr lang="en-US" sz="1600" dirty="0">
-                <a:latin typeface="Source Code Pro" panose="020B0509030403020204" pitchFamily="49" charset="77"/>
-              </a:rPr>
-              <a:t>        if </a:t>
-            </a:r>
-            <a:r>
-              <a:rPr lang="en-US" sz="1600" dirty="0" err="1">
-                <a:latin typeface="Source Code Pro" panose="020B0509030403020204" pitchFamily="49" charset="77"/>
-              </a:rPr>
-              <a:t>self.branches</a:t>
-            </a:r>
-            <a:r>
-              <a:rPr lang="en-US" sz="1600" dirty="0">
-                <a:latin typeface="Source Code Pro" panose="020B0509030403020204" pitchFamily="49" charset="77"/>
-              </a:rPr>
-              <a:t>:</a:t>
-            </a:r>
-          </a:p>
-          <a:p>
-            <a:pPr marL="0" indent="0">
-              <a:buNone/>
-            </a:pPr>
-            <a:r>
-              <a:rPr lang="en-US" sz="1600" dirty="0">
-                <a:latin typeface="Source Code Pro" panose="020B0509030403020204" pitchFamily="49" charset="77"/>
-              </a:rPr>
-              <a:t>            </a:t>
-            </a:r>
-            <a:r>
-              <a:rPr lang="en-US" sz="1600" dirty="0" err="1">
-                <a:latin typeface="Source Code Pro" panose="020B0509030403020204" pitchFamily="49" charset="77"/>
-              </a:rPr>
-              <a:t>branches_str</a:t>
-            </a:r>
-            <a:r>
-              <a:rPr lang="en-US" sz="1600" dirty="0">
-                <a:latin typeface="Source Code Pro" panose="020B0509030403020204" pitchFamily="49" charset="77"/>
-              </a:rPr>
-              <a:t> = ', ' + </a:t>
-            </a:r>
-            <a:r>
-              <a:rPr lang="en-US" sz="1600" dirty="0" err="1">
-                <a:latin typeface="Source Code Pro" panose="020B0509030403020204" pitchFamily="49" charset="77"/>
-              </a:rPr>
-              <a:t>repr</a:t>
-            </a:r>
-            <a:r>
-              <a:rPr lang="en-US" sz="1600" dirty="0">
-                <a:latin typeface="Source Code Pro" panose="020B0509030403020204" pitchFamily="49" charset="77"/>
-              </a:rPr>
-              <a:t>(</a:t>
-            </a:r>
-            <a:r>
-              <a:rPr lang="en-US" sz="1600" dirty="0" err="1">
-                <a:latin typeface="Source Code Pro" panose="020B0509030403020204" pitchFamily="49" charset="77"/>
-              </a:rPr>
-              <a:t>self.branches</a:t>
-            </a:r>
-            <a:r>
-              <a:rPr lang="en-US" sz="1600" dirty="0">
-                <a:latin typeface="Source Code Pro" panose="020B0509030403020204" pitchFamily="49" charset="77"/>
-              </a:rPr>
-              <a:t>)</a:t>
-            </a:r>
-          </a:p>
-          <a:p>
-            <a:pPr marL="0" indent="0">
-              <a:buNone/>
-            </a:pPr>
-            <a:r>
-              <a:rPr lang="en-US" sz="1600" dirty="0">
-                <a:latin typeface="Source Code Pro" panose="020B0509030403020204" pitchFamily="49" charset="77"/>
-              </a:rPr>
-              <a:t>        return </a:t>
-            </a:r>
-            <a:r>
-              <a:rPr lang="en-US" sz="1600" dirty="0" err="1">
-                <a:latin typeface="Source Code Pro" panose="020B0509030403020204" pitchFamily="49" charset="77"/>
-              </a:rPr>
-              <a:t>f'Tree</a:t>
-            </a:r>
-            <a:r>
-              <a:rPr lang="en-US" sz="1600" dirty="0">
-                <a:latin typeface="Source Code Pro" panose="020B0509030403020204" pitchFamily="49" charset="77"/>
-              </a:rPr>
-              <a:t>({</a:t>
-            </a:r>
-            <a:r>
-              <a:rPr lang="en-US" sz="1600" dirty="0" err="1">
-                <a:latin typeface="Source Code Pro" panose="020B0509030403020204" pitchFamily="49" charset="77"/>
-              </a:rPr>
-              <a:t>self.value</a:t>
-            </a:r>
-            <a:r>
-              <a:rPr lang="en-US" sz="1600" dirty="0">
-                <a:latin typeface="Source Code Pro" panose="020B0509030403020204" pitchFamily="49" charset="77"/>
-              </a:rPr>
-              <a:t>}{</a:t>
-            </a:r>
-            <a:r>
-              <a:rPr lang="en-US" sz="1600" dirty="0" err="1">
-                <a:latin typeface="Source Code Pro" panose="020B0509030403020204" pitchFamily="49" charset="77"/>
-              </a:rPr>
-              <a:t>braches_str</a:t>
-            </a:r>
-            <a:r>
-              <a:rPr lang="en-US" sz="1600" dirty="0">
-                <a:latin typeface="Source Code Pro" panose="020B0509030403020204" pitchFamily="49" charset="77"/>
-              </a:rPr>
-              <a:t>})'</a:t>
-            </a:r>
-          </a:p>
-          <a:p>
-            <a:pPr marL="0" indent="0">
-              <a:buNone/>
-            </a:pPr>
-            <a:r>
-              <a:rPr lang="en-US" sz="1600" dirty="0">
-                <a:latin typeface="Source Code Pro" panose="020B0509030403020204" pitchFamily="49" charset="77"/>
-              </a:rPr>
-              <a:t>    def </a:t>
-            </a:r>
-            <a:r>
-              <a:rPr lang="en-US" sz="1600" b="1" dirty="0" err="1">
-                <a:latin typeface="Source Code Pro" panose="020B0509030403020204" pitchFamily="49" charset="77"/>
-              </a:rPr>
-              <a:t>is_leaf</a:t>
-            </a:r>
-            <a:r>
-              <a:rPr lang="en-US" sz="1600" dirty="0">
-                <a:latin typeface="Source Code Pro" panose="020B0509030403020204" pitchFamily="49" charset="77"/>
-              </a:rPr>
-              <a:t>(self):</a:t>
-            </a:r>
-          </a:p>
-          <a:p>
-            <a:pPr marL="0" indent="0">
-              <a:buNone/>
-            </a:pPr>
-            <a:r>
-              <a:rPr lang="en-US" sz="1600" dirty="0">
-                <a:latin typeface="Source Code Pro" panose="020B0509030403020204" pitchFamily="49" charset="77"/>
-              </a:rPr>
-              <a:t>        return not </a:t>
-            </a:r>
-            <a:r>
-              <a:rPr lang="en-US" sz="1600" dirty="0" err="1">
-                <a:latin typeface="Source Code Pro" panose="020B0509030403020204" pitchFamily="49" charset="77"/>
-              </a:rPr>
-              <a:t>self.branches</a:t>
-            </a:r>
-            <a:r>
-              <a:rPr lang="en-US" sz="1600" dirty="0">
-                <a:latin typeface="Source Code Pro" panose="020B0509030403020204" pitchFamily="49" charset="77"/>
-              </a:rPr>
-              <a:t> </a:t>
-            </a:r>
-          </a:p>
-          <a:p>
-            <a:pPr marL="0" indent="0">
-              <a:buNone/>
-            </a:pPr>
-            <a:r>
-              <a:rPr lang="en-US" sz="1600" dirty="0">
-                <a:latin typeface="Source Code Pro" panose="020B0509030403020204" pitchFamily="49" charset="77"/>
-              </a:rPr>
-              <a:t>    def </a:t>
-            </a:r>
-            <a:r>
-              <a:rPr lang="en-US" sz="1600" b="1" dirty="0" err="1">
-                <a:latin typeface="Source Code Pro" panose="020B0509030403020204" pitchFamily="49" charset="77"/>
-              </a:rPr>
-              <a:t>add_branch</a:t>
-            </a:r>
-            <a:r>
-              <a:rPr lang="en-US" sz="1600" dirty="0">
-                <a:latin typeface="Source Code Pro" panose="020B0509030403020204" pitchFamily="49" charset="77"/>
-              </a:rPr>
-              <a:t>(self, tree):</a:t>
-            </a:r>
-          </a:p>
-          <a:p>
-            <a:pPr marL="0" indent="0">
-              <a:buNone/>
-            </a:pPr>
-            <a:r>
-              <a:rPr lang="en-US" sz="1600" dirty="0">
-                <a:latin typeface="Source Code Pro" panose="020B0509030403020204" pitchFamily="49" charset="77"/>
-              </a:rPr>
-              <a:t>        assert </a:t>
-            </a:r>
-            <a:r>
-              <a:rPr lang="en-US" sz="1600" dirty="0" err="1">
-                <a:latin typeface="Source Code Pro" panose="020B0509030403020204" pitchFamily="49" charset="77"/>
-              </a:rPr>
-              <a:t>isinstance</a:t>
-            </a:r>
-            <a:r>
-              <a:rPr lang="en-US" sz="1600" dirty="0">
-                <a:latin typeface="Source Code Pro" panose="020B0509030403020204" pitchFamily="49" charset="77"/>
-              </a:rPr>
-              <a:t>(tree, Tree), "Each branch of a Tree must be an instance of a Tree"</a:t>
-            </a:r>
-          </a:p>
-          <a:p>
-            <a:pPr marL="0" indent="0">
-              <a:buNone/>
-            </a:pPr>
-            <a:r>
-              <a:rPr lang="en-US" sz="1600" dirty="0">
-                <a:latin typeface="Source Code Pro" panose="020B0509030403020204" pitchFamily="49" charset="77"/>
-              </a:rPr>
-              <a:t>        </a:t>
-            </a:r>
-            <a:r>
-              <a:rPr lang="en-US" sz="1600" dirty="0" err="1">
-                <a:latin typeface="Source Code Pro" panose="020B0509030403020204" pitchFamily="49" charset="77"/>
-              </a:rPr>
-              <a:t>self.branches.append</a:t>
-            </a:r>
-            <a:r>
-              <a:rPr lang="en-US" sz="1600" dirty="0">
-                <a:latin typeface="Source Code Pro" panose="020B0509030403020204" pitchFamily="49" charset="77"/>
-              </a:rPr>
-              <a:t>(tree)</a:t>
-            </a:r>
-          </a:p>
-          <a:p>
-            <a:pPr marL="0" indent="0">
-              <a:buNone/>
-            </a:pPr>
-            <a:endParaRPr lang="en-US" sz="1600" dirty="0">
-              <a:latin typeface="Source Code Pro" panose="020B0509030403020204" pitchFamily="49" charset="77"/>
-            </a:endParaRPr>
-          </a:p>
-          <a:p>
-            <a:pPr marL="0" indent="0">
-              <a:buNone/>
-            </a:pPr>
-            <a:endParaRPr lang="en-US" sz="1600" dirty="0">
+              <a:t>traverse_recursive</a:t>
+            </a:r>
+            <a:endParaRPr lang="en-US" dirty="0">
               <a:latin typeface="Source Code Pro" panose="020B0509030403020204" pitchFamily="49" charset="77"/>
             </a:endParaRPr>
           </a:p>
@@ -12951,13 +12719,21 @@
     </p:spTree>
     <p:extLst>
       <p:ext uri="{BB962C8B-B14F-4D97-AF65-F5344CB8AC3E}">
-        <p14:creationId xmlns:p14="http://schemas.microsoft.com/office/powerpoint/2010/main" val="2036101137"/>
+        <p14:creationId xmlns:p14="http://schemas.microsoft.com/office/powerpoint/2010/main" val="2783609707"/>
       </p:ext>
     </p:extLst>
   </p:cSld>
   <p:clrMapOvr>
     <a:masterClrMapping/>
   </p:clrMapOvr>
+  <mc:AlternateContent xmlns:mc="http://schemas.openxmlformats.org/markup-compatibility/2006" xmlns:p14="http://schemas.microsoft.com/office/powerpoint/2010/main">
+    <mc:Choice Requires="p14">
+      <p:transition spd="slow" p14:dur="2000" advTm="109658"/>
+    </mc:Choice>
+    <mc:Fallback xmlns="">
+      <p:transition xmlns:p14="http://schemas.microsoft.com/office/powerpoint/2010/main" spd="slow" advTm="109658"/>
+    </mc:Fallback>
+  </mc:AlternateContent>
 </p:sld>
 </file>
 
@@ -12994,16 +12770,9 @@
             <p:ph type="ctrTitle"/>
           </p:nvPr>
         </p:nvSpPr>
-        <p:spPr>
-          <a:xfrm>
-            <a:off x="2514600" y="2693987"/>
-            <a:ext cx="8458200" cy="1470025"/>
-          </a:xfrm>
-        </p:spPr>
-        <p:txBody>
-          <a:bodyPr>
-            <a:normAutofit fontScale="90000"/>
-          </a:bodyPr>
+        <p:spPr/>
+        <p:txBody>
+          <a:bodyPr/>
           <a:lstStyle/>
           <a:p>
             <a:r>
@@ -13015,27 +12784,15 @@
             </a:br>
             <a:r>
               <a:rPr lang="en-US" dirty="0"/>
-              <a:t>Practice With Recursion:</a:t>
-            </a:r>
-            <a:br>
-              <a:rPr lang="en-US" dirty="0"/>
-            </a:br>
-            <a:r>
-              <a:rPr lang="en-US" dirty="0" err="1">
-                <a:latin typeface="Source Code Pro" panose="020B0509030403020204" pitchFamily="49" charset="77"/>
-              </a:rPr>
-              <a:t>traverse_recursive</a:t>
-            </a:r>
-            <a:endParaRPr lang="en-US" dirty="0">
-              <a:latin typeface="Source Code Pro" panose="020B0509030403020204" pitchFamily="49" charset="77"/>
-            </a:endParaRPr>
+              <a:t>Counting Each Node</a:t>
+            </a:r>
           </a:p>
         </p:txBody>
       </p:sp>
     </p:spTree>
     <p:extLst>
       <p:ext uri="{BB962C8B-B14F-4D97-AF65-F5344CB8AC3E}">
-        <p14:creationId xmlns:p14="http://schemas.microsoft.com/office/powerpoint/2010/main" val="2783609707"/>
+        <p14:creationId xmlns:p14="http://schemas.microsoft.com/office/powerpoint/2010/main" val="4245981062"/>
       </p:ext>
     </p:extLst>
   </p:cSld>
@@ -13072,10 +12829,10 @@
       </p:grpSpPr>
       <p:sp>
         <p:nvSpPr>
-          <p:cNvPr id="6" name="Title 5">
+          <p:cNvPr id="2" name="Title 1">
             <a:extLst>
               <a:ext uri="{FF2B5EF4-FFF2-40B4-BE49-F238E27FC236}">
-                <a16:creationId xmlns:a16="http://schemas.microsoft.com/office/drawing/2014/main" id="{56F24FD8-3D36-BB4A-9C3D-3F83D8137025}"/>
+                <a16:creationId xmlns:a16="http://schemas.microsoft.com/office/drawing/2014/main" id="{61D0E77F-C11A-8DB0-017E-8B20A01548BA}"/>
               </a:ext>
             </a:extLst>
           </p:cNvPr>
@@ -13083,7 +12840,7 @@
             <a:spLocks noGrp="1"/>
           </p:cNvSpPr>
           <p:nvPr>
-            <p:ph type="ctrTitle"/>
+            <p:ph type="title"/>
           </p:nvPr>
         </p:nvSpPr>
         <p:spPr/>
@@ -13093,14 +12850,102 @@
           <a:p>
             <a:r>
               <a:rPr lang="en-US" dirty="0"/>
-              <a:t>Trees:</a:t>
-            </a:r>
-            <a:br>
+              <a:t>How do we count nodes?</a:t>
+            </a:r>
+          </a:p>
+        </p:txBody>
+      </p:sp>
+      <p:sp>
+        <p:nvSpPr>
+          <p:cNvPr id="3" name="Content Placeholder 2">
+            <a:extLst>
+              <a:ext uri="{FF2B5EF4-FFF2-40B4-BE49-F238E27FC236}">
+                <a16:creationId xmlns:a16="http://schemas.microsoft.com/office/drawing/2014/main" id="{6C4491D8-6DBA-A18A-6D92-1C7A072A9AF1}"/>
+              </a:ext>
+            </a:extLst>
+          </p:cNvPr>
+          <p:cNvSpPr>
+            <a:spLocks noGrp="1"/>
+          </p:cNvSpPr>
+          <p:nvPr>
+            <p:ph idx="1"/>
+          </p:nvPr>
+        </p:nvSpPr>
+        <p:spPr/>
+        <p:txBody>
+          <a:bodyPr/>
+          <a:lstStyle/>
+          <a:p>
+            <a:r>
               <a:rPr lang="en-US" dirty="0"/>
-            </a:br>
+              <a:t> The "root" or top of the tree is one node.</a:t>
+            </a:r>
+          </a:p>
+          <a:p>
+            <a:pPr lvl="1"/>
             <a:r>
               <a:rPr lang="en-US" dirty="0"/>
-              <a:t>Counting Each Node</a:t>
+              <a:t> (We assume we can't have a tree of 0 nodes!)</a:t>
+            </a:r>
+          </a:p>
+          <a:p>
+            <a:r>
+              <a:rPr lang="en-US" dirty="0"/>
+              <a:t> For each subtree we… Count the nodes!</a:t>
+            </a:r>
+          </a:p>
+          <a:p>
+            <a:pPr lvl="1"/>
+            <a:r>
+              <a:rPr lang="en-US" dirty="0"/>
+              <a:t> Doesn't this sound like recursion?</a:t>
+            </a:r>
+          </a:p>
+          <a:p>
+            <a:r>
+              <a:rPr lang="en-US" dirty="0"/>
+              <a:t> Hard Part: How do we group the results of recursion?</a:t>
+            </a:r>
+          </a:p>
+          <a:p>
+            <a:r>
+              <a:rPr lang="en-US" dirty="0"/>
+              <a:t> Remember our recursive algorithm:</a:t>
+            </a:r>
+          </a:p>
+          <a:p>
+            <a:pPr lvl="1"/>
+            <a:r>
+              <a:rPr lang="en-US" dirty="0"/>
+              <a:t> Base case</a:t>
+            </a:r>
+          </a:p>
+          <a:p>
+            <a:pPr lvl="1"/>
+            <a:r>
+              <a:rPr lang="en-US" dirty="0"/>
+              <a:t> Recursive Case:</a:t>
+            </a:r>
+          </a:p>
+          <a:p>
+            <a:pPr lvl="2"/>
+            <a:r>
+              <a:rPr lang="en-US" dirty="0"/>
+              <a:t> Divide</a:t>
+            </a:r>
+          </a:p>
+          <a:p>
+            <a:pPr lvl="2"/>
+            <a:r>
+              <a:rPr lang="en-US" dirty="0"/>
+              <a:t> Invoke</a:t>
+            </a:r>
+          </a:p>
+          <a:p>
+            <a:pPr lvl="2"/>
+            <a:r>
+              <a:rPr lang="en-US" dirty="0"/>
+              <a:t> Combine</a:t>
             </a:r>
           </a:p>
         </p:txBody>
@@ -13108,21 +12953,13 @@
     </p:spTree>
     <p:extLst>
       <p:ext uri="{BB962C8B-B14F-4D97-AF65-F5344CB8AC3E}">
-        <p14:creationId xmlns:p14="http://schemas.microsoft.com/office/powerpoint/2010/main" val="4245981062"/>
+        <p14:creationId xmlns:p14="http://schemas.microsoft.com/office/powerpoint/2010/main" val="2473078698"/>
       </p:ext>
     </p:extLst>
   </p:cSld>
   <p:clrMapOvr>
     <a:masterClrMapping/>
   </p:clrMapOvr>
-  <mc:AlternateContent xmlns:mc="http://schemas.openxmlformats.org/markup-compatibility/2006" xmlns:p14="http://schemas.microsoft.com/office/powerpoint/2010/main">
-    <mc:Choice Requires="p14">
-      <p:transition spd="slow" p14:dur="2000" advTm="109658"/>
-    </mc:Choice>
-    <mc:Fallback xmlns="">
-      <p:transition xmlns:p14="http://schemas.microsoft.com/office/powerpoint/2010/main" spd="slow" advTm="109658"/>
-    </mc:Fallback>
-  </mc:AlternateContent>
 </p:sld>
 </file>
 
@@ -13148,7 +12985,7 @@
           <p:cNvPr id="2" name="Title 1">
             <a:extLst>
               <a:ext uri="{FF2B5EF4-FFF2-40B4-BE49-F238E27FC236}">
-                <a16:creationId xmlns:a16="http://schemas.microsoft.com/office/drawing/2014/main" id="{61D0E77F-C11A-8DB0-017E-8B20A01548BA}"/>
+                <a16:creationId xmlns:a16="http://schemas.microsoft.com/office/drawing/2014/main" id="{BE1A087C-0522-D941-E3A8-BA84527F74F2}"/>
               </a:ext>
             </a:extLst>
           </p:cNvPr>
@@ -13164,10 +13001,7 @@
           <a:bodyPr/>
           <a:lstStyle/>
           <a:p>
-            <a:r>
-              <a:rPr lang="en-US" dirty="0"/>
-              <a:t>How do we count nodes?</a:t>
-            </a:r>
+            <a:endParaRPr lang="en-US"/>
           </a:p>
         </p:txBody>
       </p:sp>
@@ -13176,7 +13010,7 @@
           <p:cNvPr id="3" name="Content Placeholder 2">
             <a:extLst>
               <a:ext uri="{FF2B5EF4-FFF2-40B4-BE49-F238E27FC236}">
-                <a16:creationId xmlns:a16="http://schemas.microsoft.com/office/drawing/2014/main" id="{6C4491D8-6DBA-A18A-6D92-1C7A072A9AF1}"/>
+                <a16:creationId xmlns:a16="http://schemas.microsoft.com/office/drawing/2014/main" id="{BB51E0E1-7203-2648-0FFA-20463E3A1202}"/>
               </a:ext>
             </a:extLst>
           </p:cNvPr>
@@ -13192,76 +13026,182 @@
           <a:bodyPr/>
           <a:lstStyle/>
           <a:p>
-            <a:r>
-              <a:rPr lang="en-US" dirty="0"/>
-              <a:t> The "root" or top of the tree is one node.</a:t>
-            </a:r>
-          </a:p>
-          <a:p>
-            <a:pPr lvl="1"/>
-            <a:r>
-              <a:rPr lang="en-US" dirty="0"/>
-              <a:t> (We assume we can't have a tree of 0 nodes!)</a:t>
-            </a:r>
-          </a:p>
-          <a:p>
-            <a:r>
-              <a:rPr lang="en-US" dirty="0"/>
-              <a:t> For each subtree we… Count the nodes!</a:t>
-            </a:r>
-          </a:p>
-          <a:p>
-            <a:pPr lvl="1"/>
-            <a:r>
-              <a:rPr lang="en-US" dirty="0"/>
-              <a:t> Doesn't this sound like recursion?</a:t>
-            </a:r>
-          </a:p>
-          <a:p>
-            <a:r>
-              <a:rPr lang="en-US" dirty="0"/>
-              <a:t> Hard Part: How do we group the results of recursion?</a:t>
-            </a:r>
-          </a:p>
-          <a:p>
-            <a:r>
-              <a:rPr lang="en-US" dirty="0"/>
-              <a:t> Remember our recursive algorithm:</a:t>
-            </a:r>
-          </a:p>
-          <a:p>
-            <a:pPr lvl="1"/>
-            <a:r>
-              <a:rPr lang="en-US" dirty="0"/>
-              <a:t> Base case</a:t>
-            </a:r>
-          </a:p>
-          <a:p>
-            <a:pPr lvl="1"/>
-            <a:r>
-              <a:rPr lang="en-US" dirty="0"/>
-              <a:t> Recursive Case:</a:t>
-            </a:r>
-          </a:p>
-          <a:p>
-            <a:pPr lvl="2"/>
-            <a:r>
-              <a:rPr lang="en-US" dirty="0"/>
-              <a:t> Divide</a:t>
-            </a:r>
-          </a:p>
-          <a:p>
-            <a:pPr lvl="2"/>
-            <a:r>
-              <a:rPr lang="en-US" dirty="0"/>
-              <a:t> Invoke</a:t>
-            </a:r>
-          </a:p>
-          <a:p>
-            <a:pPr lvl="2"/>
-            <a:r>
-              <a:rPr lang="en-US" dirty="0"/>
-              <a:t> Combine</a:t>
+            <a:pPr marL="0" indent="0">
+              <a:buNone/>
+            </a:pPr>
+            <a:r>
+              <a:rPr lang="en-US" dirty="0">
+                <a:latin typeface="Source Code Pro" panose="020B0509030403020204" pitchFamily="49" charset="77"/>
+              </a:rPr>
+              <a:t>def </a:t>
+            </a:r>
+            <a:r>
+              <a:rPr lang="en-US" dirty="0" err="1">
+                <a:latin typeface="Source Code Pro" panose="020B0509030403020204" pitchFamily="49" charset="77"/>
+              </a:rPr>
+              <a:t>count_nodes</a:t>
+            </a:r>
+            <a:r>
+              <a:rPr lang="en-US" dirty="0">
+                <a:latin typeface="Source Code Pro" panose="020B0509030403020204" pitchFamily="49" charset="77"/>
+              </a:rPr>
+              <a:t>(t):</a:t>
+            </a:r>
+          </a:p>
+          <a:p>
+            <a:pPr marL="0" indent="0">
+              <a:buNone/>
+            </a:pPr>
+            <a:r>
+              <a:rPr lang="en-US" dirty="0">
+                <a:latin typeface="Source Code Pro" panose="020B0509030403020204" pitchFamily="49" charset="77"/>
+              </a:rPr>
+              <a:t>    """The number of leaves in tree.</a:t>
+            </a:r>
+          </a:p>
+          <a:p>
+            <a:pPr marL="0" indent="0">
+              <a:buNone/>
+            </a:pPr>
+            <a:endParaRPr lang="en-US" dirty="0">
+              <a:latin typeface="Source Code Pro" panose="020B0509030403020204" pitchFamily="49" charset="77"/>
+            </a:endParaRPr>
+          </a:p>
+          <a:p>
+            <a:pPr marL="0" indent="0">
+              <a:buNone/>
+            </a:pPr>
+            <a:r>
+              <a:rPr lang="en-US" dirty="0">
+                <a:latin typeface="Source Code Pro" panose="020B0509030403020204" pitchFamily="49" charset="77"/>
+              </a:rPr>
+              <a:t>    &gt;&gt;&gt; </a:t>
+            </a:r>
+            <a:r>
+              <a:rPr lang="en-US" dirty="0" err="1">
+                <a:latin typeface="Source Code Pro" panose="020B0509030403020204" pitchFamily="49" charset="77"/>
+              </a:rPr>
+              <a:t>count_nodes</a:t>
+            </a:r>
+            <a:r>
+              <a:rPr lang="en-US" dirty="0">
+                <a:latin typeface="Source Code Pro" panose="020B0509030403020204" pitchFamily="49" charset="77"/>
+              </a:rPr>
+              <a:t>(</a:t>
+            </a:r>
+            <a:r>
+              <a:rPr lang="en-US" dirty="0" err="1">
+                <a:latin typeface="Source Code Pro" panose="020B0509030403020204" pitchFamily="49" charset="77"/>
+              </a:rPr>
+              <a:t>fib_tree</a:t>
+            </a:r>
+            <a:r>
+              <a:rPr lang="en-US" dirty="0">
+                <a:latin typeface="Source Code Pro" panose="020B0509030403020204" pitchFamily="49" charset="77"/>
+              </a:rPr>
+              <a:t>(5))</a:t>
+            </a:r>
+          </a:p>
+          <a:p>
+            <a:pPr marL="0" indent="0">
+              <a:buNone/>
+            </a:pPr>
+            <a:r>
+              <a:rPr lang="en-US" dirty="0">
+                <a:latin typeface="Source Code Pro" panose="020B0509030403020204" pitchFamily="49" charset="77"/>
+              </a:rPr>
+              <a:t>    8</a:t>
+            </a:r>
+          </a:p>
+          <a:p>
+            <a:pPr marL="0" indent="0">
+              <a:buNone/>
+            </a:pPr>
+            <a:r>
+              <a:rPr lang="en-US" dirty="0">
+                <a:latin typeface="Source Code Pro" panose="020B0509030403020204" pitchFamily="49" charset="77"/>
+              </a:rPr>
+              <a:t>    """</a:t>
+            </a:r>
+          </a:p>
+          <a:p>
+            <a:pPr marL="0" indent="0">
+              <a:buNone/>
+            </a:pPr>
+            <a:r>
+              <a:rPr lang="en-US" dirty="0">
+                <a:latin typeface="Source Code Pro" panose="020B0509030403020204" pitchFamily="49" charset="77"/>
+              </a:rPr>
+              <a:t>    if </a:t>
+            </a:r>
+            <a:r>
+              <a:rPr lang="en-US" dirty="0" err="1">
+                <a:latin typeface="Source Code Pro" panose="020B0509030403020204" pitchFamily="49" charset="77"/>
+              </a:rPr>
+              <a:t>t.is_leaf</a:t>
+            </a:r>
+            <a:r>
+              <a:rPr lang="en-US" dirty="0">
+                <a:latin typeface="Source Code Pro" panose="020B0509030403020204" pitchFamily="49" charset="77"/>
+              </a:rPr>
+              <a:t>():</a:t>
+            </a:r>
+          </a:p>
+          <a:p>
+            <a:pPr marL="0" indent="0">
+              <a:buNone/>
+            </a:pPr>
+            <a:r>
+              <a:rPr lang="en-US" dirty="0">
+                <a:latin typeface="Source Code Pro" panose="020B0509030403020204" pitchFamily="49" charset="77"/>
+              </a:rPr>
+              <a:t>        return 1</a:t>
+            </a:r>
+          </a:p>
+          <a:p>
+            <a:pPr marL="0" indent="0">
+              <a:buNone/>
+            </a:pPr>
+            <a:r>
+              <a:rPr lang="en-US" dirty="0">
+                <a:latin typeface="Source Code Pro" panose="020B0509030403020204" pitchFamily="49" charset="77"/>
+              </a:rPr>
+              <a:t>    else:</a:t>
+            </a:r>
+          </a:p>
+          <a:p>
+            <a:pPr marL="0" indent="0">
+              <a:buNone/>
+            </a:pPr>
+            <a:r>
+              <a:rPr lang="en-US" dirty="0">
+                <a:latin typeface="Source Code Pro" panose="020B0509030403020204" pitchFamily="49" charset="77"/>
+              </a:rPr>
+              <a:t>        return 1 + sum(map(</a:t>
+            </a:r>
+            <a:r>
+              <a:rPr lang="en-US" dirty="0" err="1">
+                <a:latin typeface="Source Code Pro" panose="020B0509030403020204" pitchFamily="49" charset="77"/>
+              </a:rPr>
+              <a:t>count_nodes</a:t>
+            </a:r>
+            <a:r>
+              <a:rPr lang="en-US" dirty="0">
+                <a:latin typeface="Source Code Pro" panose="020B0509030403020204" pitchFamily="49" charset="77"/>
+              </a:rPr>
+              <a:t>, </a:t>
+            </a:r>
+            <a:r>
+              <a:rPr lang="en-US" dirty="0" err="1">
+                <a:latin typeface="Source Code Pro" panose="020B0509030403020204" pitchFamily="49" charset="77"/>
+              </a:rPr>
+              <a:t>t.branches</a:t>
+            </a:r>
+            <a:r>
+              <a:rPr lang="en-US" dirty="0">
+                <a:latin typeface="Source Code Pro" panose="020B0509030403020204" pitchFamily="49" charset="77"/>
+              </a:rPr>
+              <a:t>))</a:t>
             </a:r>
           </a:p>
         </p:txBody>
@@ -13269,7 +13209,7 @@
     </p:spTree>
     <p:extLst>
       <p:ext uri="{BB962C8B-B14F-4D97-AF65-F5344CB8AC3E}">
-        <p14:creationId xmlns:p14="http://schemas.microsoft.com/office/powerpoint/2010/main" val="2473078698"/>
+        <p14:creationId xmlns:p14="http://schemas.microsoft.com/office/powerpoint/2010/main" val="3764738303"/>
       </p:ext>
     </p:extLst>
   </p:cSld>
@@ -13319,7 +13259,7 @@
           <a:p>
             <a:r>
               <a:rPr lang="en-US" dirty="0"/>
-              <a:t>Announcements – Climate / Culture</a:t>
+              <a:t>Announcements</a:t>
             </a:r>
           </a:p>
         </p:txBody>
@@ -13346,22 +13286,10 @@
           <a:lstStyle/>
           <a:p>
             <a:r>
-              <a:rPr lang="en-US" dirty="0"/>
-              <a:t> The rumors of my demise are greatly exaggerated. </a:t>
-            </a:r>
-            <a:r>
               <a:rPr lang="en-US" dirty="0">
                 <a:sym typeface="Wingdings" pitchFamily="2" charset="2"/>
               </a:rPr>
-              <a:t> </a:t>
-            </a:r>
-          </a:p>
-          <a:p>
-            <a:r>
-              <a:rPr lang="en-US" dirty="0">
-                <a:sym typeface="Wingdings" pitchFamily="2" charset="2"/>
-              </a:rPr>
-              <a:t> Reminder: Climate and culture in the classroom are important.</a:t>
+              <a:t>Reminder: Climate and culture in the classroom are important.</a:t>
             </a:r>
           </a:p>
           <a:p>
@@ -13422,7 +13350,7 @@
               <a:rPr lang="en-US" dirty="0">
                 <a:sym typeface="Wingdings" pitchFamily="2" charset="2"/>
               </a:rPr>
-              <a:t>Midterm Grading:</a:t>
+              <a:t>Midterm Grading is in progress</a:t>
             </a:r>
           </a:p>
           <a:p>
@@ -13431,48 +13359,8 @@
               <a:rPr lang="en-US" dirty="0">
                 <a:sym typeface="Wingdings" pitchFamily="2" charset="2"/>
               </a:rPr>
-              <a:t> Regrade Requests due tonight!</a:t>
-            </a:r>
-          </a:p>
-          <a:p>
-            <a:pPr lvl="1"/>
-            <a:r>
-              <a:rPr lang="en-US" dirty="0">
-                <a:sym typeface="Wingdings" pitchFamily="2" charset="2"/>
-              </a:rPr>
-              <a:t> Will resolve them by end up the week</a:t>
-            </a:r>
-          </a:p>
-          <a:p>
-            <a:pPr lvl="1"/>
-            <a:r>
-              <a:rPr lang="en-US" dirty="0">
-                <a:sym typeface="Wingdings" pitchFamily="2" charset="2"/>
-              </a:rPr>
-              <a:t> Grading updates next week.</a:t>
-            </a:r>
-          </a:p>
-          <a:p>
-            <a:pPr lvl="2"/>
-            <a:r>
-              <a:rPr lang="en-US" dirty="0">
-                <a:sym typeface="Wingdings" pitchFamily="2" charset="2"/>
-              </a:rPr>
-              <a:t> Likely dropping the lowest 2-3 questions / scaling scores</a:t>
-            </a:r>
-          </a:p>
-          <a:p>
-            <a:pPr lvl="2"/>
-            <a:r>
-              <a:rPr lang="en-US" dirty="0">
-                <a:sym typeface="Wingdings" pitchFamily="2" charset="2"/>
-              </a:rPr>
-              <a:t> Will release grade reports soon.</a:t>
-            </a:r>
-          </a:p>
-          <a:p>
-            <a:pPr lvl="1"/>
-            <a:endParaRPr lang="en-US" dirty="0"/>
+              <a:t> MT Grades will be released by Mon 7/29 (hopefully sooner)</a:t>
+            </a:r>
           </a:p>
         </p:txBody>
       </p:sp>
@@ -13498,10 +13386,9 @@
           <a:lstStyle/>
           <a:p>
             <a:r>
-              <a:rPr lang="en-US"/>
-              <a:t>Michael Ball | UC Berkeley | https://c88c.org | © CC BY-NC-SA</a:t>
-            </a:r>
-            <a:endParaRPr lang="en-US" dirty="0"/>
+              <a:rPr lang="en-US" dirty="0"/>
+              <a:t>Eric Kim | UC Berkeley | https://c88c.org | © CC BY-NC-SA</a:t>
+            </a:r>
           </a:p>
         </p:txBody>
       </p:sp>
@@ -13537,10 +13424,10 @@
       </p:grpSpPr>
       <p:sp>
         <p:nvSpPr>
-          <p:cNvPr id="2" name="Title 1">
+          <p:cNvPr id="6" name="Title 5">
             <a:extLst>
               <a:ext uri="{FF2B5EF4-FFF2-40B4-BE49-F238E27FC236}">
-                <a16:creationId xmlns:a16="http://schemas.microsoft.com/office/drawing/2014/main" id="{BE1A087C-0522-D941-E3A8-BA84527F74F2}"/>
+                <a16:creationId xmlns:a16="http://schemas.microsoft.com/office/drawing/2014/main" id="{56F24FD8-3D36-BB4A-9C3D-3F83D8137025}"/>
               </a:ext>
             </a:extLst>
           </p:cNvPr>
@@ -13548,229 +13435,65 @@
             <a:spLocks noGrp="1"/>
           </p:cNvSpPr>
           <p:nvPr>
-            <p:ph type="title"/>
+            <p:ph type="ctrTitle"/>
           </p:nvPr>
         </p:nvSpPr>
-        <p:spPr/>
-        <p:txBody>
-          <a:bodyPr/>
+        <p:spPr>
+          <a:xfrm>
+            <a:off x="2514600" y="2693987"/>
+            <a:ext cx="8458200" cy="1470025"/>
+          </a:xfrm>
+        </p:spPr>
+        <p:txBody>
+          <a:bodyPr>
+            <a:normAutofit fontScale="90000"/>
+          </a:bodyPr>
           <a:lstStyle/>
           <a:p>
-            <a:endParaRPr lang="en-US"/>
-          </a:p>
-        </p:txBody>
-      </p:sp>
-      <p:sp>
-        <p:nvSpPr>
-          <p:cNvPr id="3" name="Content Placeholder 2">
-            <a:extLst>
-              <a:ext uri="{FF2B5EF4-FFF2-40B4-BE49-F238E27FC236}">
-                <a16:creationId xmlns:a16="http://schemas.microsoft.com/office/drawing/2014/main" id="{BB51E0E1-7203-2648-0FFA-20463E3A1202}"/>
-              </a:ext>
-            </a:extLst>
-          </p:cNvPr>
-          <p:cNvSpPr>
-            <a:spLocks noGrp="1"/>
-          </p:cNvSpPr>
-          <p:nvPr>
-            <p:ph idx="1"/>
-          </p:nvPr>
-        </p:nvSpPr>
-        <p:spPr/>
-        <p:txBody>
-          <a:bodyPr/>
-          <a:lstStyle/>
-          <a:p>
-            <a:pPr marL="0" indent="0">
-              <a:buNone/>
-            </a:pPr>
-            <a:r>
-              <a:rPr lang="en-US" dirty="0">
-                <a:latin typeface="Source Code Pro" panose="020B0509030403020204" pitchFamily="49" charset="77"/>
-              </a:rPr>
-              <a:t>def </a:t>
-            </a:r>
+            <a:r>
+              <a:rPr lang="en-US" dirty="0"/>
+              <a:t>Trees:</a:t>
+            </a:r>
+            <a:br>
+              <a:rPr lang="en-US" dirty="0"/>
+            </a:br>
+            <a:r>
+              <a:rPr lang="en-US" dirty="0"/>
+              <a:t>Practice With Recursion:</a:t>
+            </a:r>
+            <a:br>
+              <a:rPr lang="en-US" dirty="0"/>
+            </a:br>
             <a:r>
               <a:rPr lang="en-US" dirty="0" err="1">
                 <a:latin typeface="Source Code Pro" panose="020B0509030403020204" pitchFamily="49" charset="77"/>
               </a:rPr>
-              <a:t>count_nodes</a:t>
-            </a:r>
-            <a:r>
-              <a:rPr lang="en-US" dirty="0">
-                <a:latin typeface="Source Code Pro" panose="020B0509030403020204" pitchFamily="49" charset="77"/>
-              </a:rPr>
-              <a:t>(t):</a:t>
-            </a:r>
-          </a:p>
-          <a:p>
-            <a:pPr marL="0" indent="0">
-              <a:buNone/>
-            </a:pPr>
-            <a:r>
-              <a:rPr lang="en-US" dirty="0">
-                <a:latin typeface="Source Code Pro" panose="020B0509030403020204" pitchFamily="49" charset="77"/>
-              </a:rPr>
-              <a:t>    """The number of leaves in tree.</a:t>
-            </a:r>
-          </a:p>
-          <a:p>
-            <a:pPr marL="0" indent="0">
-              <a:buNone/>
-            </a:pPr>
+              <a:t>print_tree</a:t>
+            </a:r>
             <a:endParaRPr lang="en-US" dirty="0">
               <a:latin typeface="Source Code Pro" panose="020B0509030403020204" pitchFamily="49" charset="77"/>
             </a:endParaRPr>
           </a:p>
-          <a:p>
-            <a:pPr marL="0" indent="0">
-              <a:buNone/>
-            </a:pPr>
-            <a:r>
-              <a:rPr lang="en-US" dirty="0">
-                <a:latin typeface="Source Code Pro" panose="020B0509030403020204" pitchFamily="49" charset="77"/>
-              </a:rPr>
-              <a:t>    &gt;&gt;&gt; </a:t>
-            </a:r>
-            <a:r>
-              <a:rPr lang="en-US" dirty="0" err="1">
-                <a:latin typeface="Source Code Pro" panose="020B0509030403020204" pitchFamily="49" charset="77"/>
-              </a:rPr>
-              <a:t>count_nodes</a:t>
-            </a:r>
-            <a:r>
-              <a:rPr lang="en-US" dirty="0">
-                <a:latin typeface="Source Code Pro" panose="020B0509030403020204" pitchFamily="49" charset="77"/>
-              </a:rPr>
-              <a:t>(</a:t>
-            </a:r>
-            <a:r>
-              <a:rPr lang="en-US" dirty="0" err="1">
-                <a:latin typeface="Source Code Pro" panose="020B0509030403020204" pitchFamily="49" charset="77"/>
-              </a:rPr>
-              <a:t>fib_tree</a:t>
-            </a:r>
-            <a:r>
-              <a:rPr lang="en-US" dirty="0">
-                <a:latin typeface="Source Code Pro" panose="020B0509030403020204" pitchFamily="49" charset="77"/>
-              </a:rPr>
-              <a:t>(5))</a:t>
-            </a:r>
-          </a:p>
-          <a:p>
-            <a:pPr marL="0" indent="0">
-              <a:buNone/>
-            </a:pPr>
-            <a:r>
-              <a:rPr lang="en-US" dirty="0">
-                <a:latin typeface="Source Code Pro" panose="020B0509030403020204" pitchFamily="49" charset="77"/>
-              </a:rPr>
-              <a:t>    8</a:t>
-            </a:r>
-          </a:p>
-          <a:p>
-            <a:pPr marL="0" indent="0">
-              <a:buNone/>
-            </a:pPr>
-            <a:r>
-              <a:rPr lang="en-US" dirty="0">
-                <a:latin typeface="Source Code Pro" panose="020B0509030403020204" pitchFamily="49" charset="77"/>
-              </a:rPr>
-              <a:t>    """</a:t>
-            </a:r>
-          </a:p>
-          <a:p>
-            <a:pPr marL="0" indent="0">
-              <a:buNone/>
-            </a:pPr>
-            <a:r>
-              <a:rPr lang="en-US" dirty="0">
-                <a:latin typeface="Source Code Pro" panose="020B0509030403020204" pitchFamily="49" charset="77"/>
-              </a:rPr>
-              <a:t>    if </a:t>
-            </a:r>
-            <a:r>
-              <a:rPr lang="en-US" dirty="0" err="1">
-                <a:latin typeface="Source Code Pro" panose="020B0509030403020204" pitchFamily="49" charset="77"/>
-              </a:rPr>
-              <a:t>t.is_leaf</a:t>
-            </a:r>
-            <a:r>
-              <a:rPr lang="en-US" dirty="0">
-                <a:latin typeface="Source Code Pro" panose="020B0509030403020204" pitchFamily="49" charset="77"/>
-              </a:rPr>
-              <a:t>():</a:t>
-            </a:r>
-          </a:p>
-          <a:p>
-            <a:pPr marL="0" indent="0">
-              <a:buNone/>
-            </a:pPr>
-            <a:r>
-              <a:rPr lang="en-US" dirty="0">
-                <a:latin typeface="Source Code Pro" panose="020B0509030403020204" pitchFamily="49" charset="77"/>
-              </a:rPr>
-              <a:t>        return 1</a:t>
-            </a:r>
-          </a:p>
-          <a:p>
-            <a:pPr marL="0" indent="0">
-              <a:buNone/>
-            </a:pPr>
-            <a:r>
-              <a:rPr lang="en-US" dirty="0">
-                <a:latin typeface="Source Code Pro" panose="020B0509030403020204" pitchFamily="49" charset="77"/>
-              </a:rPr>
-              <a:t>    else:</a:t>
-            </a:r>
-          </a:p>
-          <a:p>
-            <a:pPr marL="0" indent="0">
-              <a:buNone/>
-            </a:pPr>
-            <a:r>
-              <a:rPr lang="en-US" dirty="0">
-                <a:latin typeface="Source Code Pro" panose="020B0509030403020204" pitchFamily="49" charset="77"/>
-              </a:rPr>
-              <a:t>        return 1 + sum(map(</a:t>
-            </a:r>
-            <a:r>
-              <a:rPr lang="en-US" dirty="0" err="1">
-                <a:latin typeface="Source Code Pro" panose="020B0509030403020204" pitchFamily="49" charset="77"/>
-              </a:rPr>
-              <a:t>count_nodes</a:t>
-            </a:r>
-            <a:r>
-              <a:rPr lang="en-US" dirty="0">
-                <a:latin typeface="Source Code Pro" panose="020B0509030403020204" pitchFamily="49" charset="77"/>
-              </a:rPr>
-              <a:t>, </a:t>
-            </a:r>
-            <a:r>
-              <a:rPr lang="en-US" dirty="0" err="1">
-                <a:latin typeface="Source Code Pro" panose="020B0509030403020204" pitchFamily="49" charset="77"/>
-              </a:rPr>
-              <a:t>t.branches</a:t>
-            </a:r>
-            <a:r>
-              <a:rPr lang="en-US" dirty="0">
-                <a:latin typeface="Source Code Pro" panose="020B0509030403020204" pitchFamily="49" charset="77"/>
-              </a:rPr>
-              <a:t>))</a:t>
-            </a:r>
-          </a:p>
         </p:txBody>
       </p:sp>
     </p:spTree>
     <p:extLst>
       <p:ext uri="{BB962C8B-B14F-4D97-AF65-F5344CB8AC3E}">
-        <p14:creationId xmlns:p14="http://schemas.microsoft.com/office/powerpoint/2010/main" val="3764738303"/>
+        <p14:creationId xmlns:p14="http://schemas.microsoft.com/office/powerpoint/2010/main" val="3637177846"/>
       </p:ext>
     </p:extLst>
   </p:cSld>
   <p:clrMapOvr>
     <a:masterClrMapping/>
   </p:clrMapOvr>
+  <mc:AlternateContent xmlns:mc="http://schemas.openxmlformats.org/markup-compatibility/2006" xmlns:p14="http://schemas.microsoft.com/office/powerpoint/2010/main">
+    <mc:Choice Requires="p14">
+      <p:transition spd="slow" p14:dur="2000" advTm="109658"/>
+    </mc:Choice>
+    <mc:Fallback xmlns="">
+      <p:transition xmlns:p14="http://schemas.microsoft.com/office/powerpoint/2010/main" spd="slow" advTm="109658"/>
+    </mc:Fallback>
+  </mc:AlternateContent>
 </p:sld>
 </file>
 
@@ -13809,7 +13532,7 @@
         </p:nvSpPr>
         <p:spPr>
           <a:xfrm>
-            <a:off x="2514600" y="2693987"/>
+            <a:off x="2743200" y="2693987"/>
             <a:ext cx="8458200" cy="1470025"/>
           </a:xfrm>
         </p:spPr>
@@ -13819,36 +13542,38 @@
           </a:bodyPr>
           <a:lstStyle/>
           <a:p>
-            <a:r>
-              <a:rPr lang="en-US" dirty="0"/>
-              <a:t>Trees:</a:t>
-            </a:r>
             <a:br>
               <a:rPr lang="en-US" dirty="0"/>
             </a:br>
             <a:r>
               <a:rPr lang="en-US" dirty="0"/>
-              <a:t>Practice With Recursion:</a:t>
+              <a:t>Trees:</a:t>
             </a:r>
             <a:br>
               <a:rPr lang="en-US" dirty="0"/>
             </a:br>
             <a:r>
-              <a:rPr lang="en-US" dirty="0" err="1">
-                <a:latin typeface="Source Code Pro" panose="020B0509030403020204" pitchFamily="49" charset="77"/>
-              </a:rPr>
-              <a:t>print_tree</a:t>
-            </a:r>
-            <a:endParaRPr lang="en-US" dirty="0">
-              <a:latin typeface="Source Code Pro" panose="020B0509030403020204" pitchFamily="49" charset="77"/>
-            </a:endParaRPr>
+              <a:rPr lang="en-US" dirty="0"/>
+              <a:t>Advanced Topics: Searching</a:t>
+            </a:r>
+            <a:br>
+              <a:rPr lang="en-US" dirty="0"/>
+            </a:br>
+            <a:r>
+              <a:rPr lang="en-US" dirty="0"/>
+              <a:t>Optional!</a:t>
+            </a:r>
+            <a:br>
+              <a:rPr lang="en-US" dirty="0"/>
+            </a:br>
+            <a:endParaRPr lang="en-US" dirty="0"/>
           </a:p>
         </p:txBody>
       </p:sp>
     </p:spTree>
     <p:extLst>
       <p:ext uri="{BB962C8B-B14F-4D97-AF65-F5344CB8AC3E}">
-        <p14:creationId xmlns:p14="http://schemas.microsoft.com/office/powerpoint/2010/main" val="3637177846"/>
+        <p14:creationId xmlns:p14="http://schemas.microsoft.com/office/powerpoint/2010/main" val="2781375031"/>
       </p:ext>
     </p:extLst>
   </p:cSld>
@@ -13885,10 +13610,10 @@
       </p:grpSpPr>
       <p:sp>
         <p:nvSpPr>
-          <p:cNvPr id="6" name="Title 5">
+          <p:cNvPr id="2" name="Title 1">
             <a:extLst>
               <a:ext uri="{FF2B5EF4-FFF2-40B4-BE49-F238E27FC236}">
-                <a16:creationId xmlns:a16="http://schemas.microsoft.com/office/drawing/2014/main" id="{56F24FD8-3D36-BB4A-9C3D-3F83D8137025}"/>
+                <a16:creationId xmlns:a16="http://schemas.microsoft.com/office/drawing/2014/main" id="{1755F6FC-9B12-D140-856A-398C3701102F}"/>
               </a:ext>
             </a:extLst>
           </p:cNvPr>
@@ -13896,67 +13621,115 @@
             <a:spLocks noGrp="1"/>
           </p:cNvSpPr>
           <p:nvPr>
-            <p:ph type="ctrTitle"/>
+            <p:ph type="title"/>
           </p:nvPr>
         </p:nvSpPr>
-        <p:spPr>
-          <a:xfrm>
-            <a:off x="2743200" y="2693987"/>
-            <a:ext cx="8458200" cy="1470025"/>
-          </a:xfrm>
-        </p:spPr>
-        <p:txBody>
-          <a:bodyPr>
-            <a:normAutofit fontScale="90000"/>
-          </a:bodyPr>
+        <p:spPr/>
+        <p:txBody>
+          <a:bodyPr/>
           <a:lstStyle/>
           <a:p>
-            <a:br>
+            <a:r>
               <a:rPr lang="en-US" dirty="0"/>
-            </a:br>
+              <a:t>Searching Trees: Two Strategies</a:t>
+            </a:r>
+          </a:p>
+        </p:txBody>
+      </p:sp>
+      <p:sp>
+        <p:nvSpPr>
+          <p:cNvPr id="3" name="Content Placeholder 2">
+            <a:extLst>
+              <a:ext uri="{FF2B5EF4-FFF2-40B4-BE49-F238E27FC236}">
+                <a16:creationId xmlns:a16="http://schemas.microsoft.com/office/drawing/2014/main" id="{747A2F3D-4466-F146-BE08-26E428A7CBC4}"/>
+              </a:ext>
+            </a:extLst>
+          </p:cNvPr>
+          <p:cNvSpPr>
+            <a:spLocks noGrp="1"/>
+          </p:cNvSpPr>
+          <p:nvPr>
+            <p:ph idx="1"/>
+          </p:nvPr>
+        </p:nvSpPr>
+        <p:spPr/>
+        <p:txBody>
+          <a:bodyPr/>
+          <a:lstStyle/>
+          <a:p>
             <a:r>
               <a:rPr lang="en-US" dirty="0"/>
-              <a:t>Trees:</a:t>
-            </a:r>
-            <a:br>
+              <a:t>The searching we have been doing today is called “Depth First Search”, or DFS.</a:t>
+            </a:r>
+          </a:p>
+          <a:p>
+            <a:r>
               <a:rPr lang="en-US" dirty="0"/>
-            </a:br>
+              <a:t>Recursion makes the algorithm very nice.</a:t>
+            </a:r>
+          </a:p>
+          <a:p>
+            <a:pPr lvl="1"/>
             <a:r>
               <a:rPr lang="en-US" dirty="0"/>
-              <a:t>Advanced Topics: Searching</a:t>
-            </a:r>
-            <a:br>
+              <a:t> First: we deal with our current item, then we get to the branches.</a:t>
+            </a:r>
+          </a:p>
+          <a:p>
+            <a:pPr lvl="1"/>
+            <a:r>
               <a:rPr lang="en-US" dirty="0"/>
-            </a:br>
+              <a:t>We always make a recursive call on the first branch</a:t>
+            </a:r>
+          </a:p>
+          <a:p>
+            <a:pPr lvl="1"/>
             <a:r>
               <a:rPr lang="en-US" dirty="0"/>
-              <a:t>Optional!</a:t>
-            </a:r>
-            <a:br>
+              <a:t>We continue recursing until there are no more branches</a:t>
+            </a:r>
+          </a:p>
+          <a:p>
+            <a:pPr lvl="1"/>
+            <a:r>
               <a:rPr lang="en-US" dirty="0"/>
-            </a:br>
-            <a:endParaRPr lang="en-US" dirty="0"/>
+              <a:t>Then the function executes, and we go back “up” a level and check out the next branch.</a:t>
+            </a:r>
+          </a:p>
+          <a:p>
+            <a:pPr lvl="1"/>
+            <a:r>
+              <a:rPr lang="en-US" dirty="0"/>
+              <a:t>We sometimes say: “popping up the stack”. </a:t>
+            </a:r>
+          </a:p>
+          <a:p>
+            <a:pPr lvl="1"/>
+            <a:r>
+              <a:rPr lang="en-US" dirty="0"/>
+              <a:t>The </a:t>
+            </a:r>
+            <a:r>
+              <a:rPr lang="en-US" i="1" dirty="0"/>
+              <a:t>stack</a:t>
+            </a:r>
+            <a:r>
+              <a:rPr lang="en-US" dirty="0"/>
+              <a:t> is the “stack of function calls” the computer uses to keep track of how things work, and you’ll learn about this in CS61B.</a:t>
+            </a:r>
           </a:p>
         </p:txBody>
       </p:sp>
     </p:spTree>
     <p:extLst>
       <p:ext uri="{BB962C8B-B14F-4D97-AF65-F5344CB8AC3E}">
-        <p14:creationId xmlns:p14="http://schemas.microsoft.com/office/powerpoint/2010/main" val="2781375031"/>
+        <p14:creationId xmlns:p14="http://schemas.microsoft.com/office/powerpoint/2010/main" val="2687263187"/>
       </p:ext>
     </p:extLst>
   </p:cSld>
   <p:clrMapOvr>
     <a:masterClrMapping/>
   </p:clrMapOvr>
-  <mc:AlternateContent xmlns:mc="http://schemas.openxmlformats.org/markup-compatibility/2006" xmlns:p14="http://schemas.microsoft.com/office/powerpoint/2010/main">
-    <mc:Choice Requires="p14">
-      <p:transition spd="slow" p14:dur="2000" advTm="109658"/>
-    </mc:Choice>
-    <mc:Fallback xmlns="">
-      <p:transition xmlns:p14="http://schemas.microsoft.com/office/powerpoint/2010/main" spd="slow" advTm="109658"/>
-    </mc:Fallback>
-  </mc:AlternateContent>
 </p:sld>
 </file>
 
@@ -13982,148 +13755,6 @@
           <p:cNvPr id="2" name="Title 1">
             <a:extLst>
               <a:ext uri="{FF2B5EF4-FFF2-40B4-BE49-F238E27FC236}">
-                <a16:creationId xmlns:a16="http://schemas.microsoft.com/office/drawing/2014/main" id="{1755F6FC-9B12-D140-856A-398C3701102F}"/>
-              </a:ext>
-            </a:extLst>
-          </p:cNvPr>
-          <p:cNvSpPr>
-            <a:spLocks noGrp="1"/>
-          </p:cNvSpPr>
-          <p:nvPr>
-            <p:ph type="title"/>
-          </p:nvPr>
-        </p:nvSpPr>
-        <p:spPr/>
-        <p:txBody>
-          <a:bodyPr/>
-          <a:lstStyle/>
-          <a:p>
-            <a:r>
-              <a:rPr lang="en-US" dirty="0"/>
-              <a:t>Searching Trees: Two Strategies</a:t>
-            </a:r>
-          </a:p>
-        </p:txBody>
-      </p:sp>
-      <p:sp>
-        <p:nvSpPr>
-          <p:cNvPr id="3" name="Content Placeholder 2">
-            <a:extLst>
-              <a:ext uri="{FF2B5EF4-FFF2-40B4-BE49-F238E27FC236}">
-                <a16:creationId xmlns:a16="http://schemas.microsoft.com/office/drawing/2014/main" id="{747A2F3D-4466-F146-BE08-26E428A7CBC4}"/>
-              </a:ext>
-            </a:extLst>
-          </p:cNvPr>
-          <p:cNvSpPr>
-            <a:spLocks noGrp="1"/>
-          </p:cNvSpPr>
-          <p:nvPr>
-            <p:ph idx="1"/>
-          </p:nvPr>
-        </p:nvSpPr>
-        <p:spPr/>
-        <p:txBody>
-          <a:bodyPr/>
-          <a:lstStyle/>
-          <a:p>
-            <a:r>
-              <a:rPr lang="en-US" dirty="0"/>
-              <a:t>The searching we have been doing today is called “Depth First Search”, or DFS.</a:t>
-            </a:r>
-          </a:p>
-          <a:p>
-            <a:r>
-              <a:rPr lang="en-US" dirty="0"/>
-              <a:t>Recursion makes the algorithm very nice.</a:t>
-            </a:r>
-          </a:p>
-          <a:p>
-            <a:pPr lvl="1"/>
-            <a:r>
-              <a:rPr lang="en-US" dirty="0"/>
-              <a:t> First: we deal with our current item, then we get to the branches.</a:t>
-            </a:r>
-          </a:p>
-          <a:p>
-            <a:pPr lvl="1"/>
-            <a:r>
-              <a:rPr lang="en-US" dirty="0"/>
-              <a:t>We always make a recursive call on the first branch</a:t>
-            </a:r>
-          </a:p>
-          <a:p>
-            <a:pPr lvl="1"/>
-            <a:r>
-              <a:rPr lang="en-US" dirty="0"/>
-              <a:t>We continue recursing until there are no more branches</a:t>
-            </a:r>
-          </a:p>
-          <a:p>
-            <a:pPr lvl="1"/>
-            <a:r>
-              <a:rPr lang="en-US" dirty="0"/>
-              <a:t>Then the function executes, and we go back “up” a level and check out the next branch.</a:t>
-            </a:r>
-          </a:p>
-          <a:p>
-            <a:pPr lvl="1"/>
-            <a:r>
-              <a:rPr lang="en-US" dirty="0"/>
-              <a:t>We sometimes say: “popping up the stack”. </a:t>
-            </a:r>
-          </a:p>
-          <a:p>
-            <a:pPr lvl="1"/>
-            <a:r>
-              <a:rPr lang="en-US" dirty="0"/>
-              <a:t>The </a:t>
-            </a:r>
-            <a:r>
-              <a:rPr lang="en-US" i="1" dirty="0"/>
-              <a:t>stack</a:t>
-            </a:r>
-            <a:r>
-              <a:rPr lang="en-US" dirty="0"/>
-              <a:t> is the “stack of function calls” the computer uses to keep track of how things work, and you’ll learn about this in CS61B.</a:t>
-            </a:r>
-          </a:p>
-        </p:txBody>
-      </p:sp>
-    </p:spTree>
-    <p:extLst>
-      <p:ext uri="{BB962C8B-B14F-4D97-AF65-F5344CB8AC3E}">
-        <p14:creationId xmlns:p14="http://schemas.microsoft.com/office/powerpoint/2010/main" val="2687263187"/>
-      </p:ext>
-    </p:extLst>
-  </p:cSld>
-  <p:clrMapOvr>
-    <a:masterClrMapping/>
-  </p:clrMapOvr>
-</p:sld>
-</file>
-
-<file path=ppt/slides/slide24.xml><?xml version="1.0" encoding="utf-8"?>
-<p:sld xmlns:a="http://schemas.openxmlformats.org/drawingml/2006/main" xmlns:r="http://schemas.openxmlformats.org/officeDocument/2006/relationships" xmlns:p="http://schemas.openxmlformats.org/presentationml/2006/main">
-  <p:cSld>
-    <p:spTree>
-      <p:nvGrpSpPr>
-        <p:cNvPr id="1" name=""/>
-        <p:cNvGrpSpPr/>
-        <p:nvPr/>
-      </p:nvGrpSpPr>
-      <p:grpSpPr>
-        <a:xfrm>
-          <a:off x="0" y="0"/>
-          <a:ext cx="0" cy="0"/>
-          <a:chOff x="0" y="0"/>
-          <a:chExt cx="0" cy="0"/>
-        </a:xfrm>
-      </p:grpSpPr>
-      <p:sp>
-        <p:nvSpPr>
-          <p:cNvPr id="2" name="Title 1">
-            <a:extLst>
-              <a:ext uri="{FF2B5EF4-FFF2-40B4-BE49-F238E27FC236}">
                 <a16:creationId xmlns:a16="http://schemas.microsoft.com/office/drawing/2014/main" id="{B039CCBE-D2AC-B746-B9CD-C3BEC3665EA3}"/>
               </a:ext>
             </a:extLst>
@@ -14207,7 +13838,7 @@
 </p:sld>
 </file>
 
-<file path=ppt/slides/slide25.xml><?xml version="1.0" encoding="utf-8"?>
+<file path=ppt/slides/slide24.xml><?xml version="1.0" encoding="utf-8"?>
 <p:sld xmlns:a="http://schemas.openxmlformats.org/drawingml/2006/main" xmlns:r="http://schemas.openxmlformats.org/officeDocument/2006/relationships" xmlns:p="http://schemas.openxmlformats.org/presentationml/2006/main" show="0">
   <p:cSld>
     <p:spTree>
@@ -14348,123 +13979,6 @@
       </p:grpSpPr>
       <p:sp>
         <p:nvSpPr>
-          <p:cNvPr id="4" name="Title 3">
-            <a:extLst>
-              <a:ext uri="{FF2B5EF4-FFF2-40B4-BE49-F238E27FC236}">
-                <a16:creationId xmlns:a16="http://schemas.microsoft.com/office/drawing/2014/main" id="{F87286DC-0DBC-9878-1A68-42724369BB43}"/>
-              </a:ext>
-            </a:extLst>
-          </p:cNvPr>
-          <p:cNvSpPr>
-            <a:spLocks noGrp="1"/>
-          </p:cNvSpPr>
-          <p:nvPr>
-            <p:ph type="title"/>
-          </p:nvPr>
-        </p:nvSpPr>
-        <p:spPr/>
-        <p:txBody>
-          <a:bodyPr/>
-          <a:lstStyle/>
-          <a:p>
-            <a:r>
-              <a:rPr lang="en-US" dirty="0"/>
-              <a:t>Announcements</a:t>
-            </a:r>
-          </a:p>
-        </p:txBody>
-      </p:sp>
-      <p:sp>
-        <p:nvSpPr>
-          <p:cNvPr id="5" name="Content Placeholder 4">
-            <a:extLst>
-              <a:ext uri="{FF2B5EF4-FFF2-40B4-BE49-F238E27FC236}">
-                <a16:creationId xmlns:a16="http://schemas.microsoft.com/office/drawing/2014/main" id="{DD9486D2-CE53-B9A0-5D39-DBFA229E2620}"/>
-              </a:ext>
-            </a:extLst>
-          </p:cNvPr>
-          <p:cNvSpPr>
-            <a:spLocks noGrp="1"/>
-          </p:cNvSpPr>
-          <p:nvPr>
-            <p:ph idx="1"/>
-          </p:nvPr>
-        </p:nvSpPr>
-        <p:spPr/>
-        <p:txBody>
-          <a:bodyPr/>
-          <a:lstStyle/>
-          <a:p>
-            <a:r>
-              <a:rPr lang="en-US" dirty="0"/>
-              <a:t> Ants Project out next week</a:t>
-            </a:r>
-          </a:p>
-          <a:p>
-            <a:pPr lvl="1"/>
-            <a:r>
-              <a:rPr lang="en-US" dirty="0"/>
-              <a:t> ~ 3 weeks long</a:t>
-            </a:r>
-          </a:p>
-          <a:p>
-            <a:pPr lvl="1"/>
-            <a:r>
-              <a:rPr lang="en-US" sz="3200" dirty="0"/>
-              <a:t> </a:t>
-            </a:r>
-            <a:r>
-              <a:rPr lang="en-US" sz="3200" b="1" dirty="0"/>
-              <a:t>Partners recommended, but work </a:t>
-            </a:r>
-            <a:r>
-              <a:rPr lang="en-US" sz="3200" b="1" i="1" dirty="0"/>
-              <a:t>together!</a:t>
-            </a:r>
-            <a:endParaRPr lang="en-US" sz="3200" b="1" dirty="0"/>
-          </a:p>
-          <a:p>
-            <a:pPr lvl="1"/>
-            <a:r>
-              <a:rPr lang="en-US" sz="3200" b="1" dirty="0"/>
-              <a:t> Do not “trade off” questions!</a:t>
-            </a:r>
-            <a:endParaRPr lang="en-US" dirty="0"/>
-          </a:p>
-        </p:txBody>
-      </p:sp>
-    </p:spTree>
-    <p:extLst>
-      <p:ext uri="{BB962C8B-B14F-4D97-AF65-F5344CB8AC3E}">
-        <p14:creationId xmlns:p14="http://schemas.microsoft.com/office/powerpoint/2010/main" val="2507843855"/>
-      </p:ext>
-    </p:extLst>
-  </p:cSld>
-  <p:clrMapOvr>
-    <a:masterClrMapping/>
-  </p:clrMapOvr>
-</p:sld>
-</file>
-
-<file path=ppt/slides/slide4.xml><?xml version="1.0" encoding="utf-8"?>
-<p:sld xmlns:a="http://schemas.openxmlformats.org/drawingml/2006/main" xmlns:r="http://schemas.openxmlformats.org/officeDocument/2006/relationships" xmlns:p="http://schemas.openxmlformats.org/presentationml/2006/main">
-  <p:cSld>
-    <p:spTree>
-      <p:nvGrpSpPr>
-        <p:cNvPr id="1" name=""/>
-        <p:cNvGrpSpPr/>
-        <p:nvPr/>
-      </p:nvGrpSpPr>
-      <p:grpSpPr>
-        <a:xfrm>
-          <a:off x="0" y="0"/>
-          <a:ext cx="0" cy="0"/>
-          <a:chOff x="0" y="0"/>
-          <a:chExt cx="0" cy="0"/>
-        </a:xfrm>
-      </p:grpSpPr>
-      <p:sp>
-        <p:nvSpPr>
           <p:cNvPr id="2" name="Title 1">
             <a:extLst>
               <a:ext uri="{FF2B5EF4-FFF2-40B4-BE49-F238E27FC236}">
@@ -14697,8 +14211,8 @@
           </a:lstStyle>
           <a:p>
             <a:r>
-              <a:rPr lang="en-US"/>
-              <a:t>Michael Ball | UC Berkeley | https://c88c.org | © CC BY-NC-SA</a:t>
+              <a:rPr lang="en-US" dirty="0"/>
+              <a:t>Eric Kim | UC Berkeley | https://c88c.org | © CC BY-NC-SA</a:t>
             </a:r>
           </a:p>
         </p:txBody>
@@ -14991,7 +14505,7 @@
 </p:sld>
 </file>
 
-<file path=ppt/slides/slide5.xml><?xml version="1.0" encoding="utf-8"?>
+<file path=ppt/slides/slide4.xml><?xml version="1.0" encoding="utf-8"?>
 <p:sld xmlns:a="http://schemas.openxmlformats.org/drawingml/2006/main" xmlns:r="http://schemas.openxmlformats.org/officeDocument/2006/relationships" xmlns:p="http://schemas.openxmlformats.org/presentationml/2006/main">
   <p:cSld>
     <p:spTree>
@@ -15277,7 +14791,7 @@
           <a:p>
             <a:r>
               <a:rPr lang="en-US" dirty="0"/>
-              <a:t>Michael Ball | UC Berkeley | https://c88c.org | © CC BY-NC-SA</a:t>
+              <a:t>Eric Kim | UC Berkeley | https://c88c.org | © CC BY-NC-SA</a:t>
             </a:r>
           </a:p>
         </p:txBody>
@@ -15295,7 +14809,7 @@
 </p:sld>
 </file>
 
-<file path=ppt/slides/slide6.xml><?xml version="1.0" encoding="utf-8"?>
+<file path=ppt/slides/slide5.xml><?xml version="1.0" encoding="utf-8"?>
 <p:sld xmlns:a="http://schemas.openxmlformats.org/drawingml/2006/main" xmlns:r="http://schemas.openxmlformats.org/officeDocument/2006/relationships" xmlns:p="http://schemas.openxmlformats.org/presentationml/2006/main">
   <p:cSld>
     <p:spTree>
@@ -15727,7 +15241,7 @@
           <a:p>
             <a:r>
               <a:rPr lang="en-US" dirty="0"/>
-              <a:t>Michael Ball | UC Berkeley | https://c88c.org | © CC BY-NC-SA</a:t>
+              <a:t>Eric Kim | UC Berkeley | https://c88c.org | © CC BY-NC-SA</a:t>
             </a:r>
           </a:p>
         </p:txBody>
@@ -15745,7 +15259,7 @@
 </p:sld>
 </file>
 
-<file path=ppt/slides/slide7.xml><?xml version="1.0" encoding="utf-8"?>
+<file path=ppt/slides/slide6.xml><?xml version="1.0" encoding="utf-8"?>
 <p:sld xmlns:a="http://schemas.openxmlformats.org/drawingml/2006/main" xmlns:r="http://schemas.openxmlformats.org/officeDocument/2006/relationships" xmlns:p="http://schemas.openxmlformats.org/presentationml/2006/main">
   <p:cSld>
     <p:spTree>
@@ -16077,7 +15591,7 @@
           <a:p>
             <a:r>
               <a:rPr lang="en-US" dirty="0"/>
-              <a:t>Michael Ball | UC Berkeley | https://c88c.org | © CC BY-NC-SA</a:t>
+              <a:t>Eric Kim | UC Berkeley | https://c88c.org | © CC BY-NC-SA</a:t>
             </a:r>
           </a:p>
         </p:txBody>
@@ -16095,7 +15609,7 @@
 </p:sld>
 </file>
 
-<file path=ppt/slides/slide8.xml><?xml version="1.0" encoding="utf-8"?>
+<file path=ppt/slides/slide7.xml><?xml version="1.0" encoding="utf-8"?>
 <p:sld xmlns:a="http://schemas.openxmlformats.org/drawingml/2006/main" xmlns:r="http://schemas.openxmlformats.org/officeDocument/2006/relationships" xmlns:p="http://schemas.openxmlformats.org/presentationml/2006/main">
   <p:cSld>
     <p:spTree>
@@ -16431,7 +15945,7 @@
           <a:p>
             <a:r>
               <a:rPr lang="en-US" dirty="0"/>
-              <a:t>Michael Ball | UC Berkeley | https://c88c.org | © CC BY-NC-SA</a:t>
+              <a:t>Eric Kim | UC Berkeley | https://c88c.org | © CC BY-NC-SA</a:t>
             </a:r>
           </a:p>
         </p:txBody>
@@ -16440,6 +15954,197 @@
     <p:extLst>
       <p:ext uri="{BB962C8B-B14F-4D97-AF65-F5344CB8AC3E}">
         <p14:creationId xmlns:p14="http://schemas.microsoft.com/office/powerpoint/2010/main" val="1679234827"/>
+      </p:ext>
+    </p:extLst>
+  </p:cSld>
+  <p:clrMapOvr>
+    <a:masterClrMapping/>
+  </p:clrMapOvr>
+</p:sld>
+</file>
+
+<file path=ppt/slides/slide8.xml><?xml version="1.0" encoding="utf-8"?>
+<p:sld xmlns:a="http://schemas.openxmlformats.org/drawingml/2006/main" xmlns:r="http://schemas.openxmlformats.org/officeDocument/2006/relationships" xmlns:p="http://schemas.openxmlformats.org/presentationml/2006/main">
+  <p:cSld>
+    <p:spTree>
+      <p:nvGrpSpPr>
+        <p:cNvPr id="1" name=""/>
+        <p:cNvGrpSpPr/>
+        <p:nvPr/>
+      </p:nvGrpSpPr>
+      <p:grpSpPr>
+        <a:xfrm>
+          <a:off x="0" y="0"/>
+          <a:ext cx="0" cy="0"/>
+          <a:chOff x="0" y="0"/>
+          <a:chExt cx="0" cy="0"/>
+        </a:xfrm>
+      </p:grpSpPr>
+      <p:sp>
+        <p:nvSpPr>
+          <p:cNvPr id="5" name="Title 4">
+            <a:extLst>
+              <a:ext uri="{FF2B5EF4-FFF2-40B4-BE49-F238E27FC236}">
+                <a16:creationId xmlns:a16="http://schemas.microsoft.com/office/drawing/2014/main" id="{60A4C850-E01A-6993-B3BD-38AA8AB81B9D}"/>
+              </a:ext>
+            </a:extLst>
+          </p:cNvPr>
+          <p:cNvSpPr>
+            <a:spLocks noGrp="1"/>
+          </p:cNvSpPr>
+          <p:nvPr>
+            <p:ph type="title"/>
+          </p:nvPr>
+        </p:nvSpPr>
+        <p:spPr/>
+        <p:txBody>
+          <a:bodyPr/>
+          <a:lstStyle/>
+          <a:p>
+            <a:r>
+              <a:rPr lang="en-US" dirty="0"/>
+              <a:t>Trees are Recursive</a:t>
+            </a:r>
+          </a:p>
+        </p:txBody>
+      </p:sp>
+      <p:sp>
+        <p:nvSpPr>
+          <p:cNvPr id="6" name="Content Placeholder 5">
+            <a:extLst>
+              <a:ext uri="{FF2B5EF4-FFF2-40B4-BE49-F238E27FC236}">
+                <a16:creationId xmlns:a16="http://schemas.microsoft.com/office/drawing/2014/main" id="{7B0C1384-5578-2AF4-EDE0-055899EE6D9F}"/>
+              </a:ext>
+            </a:extLst>
+          </p:cNvPr>
+          <p:cNvSpPr>
+            <a:spLocks noGrp="1"/>
+          </p:cNvSpPr>
+          <p:nvPr>
+            <p:ph idx="1"/>
+          </p:nvPr>
+        </p:nvSpPr>
+        <p:spPr/>
+        <p:txBody>
+          <a:bodyPr/>
+          <a:lstStyle/>
+          <a:p>
+            <a:r>
+              <a:rPr lang="en-US" sz="2400" dirty="0"/>
+              <a:t>Another recursive data structure!</a:t>
+            </a:r>
+          </a:p>
+          <a:p>
+            <a:pPr lvl="1"/>
+            <a:r>
+              <a:rPr lang="en-US" sz="2400" dirty="0"/>
+              <a:t>We can keep practicing recursion and working with classes</a:t>
+            </a:r>
+          </a:p>
+          <a:p>
+            <a:pPr lvl="1"/>
+            <a:r>
+              <a:rPr lang="en-US" sz="2400" dirty="0"/>
+              <a:t>Computer science really likes recursion. </a:t>
+            </a:r>
+            <a:r>
+              <a:rPr lang="en-US" sz="2400" dirty="0">
+                <a:sym typeface="Wingdings" pitchFamily="2" charset="2"/>
+              </a:rPr>
+              <a:t> </a:t>
+            </a:r>
+          </a:p>
+          <a:p>
+            <a:r>
+              <a:rPr lang="en-US" b="1" dirty="0">
+                <a:sym typeface="Wingdings" pitchFamily="2" charset="2"/>
+              </a:rPr>
+              <a:t> </a:t>
+            </a:r>
+            <a:r>
+              <a:rPr lang="en-US" dirty="0">
+                <a:sym typeface="Wingdings" pitchFamily="2" charset="2"/>
+              </a:rPr>
+              <a:t>Recall: </a:t>
+            </a:r>
+            <a:r>
+              <a:rPr lang="en-US" i="1" dirty="0">
+                <a:sym typeface="Wingdings" pitchFamily="2" charset="2"/>
+              </a:rPr>
+              <a:t>tree recursion </a:t>
+            </a:r>
+            <a:r>
+              <a:rPr lang="en-US" dirty="0">
+                <a:sym typeface="Wingdings" pitchFamily="2" charset="2"/>
+              </a:rPr>
+              <a:t>from before the midterm…</a:t>
+            </a:r>
+          </a:p>
+          <a:p>
+            <a:pPr lvl="1"/>
+            <a:r>
+              <a:rPr lang="en-US" b="1" dirty="0">
+                <a:sym typeface="Wingdings" pitchFamily="2" charset="2"/>
+              </a:rPr>
+              <a:t> Tree recursion exists independently of tree data structures!</a:t>
+            </a:r>
+          </a:p>
+          <a:p>
+            <a:pPr lvl="1"/>
+            <a:r>
+              <a:rPr lang="en-US" dirty="0">
+                <a:sym typeface="Wingdings" pitchFamily="2" charset="2"/>
+              </a:rPr>
+              <a:t> However, tree recursion is a common technique for processing data in trees.</a:t>
+            </a:r>
+            <a:endParaRPr lang="en-US" dirty="0"/>
+          </a:p>
+          <a:p>
+            <a:r>
+              <a:rPr lang="en-US" b="1" dirty="0"/>
+              <a:t>Each branch is also its own Tree.</a:t>
+            </a:r>
+          </a:p>
+          <a:p>
+            <a:pPr marL="0" indent="0">
+              <a:buNone/>
+            </a:pPr>
+            <a:endParaRPr lang="en-US" dirty="0"/>
+          </a:p>
+        </p:txBody>
+      </p:sp>
+      <p:sp>
+        <p:nvSpPr>
+          <p:cNvPr id="4" name="Footer Placeholder 3">
+            <a:extLst>
+              <a:ext uri="{FF2B5EF4-FFF2-40B4-BE49-F238E27FC236}">
+                <a16:creationId xmlns:a16="http://schemas.microsoft.com/office/drawing/2014/main" id="{AB696328-87F9-085A-D804-62FCBD171483}"/>
+              </a:ext>
+            </a:extLst>
+          </p:cNvPr>
+          <p:cNvSpPr>
+            <a:spLocks noGrp="1"/>
+          </p:cNvSpPr>
+          <p:nvPr>
+            <p:ph type="ftr" sz="quarter" idx="10"/>
+          </p:nvPr>
+        </p:nvSpPr>
+        <p:spPr/>
+        <p:txBody>
+          <a:bodyPr/>
+          <a:lstStyle/>
+          <a:p>
+            <a:r>
+              <a:rPr lang="en-US" dirty="0"/>
+              <a:t>Eric Kim | UC Berkeley | https://c88c.org | © CC BY-NC-SA</a:t>
+            </a:r>
+          </a:p>
+        </p:txBody>
+      </p:sp>
+    </p:spTree>
+    <p:extLst>
+      <p:ext uri="{BB962C8B-B14F-4D97-AF65-F5344CB8AC3E}">
+        <p14:creationId xmlns:p14="http://schemas.microsoft.com/office/powerpoint/2010/main" val="1907336941"/>
       </p:ext>
     </p:extLst>
   </p:cSld>
@@ -16471,7 +16176,7 @@
           <p:cNvPr id="5" name="Title 4">
             <a:extLst>
               <a:ext uri="{FF2B5EF4-FFF2-40B4-BE49-F238E27FC236}">
-                <a16:creationId xmlns:a16="http://schemas.microsoft.com/office/drawing/2014/main" id="{60A4C850-E01A-6993-B3BD-38AA8AB81B9D}"/>
+                <a16:creationId xmlns:a16="http://schemas.microsoft.com/office/drawing/2014/main" id="{E064E65E-4C29-1ACC-5113-D781B0FE152F}"/>
               </a:ext>
             </a:extLst>
           </p:cNvPr>
@@ -16489,17 +16194,17 @@
           <a:p>
             <a:r>
               <a:rPr lang="en-US" dirty="0"/>
-              <a:t>Trees are Recursive</a:t>
-            </a:r>
-          </a:p>
-        </p:txBody>
-      </p:sp>
-      <p:sp>
-        <p:nvSpPr>
-          <p:cNvPr id="6" name="Content Placeholder 5">
+              <a:t>How many trees are there?</a:t>
+            </a:r>
+          </a:p>
+        </p:txBody>
+      </p:sp>
+      <p:sp>
+        <p:nvSpPr>
+          <p:cNvPr id="15" name="Content Placeholder 14">
             <a:extLst>
               <a:ext uri="{FF2B5EF4-FFF2-40B4-BE49-F238E27FC236}">
-                <a16:creationId xmlns:a16="http://schemas.microsoft.com/office/drawing/2014/main" id="{7B0C1384-5578-2AF4-EDE0-055899EE6D9F}"/>
+                <a16:creationId xmlns:a16="http://schemas.microsoft.com/office/drawing/2014/main" id="{5C0F4F77-EFCA-C5F9-C13E-1E6B2CBAD4A9}"/>
               </a:ext>
             </a:extLst>
           </p:cNvPr>
@@ -16516,86 +16221,9 @@
           <a:lstStyle/>
           <a:p>
             <a:r>
-              <a:rPr lang="en-US" sz="2400" dirty="0"/>
-              <a:t>Another recursive data structure!</a:t>
-            </a:r>
-          </a:p>
-          <a:p>
-            <a:pPr lvl="1"/>
-            <a:r>
-              <a:rPr lang="en-US" sz="2400" dirty="0"/>
-              <a:t>We can keep practicing recursion and working with classes</a:t>
-            </a:r>
-          </a:p>
-          <a:p>
-            <a:pPr lvl="1"/>
-            <a:r>
-              <a:rPr lang="en-US" sz="2400" dirty="0"/>
-              <a:t>Computer science really likes recursion. </a:t>
-            </a:r>
-            <a:r>
-              <a:rPr lang="en-US" sz="2400" dirty="0">
-                <a:sym typeface="Wingdings" pitchFamily="2" charset="2"/>
-              </a:rPr>
-              <a:t> </a:t>
-            </a:r>
-          </a:p>
-          <a:p>
-            <a:r>
-              <a:rPr lang="en-US" b="1" dirty="0">
-                <a:sym typeface="Wingdings" pitchFamily="2" charset="2"/>
-              </a:rPr>
-              <a:t> </a:t>
-            </a:r>
-            <a:r>
-              <a:rPr lang="en-US" dirty="0">
-                <a:sym typeface="Wingdings" pitchFamily="2" charset="2"/>
-              </a:rPr>
-              <a:t>Recall: </a:t>
-            </a:r>
-            <a:r>
-              <a:rPr lang="en-US" i="1" dirty="0">
-                <a:sym typeface="Wingdings" pitchFamily="2" charset="2"/>
-              </a:rPr>
-              <a:t>tree recursion </a:t>
-            </a:r>
-            <a:r>
-              <a:rPr lang="en-US" dirty="0">
-                <a:sym typeface="Wingdings" pitchFamily="2" charset="2"/>
-              </a:rPr>
-              <a:t>from before the midterm…</a:t>
-            </a:r>
-          </a:p>
-          <a:p>
-            <a:pPr lvl="1"/>
-            <a:r>
-              <a:rPr lang="en-US" b="1" dirty="0">
-                <a:sym typeface="Wingdings" pitchFamily="2" charset="2"/>
-              </a:rPr>
-              <a:t> Tree recursion exists independently of tree data structures!</a:t>
-            </a:r>
-          </a:p>
-          <a:p>
-            <a:pPr lvl="1"/>
-            <a:r>
-              <a:rPr lang="en-US" dirty="0">
-                <a:sym typeface="Wingdings" pitchFamily="2" charset="2"/>
-              </a:rPr>
-              <a:t> However, tree recursion is a common technique for processing data in trees.</a:t>
-            </a:r>
-            <a:endParaRPr lang="en-US" dirty="0"/>
-          </a:p>
-          <a:p>
-            <a:r>
-              <a:rPr lang="en-US" b="1" dirty="0"/>
-              <a:t>Each branch is also its own Tree.</a:t>
-            </a:r>
-          </a:p>
-          <a:p>
-            <a:pPr marL="0" indent="0">
-              <a:buNone/>
-            </a:pPr>
-            <a:endParaRPr lang="en-US" dirty="0"/>
+              <a:rPr lang="en-US" dirty="0"/>
+              <a:t>Mostly a rhetorical question…</a:t>
+            </a:r>
           </a:p>
         </p:txBody>
       </p:sp>
@@ -16604,7 +16232,7 @@
           <p:cNvPr id="4" name="Footer Placeholder 3">
             <a:extLst>
               <a:ext uri="{FF2B5EF4-FFF2-40B4-BE49-F238E27FC236}">
-                <a16:creationId xmlns:a16="http://schemas.microsoft.com/office/drawing/2014/main" id="{AB696328-87F9-085A-D804-62FCBD171483}"/>
+                <a16:creationId xmlns:a16="http://schemas.microsoft.com/office/drawing/2014/main" id="{7100BF68-E640-C884-0D5C-181EE7DF2B93}"/>
               </a:ext>
             </a:extLst>
           </p:cNvPr>
@@ -16621,17 +16249,253 @@
           <a:lstStyle/>
           <a:p>
             <a:r>
-              <a:rPr lang="en-US"/>
-              <a:t>Michael Ball | UC Berkeley | https://c88c.org | © CC BY-NC-SA</a:t>
-            </a:r>
-            <a:endParaRPr lang="en-US" dirty="0"/>
+              <a:rPr lang="en-US" dirty="0"/>
+              <a:t>Eric Kim | UC Berkeley | https://c88c.org | © CC BY-NC-SA</a:t>
+            </a:r>
+          </a:p>
+        </p:txBody>
+      </p:sp>
+      <p:pic>
+        <p:nvPicPr>
+          <p:cNvPr id="7" name="Picture 6">
+            <a:extLst>
+              <a:ext uri="{FF2B5EF4-FFF2-40B4-BE49-F238E27FC236}">
+                <a16:creationId xmlns:a16="http://schemas.microsoft.com/office/drawing/2014/main" id="{C59FE77F-C00B-79CC-08BC-C6A376995801}"/>
+              </a:ext>
+            </a:extLst>
+          </p:cNvPr>
+          <p:cNvPicPr>
+            <a:picLocks noChangeAspect="1"/>
+          </p:cNvPicPr>
+          <p:nvPr/>
+        </p:nvPicPr>
+        <p:blipFill>
+          <a:blip r:embed="rId2"/>
+          <a:stretch>
+            <a:fillRect/>
+          </a:stretch>
+        </p:blipFill>
+        <p:spPr>
+          <a:xfrm>
+            <a:off x="4009663" y="1676400"/>
+            <a:ext cx="3425952" cy="3893127"/>
+          </a:xfrm>
+          <a:prstGeom prst="rect">
+            <a:avLst/>
+          </a:prstGeom>
+        </p:spPr>
+      </p:pic>
+      <p:sp>
+        <p:nvSpPr>
+          <p:cNvPr id="9" name="Rectangle 8">
+            <a:extLst>
+              <a:ext uri="{FF2B5EF4-FFF2-40B4-BE49-F238E27FC236}">
+                <a16:creationId xmlns:a16="http://schemas.microsoft.com/office/drawing/2014/main" id="{A3D525F9-5CC2-641D-EBE8-C91B0CCEE21E}"/>
+              </a:ext>
+            </a:extLst>
+          </p:cNvPr>
+          <p:cNvSpPr/>
+          <p:nvPr/>
+        </p:nvSpPr>
+        <p:spPr bwMode="auto">
+          <a:xfrm>
+            <a:off x="3810000" y="1589482"/>
+            <a:ext cx="3962400" cy="4201717"/>
+          </a:xfrm>
+          <a:prstGeom prst="rect">
+            <a:avLst/>
+          </a:prstGeom>
+          <a:noFill/>
+          <a:ln w="31750" cap="flat" cmpd="sng" algn="ctr">
+            <a:solidFill>
+              <a:schemeClr val="tx1"/>
+            </a:solidFill>
+            <a:prstDash val="solid"/>
+            <a:round/>
+            <a:headEnd type="none" w="sm" len="sm"/>
+            <a:tailEnd type="none" w="sm" len="sm"/>
+          </a:ln>
+          <a:effectLst/>
+        </p:spPr>
+        <p:txBody>
+          <a:bodyPr vert="horz" wrap="square" lIns="91440" tIns="45720" rIns="91440" bIns="45720" numCol="1" rtlCol="0" anchor="t" anchorCtr="0" compatLnSpc="1">
+            <a:prstTxWarp prst="textNoShape">
+              <a:avLst/>
+            </a:prstTxWarp>
+          </a:bodyPr>
+          <a:lstStyle/>
+          <a:p>
+            <a:pPr marL="0" marR="0" indent="0" algn="l" defTabSz="914400" rtl="0" eaLnBrk="0" fontAlgn="base" latinLnBrk="0" hangingPunct="0">
+              <a:lnSpc>
+                <a:spcPct val="100000"/>
+              </a:lnSpc>
+              <a:spcBef>
+                <a:spcPct val="0"/>
+              </a:spcBef>
+              <a:spcAft>
+                <a:spcPct val="0"/>
+              </a:spcAft>
+              <a:buClrTx/>
+              <a:buSzTx/>
+              <a:buFontTx/>
+              <a:buNone/>
+              <a:tabLst/>
+            </a:pPr>
+            <a:endParaRPr kumimoji="0" lang="en-US" sz="1800" b="0" i="0" u="none" strike="noStrike" cap="none" normalizeH="0" baseline="0">
+              <a:ln>
+                <a:noFill/>
+              </a:ln>
+              <a:solidFill>
+                <a:schemeClr val="tx1"/>
+              </a:solidFill>
+              <a:effectLst/>
+              <a:latin typeface="Arial" charset="0"/>
+            </a:endParaRPr>
+          </a:p>
+        </p:txBody>
+      </p:sp>
+      <p:sp>
+        <p:nvSpPr>
+          <p:cNvPr id="13" name="Rectangle 12">
+            <a:extLst>
+              <a:ext uri="{FF2B5EF4-FFF2-40B4-BE49-F238E27FC236}">
+                <a16:creationId xmlns:a16="http://schemas.microsoft.com/office/drawing/2014/main" id="{9EBCD664-411C-9633-A27B-0CED5F61A463}"/>
+              </a:ext>
+            </a:extLst>
+          </p:cNvPr>
+          <p:cNvSpPr/>
+          <p:nvPr/>
+        </p:nvSpPr>
+        <p:spPr bwMode="auto">
+          <a:xfrm>
+            <a:off x="3919305" y="2774045"/>
+            <a:ext cx="2633895" cy="2906318"/>
+          </a:xfrm>
+          <a:prstGeom prst="rect">
+            <a:avLst/>
+          </a:prstGeom>
+          <a:noFill/>
+          <a:ln w="31750" cap="flat" cmpd="sng" algn="ctr">
+            <a:solidFill>
+              <a:schemeClr val="accent1"/>
+            </a:solidFill>
+            <a:prstDash val="solid"/>
+            <a:round/>
+            <a:headEnd type="none" w="sm" len="sm"/>
+            <a:tailEnd type="none" w="sm" len="sm"/>
+          </a:ln>
+          <a:effectLst/>
+        </p:spPr>
+        <p:txBody>
+          <a:bodyPr vert="horz" wrap="square" lIns="91440" tIns="45720" rIns="91440" bIns="45720" numCol="1" rtlCol="0" anchor="t" anchorCtr="0" compatLnSpc="1">
+            <a:prstTxWarp prst="textNoShape">
+              <a:avLst/>
+            </a:prstTxWarp>
+          </a:bodyPr>
+          <a:lstStyle/>
+          <a:p>
+            <a:pPr marL="0" marR="0" indent="0" algn="l" defTabSz="914400" rtl="0" eaLnBrk="0" fontAlgn="base" latinLnBrk="0" hangingPunct="0">
+              <a:lnSpc>
+                <a:spcPct val="100000"/>
+              </a:lnSpc>
+              <a:spcBef>
+                <a:spcPct val="0"/>
+              </a:spcBef>
+              <a:spcAft>
+                <a:spcPct val="0"/>
+              </a:spcAft>
+              <a:buClrTx/>
+              <a:buSzTx/>
+              <a:buFontTx/>
+              <a:buNone/>
+              <a:tabLst/>
+            </a:pPr>
+            <a:endParaRPr kumimoji="0" lang="en-US" sz="1800" b="0" i="0" u="none" strike="noStrike" cap="none" normalizeH="0" baseline="0">
+              <a:ln>
+                <a:noFill/>
+              </a:ln>
+              <a:solidFill>
+                <a:schemeClr val="tx1"/>
+              </a:solidFill>
+              <a:effectLst/>
+              <a:latin typeface="Arial" charset="0"/>
+            </a:endParaRPr>
+          </a:p>
+        </p:txBody>
+      </p:sp>
+      <p:sp>
+        <p:nvSpPr>
+          <p:cNvPr id="14" name="Rectangle 13">
+            <a:extLst>
+              <a:ext uri="{FF2B5EF4-FFF2-40B4-BE49-F238E27FC236}">
+                <a16:creationId xmlns:a16="http://schemas.microsoft.com/office/drawing/2014/main" id="{8AF67A5E-524E-3607-7687-45F083C256B2}"/>
+              </a:ext>
+            </a:extLst>
+          </p:cNvPr>
+          <p:cNvSpPr/>
+          <p:nvPr/>
+        </p:nvSpPr>
+        <p:spPr bwMode="auto">
+          <a:xfrm>
+            <a:off x="6576832" y="2774045"/>
+            <a:ext cx="949142" cy="2906318"/>
+          </a:xfrm>
+          <a:prstGeom prst="rect">
+            <a:avLst/>
+          </a:prstGeom>
+          <a:noFill/>
+          <a:ln w="31750" cap="flat" cmpd="sng" algn="ctr">
+            <a:solidFill>
+              <a:schemeClr val="accent1"/>
+            </a:solidFill>
+            <a:prstDash val="solid"/>
+            <a:round/>
+            <a:headEnd type="none" w="sm" len="sm"/>
+            <a:tailEnd type="none" w="sm" len="sm"/>
+          </a:ln>
+          <a:effectLst/>
+        </p:spPr>
+        <p:txBody>
+          <a:bodyPr vert="horz" wrap="square" lIns="91440" tIns="45720" rIns="91440" bIns="45720" numCol="1" rtlCol="0" anchor="t" anchorCtr="0" compatLnSpc="1">
+            <a:prstTxWarp prst="textNoShape">
+              <a:avLst/>
+            </a:prstTxWarp>
+          </a:bodyPr>
+          <a:lstStyle/>
+          <a:p>
+            <a:pPr marL="0" marR="0" indent="0" algn="l" defTabSz="914400" rtl="0" eaLnBrk="0" fontAlgn="base" latinLnBrk="0" hangingPunct="0">
+              <a:lnSpc>
+                <a:spcPct val="100000"/>
+              </a:lnSpc>
+              <a:spcBef>
+                <a:spcPct val="0"/>
+              </a:spcBef>
+              <a:spcAft>
+                <a:spcPct val="0"/>
+              </a:spcAft>
+              <a:buClrTx/>
+              <a:buSzTx/>
+              <a:buFontTx/>
+              <a:buNone/>
+              <a:tabLst/>
+            </a:pPr>
+            <a:endParaRPr kumimoji="0" lang="en-US" sz="1800" b="0" i="0" u="none" strike="noStrike" cap="none" normalizeH="0" baseline="0">
+              <a:ln>
+                <a:noFill/>
+              </a:ln>
+              <a:solidFill>
+                <a:schemeClr val="tx1"/>
+              </a:solidFill>
+              <a:effectLst/>
+              <a:latin typeface="Arial" charset="0"/>
+            </a:endParaRPr>
           </a:p>
         </p:txBody>
       </p:sp>
     </p:spTree>
     <p:extLst>
       <p:ext uri="{BB962C8B-B14F-4D97-AF65-F5344CB8AC3E}">
-        <p14:creationId xmlns:p14="http://schemas.microsoft.com/office/powerpoint/2010/main" val="1907336941"/>
+        <p14:creationId xmlns:p14="http://schemas.microsoft.com/office/powerpoint/2010/main" val="239031561"/>
       </p:ext>
     </p:extLst>
   </p:cSld>

</xml_diff>